<commit_message>
Updated thank you page
</commit_message>
<xml_diff>
--- a/Azure Service Bus Calgary .NET usergroup 2016-03-24.pptx
+++ b/Azure Service Bus Calgary .NET usergroup 2016-03-24.pptx
@@ -5,7 +5,7 @@
     <p:sldMasterId id="2147483648" r:id="rId1"/>
   </p:sldMasterIdLst>
   <p:notesMasterIdLst>
-    <p:notesMasterId r:id="rId23"/>
+    <p:notesMasterId r:id="rId24"/>
   </p:notesMasterIdLst>
   <p:sldIdLst>
     <p:sldId id="256" r:id="rId2"/>
@@ -29,6 +29,7 @@
     <p:sldId id="274" r:id="rId20"/>
     <p:sldId id="273" r:id="rId21"/>
     <p:sldId id="284" r:id="rId22"/>
+    <p:sldId id="285" r:id="rId23"/>
   </p:sldIdLst>
   <p:sldSz cx="12192000" cy="6858000"/>
   <p:notesSz cx="6858000" cy="9144000"/>
@@ -217,7 +218,7 @@
           <a:p>
             <a:fld id="{1639318F-A11E-4632-BF99-F8A6CDC302CB}" type="datetimeFigureOut">
               <a:rPr lang="en-CA" smtClean="0"/>
-              <a:t>2016-03-21</a:t>
+              <a:t>2016-03-22</a:t>
             </a:fld>
             <a:endParaRPr lang="en-CA"/>
           </a:p>
@@ -700,7 +701,7 @@
           <a:p>
             <a:fld id="{91F17509-A3DD-4616-9315-DE1FA9D0E286}" type="datetimeFigureOut">
               <a:rPr lang="en-CA" smtClean="0"/>
-              <a:t>2016-03-21</a:t>
+              <a:t>2016-03-22</a:t>
             </a:fld>
             <a:endParaRPr lang="en-CA"/>
           </a:p>
@@ -870,7 +871,7 @@
           <a:p>
             <a:fld id="{91F17509-A3DD-4616-9315-DE1FA9D0E286}" type="datetimeFigureOut">
               <a:rPr lang="en-CA" smtClean="0"/>
-              <a:t>2016-03-21</a:t>
+              <a:t>2016-03-22</a:t>
             </a:fld>
             <a:endParaRPr lang="en-CA"/>
           </a:p>
@@ -1050,7 +1051,7 @@
           <a:p>
             <a:fld id="{91F17509-A3DD-4616-9315-DE1FA9D0E286}" type="datetimeFigureOut">
               <a:rPr lang="en-CA" smtClean="0"/>
-              <a:t>2016-03-21</a:t>
+              <a:t>2016-03-22</a:t>
             </a:fld>
             <a:endParaRPr lang="en-CA"/>
           </a:p>
@@ -1220,7 +1221,7 @@
           <a:p>
             <a:fld id="{91F17509-A3DD-4616-9315-DE1FA9D0E286}" type="datetimeFigureOut">
               <a:rPr lang="en-CA" smtClean="0"/>
-              <a:t>2016-03-21</a:t>
+              <a:t>2016-03-22</a:t>
             </a:fld>
             <a:endParaRPr lang="en-CA"/>
           </a:p>
@@ -1466,7 +1467,7 @@
           <a:p>
             <a:fld id="{91F17509-A3DD-4616-9315-DE1FA9D0E286}" type="datetimeFigureOut">
               <a:rPr lang="en-CA" smtClean="0"/>
-              <a:t>2016-03-21</a:t>
+              <a:t>2016-03-22</a:t>
             </a:fld>
             <a:endParaRPr lang="en-CA"/>
           </a:p>
@@ -1698,7 +1699,7 @@
           <a:p>
             <a:fld id="{91F17509-A3DD-4616-9315-DE1FA9D0E286}" type="datetimeFigureOut">
               <a:rPr lang="en-CA" smtClean="0"/>
-              <a:t>2016-03-21</a:t>
+              <a:t>2016-03-22</a:t>
             </a:fld>
             <a:endParaRPr lang="en-CA"/>
           </a:p>
@@ -2065,7 +2066,7 @@
           <a:p>
             <a:fld id="{91F17509-A3DD-4616-9315-DE1FA9D0E286}" type="datetimeFigureOut">
               <a:rPr lang="en-CA" smtClean="0"/>
-              <a:t>2016-03-21</a:t>
+              <a:t>2016-03-22</a:t>
             </a:fld>
             <a:endParaRPr lang="en-CA"/>
           </a:p>
@@ -2183,7 +2184,7 @@
           <a:p>
             <a:fld id="{91F17509-A3DD-4616-9315-DE1FA9D0E286}" type="datetimeFigureOut">
               <a:rPr lang="en-CA" smtClean="0"/>
-              <a:t>2016-03-21</a:t>
+              <a:t>2016-03-22</a:t>
             </a:fld>
             <a:endParaRPr lang="en-CA"/>
           </a:p>
@@ -2278,7 +2279,7 @@
           <a:p>
             <a:fld id="{91F17509-A3DD-4616-9315-DE1FA9D0E286}" type="datetimeFigureOut">
               <a:rPr lang="en-CA" smtClean="0"/>
-              <a:t>2016-03-21</a:t>
+              <a:t>2016-03-22</a:t>
             </a:fld>
             <a:endParaRPr lang="en-CA"/>
           </a:p>
@@ -2555,7 +2556,7 @@
           <a:p>
             <a:fld id="{91F17509-A3DD-4616-9315-DE1FA9D0E286}" type="datetimeFigureOut">
               <a:rPr lang="en-CA" smtClean="0"/>
-              <a:t>2016-03-21</a:t>
+              <a:t>2016-03-22</a:t>
             </a:fld>
             <a:endParaRPr lang="en-CA"/>
           </a:p>
@@ -2808,7 +2809,7 @@
           <a:p>
             <a:fld id="{91F17509-A3DD-4616-9315-DE1FA9D0E286}" type="datetimeFigureOut">
               <a:rPr lang="en-CA" smtClean="0"/>
-              <a:t>2016-03-21</a:t>
+              <a:t>2016-03-22</a:t>
             </a:fld>
             <a:endParaRPr lang="en-CA"/>
           </a:p>
@@ -3021,7 +3022,7 @@
           <a:p>
             <a:fld id="{91F17509-A3DD-4616-9315-DE1FA9D0E286}" type="datetimeFigureOut">
               <a:rPr lang="en-CA" smtClean="0"/>
-              <a:t>2016-03-21</a:t>
+              <a:t>2016-03-22</a:t>
             </a:fld>
             <a:endParaRPr lang="en-CA"/>
           </a:p>
@@ -9967,6 +9968,220 @@
 </p:sld>
 </file>
 
+<file path=ppt/slides/slide22.xml><?xml version="1.0" encoding="utf-8"?>
+<p:sld xmlns:a="http://schemas.openxmlformats.org/drawingml/2006/main" xmlns:r="http://schemas.openxmlformats.org/officeDocument/2006/relationships" xmlns:p="http://schemas.openxmlformats.org/presentationml/2006/main">
+  <p:cSld>
+    <p:spTree>
+      <p:nvGrpSpPr>
+        <p:cNvPr id="1" name=""/>
+        <p:cNvGrpSpPr/>
+        <p:nvPr/>
+      </p:nvGrpSpPr>
+      <p:grpSpPr>
+        <a:xfrm>
+          <a:off x="0" y="0"/>
+          <a:ext cx="0" cy="0"/>
+          <a:chOff x="0" y="0"/>
+          <a:chExt cx="0" cy="0"/>
+        </a:xfrm>
+      </p:grpSpPr>
+      <p:sp>
+        <p:nvSpPr>
+          <p:cNvPr id="2" name="Title 1"/>
+          <p:cNvSpPr>
+            <a:spLocks noGrp="1"/>
+          </p:cNvSpPr>
+          <p:nvPr>
+            <p:ph type="title"/>
+          </p:nvPr>
+        </p:nvSpPr>
+        <p:spPr>
+          <a:xfrm>
+            <a:off x="0" y="0"/>
+            <a:ext cx="12192000" cy="1325563"/>
+          </a:xfrm>
+          <a:solidFill>
+            <a:srgbClr val="0070C0"/>
+          </a:solidFill>
+        </p:spPr>
+        <p:txBody>
+          <a:bodyPr/>
+          <a:lstStyle/>
+          <a:p>
+            <a:r>
+              <a:rPr lang="en-CA" b="1" dirty="0">
+                <a:solidFill>
+                  <a:schemeClr val="bg1"/>
+                </a:solidFill>
+              </a:rPr>
+              <a:t>Thank you!</a:t>
+            </a:r>
+          </a:p>
+        </p:txBody>
+      </p:sp>
+      <p:sp>
+        <p:nvSpPr>
+          <p:cNvPr id="3" name="Rectangle 2"/>
+          <p:cNvSpPr/>
+          <p:nvPr/>
+        </p:nvSpPr>
+        <p:spPr>
+          <a:xfrm>
+            <a:off x="256449" y="1708347"/>
+            <a:ext cx="11276293" cy="3416320"/>
+          </a:xfrm>
+          <a:prstGeom prst="rect">
+            <a:avLst/>
+          </a:prstGeom>
+        </p:spPr>
+        <p:txBody>
+          <a:bodyPr wrap="square">
+            <a:spAutoFit/>
+          </a:bodyPr>
+          <a:lstStyle/>
+          <a:p>
+            <a:r>
+              <a:rPr lang="en-CA" sz="2400" b="1" dirty="0"/>
+              <a:t>Slides &amp; code </a:t>
+            </a:r>
+            <a:r>
+              <a:rPr lang="en-CA" sz="2400" b="1" dirty="0">
+                <a:hlinkClick r:id="rId2"/>
+              </a:rPr>
+              <a:t>https://github.com/SeanFeldman/ASB-DotNet-YYC</a:t>
+            </a:r>
+            <a:endParaRPr lang="en-CA" sz="2400" b="1" dirty="0"/>
+          </a:p>
+          <a:p>
+            <a:r>
+              <a:rPr lang="en-CA" sz="2400" b="1" dirty="0"/>
+              <a:t>Connect </a:t>
+            </a:r>
+            <a:r>
+              <a:rPr lang="en-CA" sz="2400" b="1" dirty="0">
+                <a:hlinkClick r:id="rId3" action="ppaction://hlinkfile"/>
+              </a:rPr>
+              <a:t>@</a:t>
+            </a:r>
+            <a:r>
+              <a:rPr lang="en-CA" sz="2400" b="1" dirty="0" err="1">
+                <a:hlinkClick r:id="rId3" action="ppaction://hlinkfile"/>
+              </a:rPr>
+              <a:t>sfeldman</a:t>
+            </a:r>
+            <a:endParaRPr lang="en-CA" sz="2400" b="1" dirty="0"/>
+          </a:p>
+          <a:p>
+            <a:r>
+              <a:rPr lang="en-CA" sz="2400" b="1" dirty="0"/>
+              <a:t>Send your feedback to </a:t>
+            </a:r>
+            <a:r>
+              <a:rPr lang="en-CA" sz="2400" b="1" dirty="0">
+                <a:hlinkClick r:id="rId4"/>
+              </a:rPr>
+              <a:t>feldman.sean@gmail.com</a:t>
+            </a:r>
+            <a:endParaRPr lang="en-CA" sz="2400" b="1" dirty="0"/>
+          </a:p>
+          <a:p>
+            <a:r>
+              <a:rPr lang="en-CA" sz="2400" b="1" dirty="0"/>
+              <a:t>Feel up your RSS </a:t>
+            </a:r>
+            <a:r>
+              <a:rPr lang="en-CA" sz="2400" b="1"/>
+              <a:t>feed with </a:t>
+            </a:r>
+            <a:r>
+              <a:rPr lang="en-CA" sz="2400" b="1">
+                <a:hlinkClick r:id="rId5"/>
+              </a:rPr>
+              <a:t>https</a:t>
+            </a:r>
+            <a:r>
+              <a:rPr lang="en-CA" sz="2400" b="1">
+                <a:hlinkClick r:id="rId5"/>
+              </a:rPr>
+              <a:t>://weblogs.asp.net/sfeldman</a:t>
+            </a:r>
+            <a:r>
+              <a:rPr lang="en-CA" sz="2400" b="1"/>
+              <a:t> </a:t>
+            </a:r>
+            <a:endParaRPr lang="en-CA" sz="2400" b="1" dirty="0"/>
+          </a:p>
+          <a:p>
+            <a:endParaRPr lang="en-CA" sz="2400" b="1" dirty="0"/>
+          </a:p>
+          <a:p>
+            <a:r>
+              <a:rPr lang="en-CA" sz="2400" b="1" dirty="0"/>
+              <a:t>Tools</a:t>
+            </a:r>
+          </a:p>
+          <a:p>
+            <a:pPr marL="342900" indent="-342900">
+              <a:buFont typeface="Arial" panose="020B0604020202020204" pitchFamily="34" charset="0"/>
+              <a:buChar char="•"/>
+            </a:pPr>
+            <a:r>
+              <a:rPr lang="en-CA" sz="2400" b="1" dirty="0"/>
+              <a:t>Service Bus Explorer </a:t>
+            </a:r>
+            <a:r>
+              <a:rPr lang="en-CA" sz="2400" b="1" dirty="0">
+                <a:hlinkClick r:id="rId6"/>
+              </a:rPr>
+              <a:t>https://github.com/paolosalvatori/ServiceBusExplorer</a:t>
+            </a:r>
+            <a:r>
+              <a:rPr lang="en-CA" sz="2400" b="1" dirty="0"/>
+              <a:t> </a:t>
+            </a:r>
+          </a:p>
+          <a:p>
+            <a:pPr marL="342900" indent="-342900">
+              <a:buFont typeface="Arial" panose="020B0604020202020204" pitchFamily="34" charset="0"/>
+              <a:buChar char="•"/>
+            </a:pPr>
+            <a:r>
+              <a:rPr lang="en-CA" sz="2400" b="1" dirty="0" err="1"/>
+              <a:t>LinqPad</a:t>
+            </a:r>
+            <a:r>
+              <a:rPr lang="en-CA" sz="2400" b="1" dirty="0"/>
+              <a:t> </a:t>
+            </a:r>
+            <a:r>
+              <a:rPr lang="en-CA" sz="2400" b="1" dirty="0">
+                <a:hlinkClick r:id="rId7"/>
+              </a:rPr>
+              <a:t>https://www.linqpad.net/</a:t>
+            </a:r>
+            <a:r>
+              <a:rPr lang="en-CA" sz="2400" b="1" dirty="0"/>
+              <a:t> </a:t>
+            </a:r>
+          </a:p>
+          <a:p>
+            <a:endParaRPr lang="en-CA" sz="2400" b="1" dirty="0"/>
+          </a:p>
+        </p:txBody>
+      </p:sp>
+    </p:spTree>
+    <p:extLst>
+      <p:ext uri="{BB962C8B-B14F-4D97-AF65-F5344CB8AC3E}">
+        <p14:creationId xmlns:p14="http://schemas.microsoft.com/office/powerpoint/2010/main" val="129031441"/>
+      </p:ext>
+    </p:extLst>
+  </p:cSld>
+  <p:clrMapOvr>
+    <a:masterClrMapping/>
+  </p:clrMapOvr>
+</p:sld>
+</file>
+
 <file path=ppt/slides/slide3.xml><?xml version="1.0" encoding="utf-8"?>
 <p:sld xmlns:a="http://schemas.openxmlformats.org/drawingml/2006/main" xmlns:r="http://schemas.openxmlformats.org/officeDocument/2006/relationships" xmlns:p="http://schemas.openxmlformats.org/presentationml/2006/main">
   <p:cSld>

</xml_diff>

<commit_message>
missing links/typos/removed duplicated slides
</commit_message>
<xml_diff>
--- a/Azure Service Bus Calgary .NET usergroup 2016-03-24.pptx
+++ b/Azure Service Bus Calgary .NET usergroup 2016-03-24.pptx
@@ -5,7 +5,7 @@
     <p:sldMasterId id="2147483648" r:id="rId1"/>
   </p:sldMasterIdLst>
   <p:notesMasterIdLst>
-    <p:notesMasterId r:id="rId23"/>
+    <p:notesMasterId r:id="rId21"/>
   </p:notesMasterIdLst>
   <p:sldIdLst>
     <p:sldId id="256" r:id="rId2"/>
@@ -18,17 +18,15 @@
     <p:sldId id="265" r:id="rId9"/>
     <p:sldId id="281" r:id="rId10"/>
     <p:sldId id="266" r:id="rId11"/>
-    <p:sldId id="268" r:id="rId12"/>
-    <p:sldId id="282" r:id="rId13"/>
-    <p:sldId id="267" r:id="rId14"/>
-    <p:sldId id="262" r:id="rId15"/>
-    <p:sldId id="263" r:id="rId16"/>
-    <p:sldId id="286" r:id="rId17"/>
-    <p:sldId id="283" r:id="rId18"/>
-    <p:sldId id="272" r:id="rId19"/>
-    <p:sldId id="274" r:id="rId20"/>
-    <p:sldId id="273" r:id="rId21"/>
-    <p:sldId id="285" r:id="rId22"/>
+    <p:sldId id="267" r:id="rId12"/>
+    <p:sldId id="262" r:id="rId13"/>
+    <p:sldId id="263" r:id="rId14"/>
+    <p:sldId id="286" r:id="rId15"/>
+    <p:sldId id="283" r:id="rId16"/>
+    <p:sldId id="272" r:id="rId17"/>
+    <p:sldId id="274" r:id="rId18"/>
+    <p:sldId id="273" r:id="rId19"/>
+    <p:sldId id="285" r:id="rId20"/>
   </p:sldIdLst>
   <p:sldSz cx="12192000" cy="6858000"/>
   <p:notesSz cx="6858000" cy="9144000"/>
@@ -133,6 +131,18 @@
     </p:ext>
   </p:extLst>
 </p:presentation>
+</file>
+
+<file path=ppt/commentAuthors.xml><?xml version="1.0" encoding="utf-8"?>
+<p:cmAuthorLst xmlns:a="http://schemas.openxmlformats.org/drawingml/2006/main" xmlns:r="http://schemas.openxmlformats.org/officeDocument/2006/relationships" xmlns:p="http://schemas.openxmlformats.org/presentationml/2006/main">
+  <p:cmAuthor id="1" name="Sean Feldman" initials="SF" lastIdx="1" clrIdx="0">
+    <p:extLst>
+      <p:ext uri="{19B8F6BF-5375-455C-9EA6-DF929625EA0E}">
+        <p15:presenceInfo xmlns:p15="http://schemas.microsoft.com/office/powerpoint/2012/main" userId="c0f75423fe67f72e" providerId="Windows Live"/>
+      </p:ext>
+    </p:extLst>
+  </p:cmAuthor>
+</p:cmAuthorLst>
 </file>
 
 <file path=ppt/diagrams/colors1.xml><?xml version="1.0" encoding="utf-8"?>
@@ -2547,12 +2557,12 @@
   </dgm:ptLst>
   <dgm:cxnLst>
     <dgm:cxn modelId="{31B5DD48-4152-44C0-ABEF-BBAFB9A08042}" type="presOf" srcId="{BBBFBAB7-1262-46B5-A857-5DDCD7F75AEE}" destId="{8D59F236-B5EC-4A03-9AB2-D83FB6B5B6CF}" srcOrd="0" destOrd="0" presId="urn:microsoft.com/office/officeart/2005/8/layout/radial3"/>
+    <dgm:cxn modelId="{8AE07100-E4CA-434A-8A57-A4E85C2CEBE5}" type="presOf" srcId="{9845EE77-C277-49D0-B5B3-978267D746EF}" destId="{55EC9E6F-7538-45AE-B5C3-4D1C72619353}" srcOrd="0" destOrd="0" presId="urn:microsoft.com/office/officeart/2005/8/layout/radial3"/>
+    <dgm:cxn modelId="{C2A8FD47-D098-4F7E-977E-086ECA7FB15B}" type="presOf" srcId="{2AD1D386-9552-4D31-90A0-14145EEEB3A7}" destId="{0513E1FC-A9D7-45D4-839E-F54AEC13DAEF}" srcOrd="0" destOrd="0" presId="urn:microsoft.com/office/officeart/2005/8/layout/radial3"/>
     <dgm:cxn modelId="{7AD6620E-4701-4020-B0C0-29A0E643ED66}" type="presOf" srcId="{DD98920A-75BB-4535-99C2-3B6192F4BDE4}" destId="{CEE31ECD-6A4C-4081-92F5-74C8C74089D7}" srcOrd="0" destOrd="0" presId="urn:microsoft.com/office/officeart/2005/8/layout/radial3"/>
     <dgm:cxn modelId="{B30CCB67-E35E-448C-88E9-C58B05A147F0}" srcId="{2AD1D386-9552-4D31-90A0-14145EEEB3A7}" destId="{BBBFBAB7-1262-46B5-A857-5DDCD7F75AEE}" srcOrd="1" destOrd="0" parTransId="{4A295D89-0A9D-4040-A707-480827CD1601}" sibTransId="{F7E73100-A756-448C-9FEB-9673AD43C3B8}"/>
-    <dgm:cxn modelId="{C2A8FD47-D098-4F7E-977E-086ECA7FB15B}" type="presOf" srcId="{2AD1D386-9552-4D31-90A0-14145EEEB3A7}" destId="{0513E1FC-A9D7-45D4-839E-F54AEC13DAEF}" srcOrd="0" destOrd="0" presId="urn:microsoft.com/office/officeart/2005/8/layout/radial3"/>
     <dgm:cxn modelId="{15BADC4C-0883-4E6F-A040-9BE138709082}" srcId="{2AD1D386-9552-4D31-90A0-14145EEEB3A7}" destId="{9845EE77-C277-49D0-B5B3-978267D746EF}" srcOrd="0" destOrd="0" parTransId="{6BB9C052-FC70-4C77-BC89-4F26FD6D4A8A}" sibTransId="{114D12E3-F029-4039-9295-646C0E49CDCE}"/>
     <dgm:cxn modelId="{9797345E-12DE-4E7A-9D3C-A3EF13A6F44E}" srcId="{DD98920A-75BB-4535-99C2-3B6192F4BDE4}" destId="{2AD1D386-9552-4D31-90A0-14145EEEB3A7}" srcOrd="0" destOrd="0" parTransId="{5B23A33C-0C0F-48B2-894A-DA5D6FFD4B32}" sibTransId="{216D903F-033B-4178-BC40-B3077AB87104}"/>
-    <dgm:cxn modelId="{8AE07100-E4CA-434A-8A57-A4E85C2CEBE5}" type="presOf" srcId="{9845EE77-C277-49D0-B5B3-978267D746EF}" destId="{55EC9E6F-7538-45AE-B5C3-4D1C72619353}" srcOrd="0" destOrd="0" presId="urn:microsoft.com/office/officeart/2005/8/layout/radial3"/>
     <dgm:cxn modelId="{AE94C16F-D7D2-4C91-9013-87417F59A81A}" type="presParOf" srcId="{CEE31ECD-6A4C-4081-92F5-74C8C74089D7}" destId="{09544157-A78F-43B6-9028-DF2F5F424FDC}" srcOrd="0" destOrd="0" presId="urn:microsoft.com/office/officeart/2005/8/layout/radial3"/>
     <dgm:cxn modelId="{65775B0D-E181-4937-ACC9-9294BAED3E26}" type="presParOf" srcId="{09544157-A78F-43B6-9028-DF2F5F424FDC}" destId="{0513E1FC-A9D7-45D4-839E-F54AEC13DAEF}" srcOrd="0" destOrd="0" presId="urn:microsoft.com/office/officeart/2005/8/layout/radial3"/>
     <dgm:cxn modelId="{8544EA10-0BD7-44BD-9162-B9A574192870}" type="presParOf" srcId="{09544157-A78F-43B6-9028-DF2F5F424FDC}" destId="{55EC9E6F-7538-45AE-B5C3-4D1C72619353}" srcOrd="1" destOrd="0" presId="urn:microsoft.com/office/officeart/2005/8/layout/radial3"/>
@@ -2982,7 +2992,7 @@
         </a:bodyPr>
         <a:lstStyle/>
         <a:p>
-          <a:pPr lvl="0" algn="ctr" defTabSz="800100">
+          <a:pPr marL="0" lvl="0" indent="0" algn="ctr" defTabSz="800100">
             <a:lnSpc>
               <a:spcPct val="90000"/>
             </a:lnSpc>
@@ -2992,6 +3002,7 @@
             <a:spcAft>
               <a:spcPct val="35000"/>
             </a:spcAft>
+            <a:buNone/>
           </a:pPr>
           <a:r>
             <a:rPr lang="en-US" sz="1800" kern="1200" dirty="0" err="1"/>
@@ -3052,12 +3063,12 @@
         </a:fontRef>
       </dsp:style>
       <dsp:txBody>
-        <a:bodyPr spcFirstLastPara="0" vert="horz" wrap="square" lIns="82550" tIns="82550" rIns="82550" bIns="82550" numCol="1" spcCol="1270" anchor="ctr" anchorCtr="0">
+        <a:bodyPr spcFirstLastPara="0" vert="horz" wrap="square" lIns="22860" tIns="22860" rIns="22860" bIns="22860" numCol="1" spcCol="1270" anchor="ctr" anchorCtr="0">
           <a:noAutofit/>
         </a:bodyPr>
         <a:lstStyle/>
         <a:p>
-          <a:pPr lvl="0" algn="ctr" defTabSz="2889250">
+          <a:pPr marL="0" lvl="0" indent="0" algn="ctr" defTabSz="800100">
             <a:lnSpc>
               <a:spcPct val="90000"/>
             </a:lnSpc>
@@ -3067,8 +3078,9 @@
             <a:spcAft>
               <a:spcPct val="35000"/>
             </a:spcAft>
+            <a:buNone/>
           </a:pPr>
-          <a:endParaRPr lang="en-US" sz="6500" kern="1200" dirty="0"/>
+          <a:endParaRPr lang="en-US" sz="1800" kern="1200" dirty="0"/>
         </a:p>
       </dsp:txBody>
       <dsp:txXfrm>
@@ -3123,12 +3135,12 @@
         </a:fontRef>
       </dsp:style>
       <dsp:txBody>
-        <a:bodyPr spcFirstLastPara="0" vert="horz" wrap="square" lIns="82550" tIns="82550" rIns="82550" bIns="82550" numCol="1" spcCol="1270" anchor="ctr" anchorCtr="0">
+        <a:bodyPr spcFirstLastPara="0" vert="horz" wrap="square" lIns="22860" tIns="22860" rIns="22860" bIns="22860" numCol="1" spcCol="1270" anchor="ctr" anchorCtr="0">
           <a:noAutofit/>
         </a:bodyPr>
         <a:lstStyle/>
         <a:p>
-          <a:pPr lvl="0" algn="ctr" defTabSz="2889250">
+          <a:pPr marL="0" lvl="0" indent="0" algn="ctr" defTabSz="800100">
             <a:lnSpc>
               <a:spcPct val="90000"/>
             </a:lnSpc>
@@ -3138,8 +3150,9 @@
             <a:spcAft>
               <a:spcPct val="35000"/>
             </a:spcAft>
+            <a:buNone/>
           </a:pPr>
-          <a:endParaRPr lang="en-US" sz="6500" kern="1200" dirty="0"/>
+          <a:endParaRPr lang="en-US" sz="1800" kern="1200" dirty="0"/>
         </a:p>
       </dsp:txBody>
       <dsp:txXfrm>
@@ -3215,7 +3228,7 @@
         </a:bodyPr>
         <a:lstStyle/>
         <a:p>
-          <a:pPr lvl="0" algn="ctr" defTabSz="711200">
+          <a:pPr marL="0" lvl="0" indent="0" algn="ctr" defTabSz="711200">
             <a:lnSpc>
               <a:spcPct val="90000"/>
             </a:lnSpc>
@@ -3225,6 +3238,7 @@
             <a:spcAft>
               <a:spcPct val="35000"/>
             </a:spcAft>
+            <a:buNone/>
           </a:pPr>
           <a:r>
             <a:rPr lang="en-US" sz="1600" kern="1200" dirty="0" err="1"/>
@@ -3290,7 +3304,7 @@
         </a:bodyPr>
         <a:lstStyle/>
         <a:p>
-          <a:pPr lvl="0" algn="ctr" defTabSz="711200">
+          <a:pPr marL="0" lvl="0" indent="0" algn="ctr" defTabSz="711200">
             <a:lnSpc>
               <a:spcPct val="90000"/>
             </a:lnSpc>
@@ -3300,12 +3314,13 @@
             <a:spcAft>
               <a:spcPct val="35000"/>
             </a:spcAft>
+            <a:buNone/>
           </a:pPr>
           <a:endParaRPr lang="en-US" sz="1600" kern="1200" dirty="0"/>
         </a:p>
       </dsp:txBody>
       <dsp:txXfrm>
-        <a:off x="756804" y="322923"/>
+        <a:off x="737541" y="343074"/>
         <a:ext cx="2430421" cy="2338018"/>
       </dsp:txXfrm>
     </dsp:sp>
@@ -3361,7 +3376,7 @@
         </a:bodyPr>
         <a:lstStyle/>
         <a:p>
-          <a:pPr lvl="0" algn="ctr" defTabSz="711200">
+          <a:pPr marL="0" lvl="0" indent="0" algn="ctr" defTabSz="711200">
             <a:lnSpc>
               <a:spcPct val="90000"/>
             </a:lnSpc>
@@ -3371,12 +3386,13 @@
             <a:spcAft>
               <a:spcPct val="35000"/>
             </a:spcAft>
+            <a:buNone/>
           </a:pPr>
           <a:endParaRPr lang="en-US" sz="1600" kern="1200" dirty="0"/>
         </a:p>
       </dsp:txBody>
       <dsp:txXfrm>
-        <a:off x="736033" y="1502455"/>
+        <a:off x="744151" y="1521536"/>
         <a:ext cx="2381718" cy="2381718"/>
       </dsp:txXfrm>
     </dsp:sp>
@@ -3429,7 +3445,7 @@
         </a:bodyPr>
         <a:lstStyle/>
         <a:p>
-          <a:pPr lvl="0" algn="ctr" defTabSz="844550">
+          <a:pPr marL="0" lvl="0" indent="0" algn="ctr" defTabSz="844550">
             <a:lnSpc>
               <a:spcPct val="90000"/>
             </a:lnSpc>
@@ -3439,6 +3455,7 @@
             <a:spcAft>
               <a:spcPct val="35000"/>
             </a:spcAft>
+            <a:buNone/>
           </a:pPr>
           <a:r>
             <a:rPr lang="en-US" sz="1900" kern="1200" dirty="0"/>
@@ -3549,7 +3566,7 @@
         </a:bodyPr>
         <a:lstStyle/>
         <a:p>
-          <a:pPr lvl="0" algn="ctr" defTabSz="844550">
+          <a:pPr marL="0" lvl="0" indent="0" algn="ctr" defTabSz="844550">
             <a:lnSpc>
               <a:spcPct val="90000"/>
             </a:lnSpc>
@@ -3559,6 +3576,7 @@
             <a:spcAft>
               <a:spcPct val="35000"/>
             </a:spcAft>
+            <a:buNone/>
           </a:pPr>
           <a:r>
             <a:rPr lang="en-US" sz="1900" kern="1200" dirty="0"/>
@@ -12559,7 +12577,7 @@
               <a:pPr algn="ctr"/>
               <a:r>
                 <a:rPr lang="en-CA" sz="2000" b="1" dirty="0">
-                  <a:hlinkClick r:id="rId2" action="ppaction://program"/>
+                  <a:hlinkClick r:id="rId4" action="ppaction://program"/>
                 </a:rPr>
                 <a:t>Demo</a:t>
               </a:r>
@@ -13197,1770 +13215,6 @@
                   <a:schemeClr val="bg1"/>
                 </a:solidFill>
               </a:rPr>
-              <a:t>Sending Properties</a:t>
-            </a:r>
-          </a:p>
-        </p:txBody>
-      </p:sp>
-      <p:graphicFrame>
-        <p:nvGraphicFramePr>
-          <p:cNvPr id="4" name="Table 3"/>
-          <p:cNvGraphicFramePr>
-            <a:graphicFrameLocks noGrp="1"/>
-          </p:cNvGraphicFramePr>
-          <p:nvPr>
-            <p:extLst>
-              <p:ext uri="{D42A27DB-BD31-4B8C-83A1-F6EECF244321}">
-                <p14:modId xmlns:p14="http://schemas.microsoft.com/office/powerpoint/2010/main" val="830970044"/>
-              </p:ext>
-            </p:extLst>
-          </p:nvPr>
-        </p:nvGraphicFramePr>
-        <p:xfrm>
-          <a:off x="237672" y="1487109"/>
-          <a:ext cx="11752941" cy="370840"/>
-        </p:xfrm>
-        <a:graphic>
-          <a:graphicData uri="http://schemas.openxmlformats.org/drawingml/2006/table">
-            <a:tbl>
-              <a:tblPr firstRow="1" bandRow="1">
-                <a:tableStyleId>{5C22544A-7EE6-4342-B048-85BDC9FD1C3A}</a:tableStyleId>
-              </a:tblPr>
-              <a:tblGrid>
-                <a:gridCol w="4301671">
-                  <a:extLst>
-                    <a:ext uri="{9D8B030D-6E8A-4147-A177-3AD203B41FA5}">
-                      <a16:colId xmlns:a16="http://schemas.microsoft.com/office/drawing/2014/main" val="1699504934"/>
-                    </a:ext>
-                  </a:extLst>
-                </a:gridCol>
-                <a:gridCol w="7451270">
-                  <a:extLst>
-                    <a:ext uri="{9D8B030D-6E8A-4147-A177-3AD203B41FA5}">
-                      <a16:colId xmlns:a16="http://schemas.microsoft.com/office/drawing/2014/main" val="92080481"/>
-                    </a:ext>
-                  </a:extLst>
-                </a:gridCol>
-              </a:tblGrid>
-              <a:tr h="370840">
-                <a:tc>
-                  <a:txBody>
-                    <a:bodyPr/>
-                    <a:lstStyle/>
-                    <a:p>
-                      <a:r>
-                        <a:rPr lang="en-CA" dirty="0"/>
-                        <a:t>Property</a:t>
-                      </a:r>
-                    </a:p>
-                  </a:txBody>
-                  <a:tcPr/>
-                </a:tc>
-                <a:tc>
-                  <a:txBody>
-                    <a:bodyPr/>
-                    <a:lstStyle/>
-                    <a:p>
-                      <a:pPr algn="l"/>
-                      <a:r>
-                        <a:rPr lang="en-CA" dirty="0"/>
-                        <a:t>Description</a:t>
-                      </a:r>
-                    </a:p>
-                  </a:txBody>
-                  <a:tcPr/>
-                </a:tc>
-                <a:extLst>
-                  <a:ext uri="{0D108BD9-81ED-4DB2-BD59-A6C34878D82A}">
-                    <a16:rowId xmlns:a16="http://schemas.microsoft.com/office/drawing/2014/main" val="1248774390"/>
-                  </a:ext>
-                </a:extLst>
-              </a:tr>
-            </a:tbl>
-          </a:graphicData>
-        </a:graphic>
-      </p:graphicFrame>
-      <p:graphicFrame>
-        <p:nvGraphicFramePr>
-          <p:cNvPr id="5" name="Table 4"/>
-          <p:cNvGraphicFramePr>
-            <a:graphicFrameLocks noGrp="1"/>
-          </p:cNvGraphicFramePr>
-          <p:nvPr>
-            <p:extLst>
-              <p:ext uri="{D42A27DB-BD31-4B8C-83A1-F6EECF244321}">
-                <p14:modId xmlns:p14="http://schemas.microsoft.com/office/powerpoint/2010/main" val="2189557593"/>
-              </p:ext>
-            </p:extLst>
-          </p:nvPr>
-        </p:nvGraphicFramePr>
-        <p:xfrm>
-          <a:off x="237672" y="1857949"/>
-          <a:ext cx="11752941" cy="640080"/>
-        </p:xfrm>
-        <a:graphic>
-          <a:graphicData uri="http://schemas.openxmlformats.org/drawingml/2006/table">
-            <a:tbl>
-              <a:tblPr firstRow="1" bandRow="1">
-                <a:tableStyleId>{BC89EF96-8CEA-46FF-86C4-4CE0E7609802}</a:tableStyleId>
-              </a:tblPr>
-              <a:tblGrid>
-                <a:gridCol w="4307114">
-                  <a:extLst>
-                    <a:ext uri="{9D8B030D-6E8A-4147-A177-3AD203B41FA5}">
-                      <a16:colId xmlns:a16="http://schemas.microsoft.com/office/drawing/2014/main" val="3207723062"/>
-                    </a:ext>
-                  </a:extLst>
-                </a:gridCol>
-                <a:gridCol w="7445827">
-                  <a:extLst>
-                    <a:ext uri="{9D8B030D-6E8A-4147-A177-3AD203B41FA5}">
-                      <a16:colId xmlns:a16="http://schemas.microsoft.com/office/drawing/2014/main" val="1658324364"/>
-                    </a:ext>
-                  </a:extLst>
-                </a:gridCol>
-              </a:tblGrid>
-              <a:tr h="370840">
-                <a:tc>
-                  <a:txBody>
-                    <a:bodyPr/>
-                    <a:lstStyle/>
-                    <a:p>
-                      <a:r>
-                        <a:rPr lang="en-CA" dirty="0" err="1"/>
-                        <a:t>DefaultMessageTimeToLive</a:t>
-                      </a:r>
-                      <a:endParaRPr lang="en-CA" dirty="0"/>
-                    </a:p>
-                  </a:txBody>
-                  <a:tcPr/>
-                </a:tc>
-                <a:tc>
-                  <a:txBody>
-                    <a:bodyPr/>
-                    <a:lstStyle/>
-                    <a:p>
-                      <a:r>
-                        <a:rPr lang="en-US" sz="1800" b="1" kern="1200" dirty="0">
-                          <a:solidFill>
-                            <a:schemeClr val="tx1"/>
-                          </a:solidFill>
-                          <a:effectLst/>
-                          <a:latin typeface="+mn-lt"/>
-                          <a:ea typeface="+mn-ea"/>
-                          <a:cs typeface="+mn-cs"/>
-                        </a:rPr>
-                        <a:t>Specifies the time that </a:t>
-                      </a:r>
-                      <a:r>
-                        <a:rPr lang="en-US" sz="1800" b="1" kern="1200" dirty="0" err="1">
-                          <a:solidFill>
-                            <a:schemeClr val="tx1"/>
-                          </a:solidFill>
-                          <a:effectLst/>
-                          <a:latin typeface="+mn-lt"/>
-                          <a:ea typeface="+mn-ea"/>
-                          <a:cs typeface="+mn-cs"/>
-                        </a:rPr>
-                        <a:t>enqueue</a:t>
-                      </a:r>
-                      <a:r>
-                        <a:rPr lang="en-US" sz="1800" b="1" kern="1200" dirty="0">
-                          <a:solidFill>
-                            <a:schemeClr val="tx1"/>
-                          </a:solidFill>
-                          <a:effectLst/>
-                          <a:latin typeface="+mn-lt"/>
-                          <a:ea typeface="+mn-ea"/>
-                          <a:cs typeface="+mn-cs"/>
-                        </a:rPr>
-                        <a:t> messages will be valid for before expiring if not explicitly specified in the message properties. </a:t>
-                      </a:r>
-                    </a:p>
-                  </a:txBody>
-                  <a:tcPr/>
-                </a:tc>
-                <a:extLst>
-                  <a:ext uri="{0D108BD9-81ED-4DB2-BD59-A6C34878D82A}">
-                    <a16:rowId xmlns:a16="http://schemas.microsoft.com/office/drawing/2014/main" val="3125305022"/>
-                  </a:ext>
-                </a:extLst>
-              </a:tr>
-            </a:tbl>
-          </a:graphicData>
-        </a:graphic>
-      </p:graphicFrame>
-      <p:graphicFrame>
-        <p:nvGraphicFramePr>
-          <p:cNvPr id="6" name="Table 5"/>
-          <p:cNvGraphicFramePr>
-            <a:graphicFrameLocks noGrp="1"/>
-          </p:cNvGraphicFramePr>
-          <p:nvPr>
-            <p:extLst>
-              <p:ext uri="{D42A27DB-BD31-4B8C-83A1-F6EECF244321}">
-                <p14:modId xmlns:p14="http://schemas.microsoft.com/office/powerpoint/2010/main" val="490455702"/>
-              </p:ext>
-            </p:extLst>
-          </p:nvPr>
-        </p:nvGraphicFramePr>
-        <p:xfrm>
-          <a:off x="237672" y="2507221"/>
-          <a:ext cx="11752941" cy="370840"/>
-        </p:xfrm>
-        <a:graphic>
-          <a:graphicData uri="http://schemas.openxmlformats.org/drawingml/2006/table">
-            <a:tbl>
-              <a:tblPr firstRow="1" bandRow="1">
-                <a:tableStyleId>{BC89EF96-8CEA-46FF-86C4-4CE0E7609802}</a:tableStyleId>
-              </a:tblPr>
-              <a:tblGrid>
-                <a:gridCol w="4307114">
-                  <a:extLst>
-                    <a:ext uri="{9D8B030D-6E8A-4147-A177-3AD203B41FA5}">
-                      <a16:colId xmlns:a16="http://schemas.microsoft.com/office/drawing/2014/main" val="1091211104"/>
-                    </a:ext>
-                  </a:extLst>
-                </a:gridCol>
-                <a:gridCol w="7445827">
-                  <a:extLst>
-                    <a:ext uri="{9D8B030D-6E8A-4147-A177-3AD203B41FA5}">
-                      <a16:colId xmlns:a16="http://schemas.microsoft.com/office/drawing/2014/main" val="1150722414"/>
-                    </a:ext>
-                  </a:extLst>
-                </a:gridCol>
-              </a:tblGrid>
-              <a:tr h="370840">
-                <a:tc>
-                  <a:txBody>
-                    <a:bodyPr/>
-                    <a:lstStyle/>
-                    <a:p>
-                      <a:r>
-                        <a:rPr lang="en-CA" dirty="0" err="1"/>
-                        <a:t>RequiredDuplicationDetection</a:t>
-                      </a:r>
-                      <a:endParaRPr lang="en-CA" dirty="0"/>
-                    </a:p>
-                  </a:txBody>
-                  <a:tcPr>
-                    <a:solidFill>
-                      <a:schemeClr val="accent1">
-                        <a:lumMod val="40000"/>
-                        <a:lumOff val="60000"/>
-                      </a:schemeClr>
-                    </a:solidFill>
-                  </a:tcPr>
-                </a:tc>
-                <a:tc>
-                  <a:txBody>
-                    <a:bodyPr/>
-                    <a:lstStyle/>
-                    <a:p>
-                      <a:pPr algn="l"/>
-                      <a:r>
-                        <a:rPr lang="en-US" sz="1800" b="1" kern="1200" dirty="0">
-                          <a:solidFill>
-                            <a:schemeClr val="tx1"/>
-                          </a:solidFill>
-                          <a:effectLst/>
-                          <a:latin typeface="+mn-lt"/>
-                          <a:ea typeface="+mn-ea"/>
-                          <a:cs typeface="+mn-cs"/>
-                        </a:rPr>
-                        <a:t>Specifies if messages sent with the same message ID will be ignored.</a:t>
-                      </a:r>
-                      <a:endParaRPr lang="en-CA" dirty="0"/>
-                    </a:p>
-                  </a:txBody>
-                  <a:tcPr>
-                    <a:solidFill>
-                      <a:schemeClr val="accent1">
-                        <a:lumMod val="40000"/>
-                        <a:lumOff val="60000"/>
-                      </a:schemeClr>
-                    </a:solidFill>
-                  </a:tcPr>
-                </a:tc>
-                <a:extLst>
-                  <a:ext uri="{0D108BD9-81ED-4DB2-BD59-A6C34878D82A}">
-                    <a16:rowId xmlns:a16="http://schemas.microsoft.com/office/drawing/2014/main" val="370781235"/>
-                  </a:ext>
-                </a:extLst>
-              </a:tr>
-            </a:tbl>
-          </a:graphicData>
-        </a:graphic>
-      </p:graphicFrame>
-      <p:graphicFrame>
-        <p:nvGraphicFramePr>
-          <p:cNvPr id="7" name="Table 6"/>
-          <p:cNvGraphicFramePr>
-            <a:graphicFrameLocks noGrp="1"/>
-          </p:cNvGraphicFramePr>
-          <p:nvPr>
-            <p:extLst>
-              <p:ext uri="{D42A27DB-BD31-4B8C-83A1-F6EECF244321}">
-                <p14:modId xmlns:p14="http://schemas.microsoft.com/office/powerpoint/2010/main" val="3663122908"/>
-              </p:ext>
-            </p:extLst>
-          </p:nvPr>
-        </p:nvGraphicFramePr>
-        <p:xfrm>
-          <a:off x="237672" y="2888586"/>
-          <a:ext cx="11752941" cy="370840"/>
-        </p:xfrm>
-        <a:graphic>
-          <a:graphicData uri="http://schemas.openxmlformats.org/drawingml/2006/table">
-            <a:tbl>
-              <a:tblPr firstRow="1" bandRow="1">
-                <a:tableStyleId>{BC89EF96-8CEA-46FF-86C4-4CE0E7609802}</a:tableStyleId>
-              </a:tblPr>
-              <a:tblGrid>
-                <a:gridCol w="4312557">
-                  <a:extLst>
-                    <a:ext uri="{9D8B030D-6E8A-4147-A177-3AD203B41FA5}">
-                      <a16:colId xmlns:a16="http://schemas.microsoft.com/office/drawing/2014/main" val="1091211104"/>
-                    </a:ext>
-                  </a:extLst>
-                </a:gridCol>
-                <a:gridCol w="7440384">
-                  <a:extLst>
-                    <a:ext uri="{9D8B030D-6E8A-4147-A177-3AD203B41FA5}">
-                      <a16:colId xmlns:a16="http://schemas.microsoft.com/office/drawing/2014/main" val="1150722414"/>
-                    </a:ext>
-                  </a:extLst>
-                </a:gridCol>
-              </a:tblGrid>
-              <a:tr h="370840">
-                <a:tc>
-                  <a:txBody>
-                    <a:bodyPr/>
-                    <a:lstStyle/>
-                    <a:p>
-                      <a:r>
-                        <a:rPr lang="en-CA" dirty="0" err="1"/>
-                        <a:t>DuplicateDetectionTimeHistoryWindows</a:t>
-                      </a:r>
-                      <a:endParaRPr lang="en-CA" dirty="0"/>
-                    </a:p>
-                  </a:txBody>
-                  <a:tcPr>
-                    <a:solidFill>
-                      <a:schemeClr val="bg1"/>
-                    </a:solidFill>
-                  </a:tcPr>
-                </a:tc>
-                <a:tc>
-                  <a:txBody>
-                    <a:bodyPr/>
-                    <a:lstStyle/>
-                    <a:p>
-                      <a:pPr algn="l"/>
-                      <a:r>
-                        <a:rPr lang="en-US" sz="1800" b="1" kern="1200" dirty="0">
-                          <a:solidFill>
-                            <a:schemeClr val="tx1"/>
-                          </a:solidFill>
-                          <a:effectLst/>
-                          <a:latin typeface="+mn-lt"/>
-                          <a:ea typeface="+mn-ea"/>
-                          <a:cs typeface="+mn-cs"/>
-                        </a:rPr>
-                        <a:t>Duration to store message ID values for duplicate detection.</a:t>
-                      </a:r>
-                      <a:endParaRPr lang="en-CA" dirty="0"/>
-                    </a:p>
-                  </a:txBody>
-                  <a:tcPr>
-                    <a:solidFill>
-                      <a:schemeClr val="bg1"/>
-                    </a:solidFill>
-                  </a:tcPr>
-                </a:tc>
-                <a:extLst>
-                  <a:ext uri="{0D108BD9-81ED-4DB2-BD59-A6C34878D82A}">
-                    <a16:rowId xmlns:a16="http://schemas.microsoft.com/office/drawing/2014/main" val="370781235"/>
-                  </a:ext>
-                </a:extLst>
-              </a:tr>
-            </a:tbl>
-          </a:graphicData>
-        </a:graphic>
-      </p:graphicFrame>
-      <p:graphicFrame>
-        <p:nvGraphicFramePr>
-          <p:cNvPr id="8" name="Table 7"/>
-          <p:cNvGraphicFramePr>
-            <a:graphicFrameLocks noGrp="1"/>
-          </p:cNvGraphicFramePr>
-          <p:nvPr>
-            <p:extLst>
-              <p:ext uri="{D42A27DB-BD31-4B8C-83A1-F6EECF244321}">
-                <p14:modId xmlns:p14="http://schemas.microsoft.com/office/powerpoint/2010/main" val="2671864297"/>
-              </p:ext>
-            </p:extLst>
-          </p:nvPr>
-        </p:nvGraphicFramePr>
-        <p:xfrm>
-          <a:off x="237671" y="3259426"/>
-          <a:ext cx="11752941" cy="370840"/>
-        </p:xfrm>
-        <a:graphic>
-          <a:graphicData uri="http://schemas.openxmlformats.org/drawingml/2006/table">
-            <a:tbl>
-              <a:tblPr firstRow="1" bandRow="1">
-                <a:tableStyleId>{BC89EF96-8CEA-46FF-86C4-4CE0E7609802}</a:tableStyleId>
-              </a:tblPr>
-              <a:tblGrid>
-                <a:gridCol w="4307114">
-                  <a:extLst>
-                    <a:ext uri="{9D8B030D-6E8A-4147-A177-3AD203B41FA5}">
-                      <a16:colId xmlns:a16="http://schemas.microsoft.com/office/drawing/2014/main" val="3104330619"/>
-                    </a:ext>
-                  </a:extLst>
-                </a:gridCol>
-                <a:gridCol w="7445827">
-                  <a:extLst>
-                    <a:ext uri="{9D8B030D-6E8A-4147-A177-3AD203B41FA5}">
-                      <a16:colId xmlns:a16="http://schemas.microsoft.com/office/drawing/2014/main" val="4204515562"/>
-                    </a:ext>
-                  </a:extLst>
-                </a:gridCol>
-              </a:tblGrid>
-              <a:tr h="370840">
-                <a:tc>
-                  <a:txBody>
-                    <a:bodyPr/>
-                    <a:lstStyle/>
-                    <a:p>
-                      <a:r>
-                        <a:rPr lang="en-CA" dirty="0" err="1"/>
-                        <a:t>MaxSizeInMegabytes</a:t>
-                      </a:r>
-                      <a:endParaRPr lang="en-CA" dirty="0"/>
-                    </a:p>
-                  </a:txBody>
-                  <a:tcPr>
-                    <a:solidFill>
-                      <a:schemeClr val="accent1">
-                        <a:lumMod val="40000"/>
-                        <a:lumOff val="60000"/>
-                      </a:schemeClr>
-                    </a:solidFill>
-                  </a:tcPr>
-                </a:tc>
-                <a:tc>
-                  <a:txBody>
-                    <a:bodyPr/>
-                    <a:lstStyle/>
-                    <a:p>
-                      <a:pPr algn="l"/>
-                      <a:r>
-                        <a:rPr lang="en-US" sz="1800" b="1" kern="1200" dirty="0">
-                          <a:solidFill>
-                            <a:schemeClr val="tx1"/>
-                          </a:solidFill>
-                          <a:effectLst/>
-                          <a:latin typeface="+mn-lt"/>
-                          <a:ea typeface="+mn-ea"/>
-                          <a:cs typeface="+mn-cs"/>
-                        </a:rPr>
-                        <a:t>Specifies the storage capacity of the entity.</a:t>
-                      </a:r>
-                      <a:endParaRPr lang="en-CA" dirty="0"/>
-                    </a:p>
-                  </a:txBody>
-                  <a:tcPr>
-                    <a:solidFill>
-                      <a:schemeClr val="accent1">
-                        <a:lumMod val="40000"/>
-                        <a:lumOff val="60000"/>
-                      </a:schemeClr>
-                    </a:solidFill>
-                  </a:tcPr>
-                </a:tc>
-                <a:extLst>
-                  <a:ext uri="{0D108BD9-81ED-4DB2-BD59-A6C34878D82A}">
-                    <a16:rowId xmlns:a16="http://schemas.microsoft.com/office/drawing/2014/main" val="1137435020"/>
-                  </a:ext>
-                </a:extLst>
-              </a:tr>
-            </a:tbl>
-          </a:graphicData>
-        </a:graphic>
-      </p:graphicFrame>
-      <p:grpSp>
-        <p:nvGrpSpPr>
-          <p:cNvPr id="9" name="Group 8"/>
-          <p:cNvGrpSpPr/>
-          <p:nvPr/>
-        </p:nvGrpSpPr>
-        <p:grpSpPr>
-          <a:xfrm>
-            <a:off x="5553149" y="6041570"/>
-            <a:ext cx="1085702" cy="684439"/>
-            <a:chOff x="5553149" y="6041570"/>
-            <a:chExt cx="1085702" cy="684439"/>
-          </a:xfrm>
-        </p:grpSpPr>
-        <p:pic>
-          <p:nvPicPr>
-            <p:cNvPr id="10" name="Picture 9">
-              <a:hlinkClick r:id="rId2" action="ppaction://program"/>
-            </p:cNvPr>
-            <p:cNvPicPr>
-              <a:picLocks noChangeAspect="1"/>
-            </p:cNvPicPr>
-            <p:nvPr/>
-          </p:nvPicPr>
-          <p:blipFill>
-            <a:blip r:embed="rId3"/>
-            <a:stretch>
-              <a:fillRect/>
-            </a:stretch>
-          </p:blipFill>
-          <p:spPr>
-            <a:xfrm>
-              <a:off x="5553149" y="6041570"/>
-              <a:ext cx="1085702" cy="684439"/>
-            </a:xfrm>
-            <a:prstGeom prst="rect">
-              <a:avLst/>
-            </a:prstGeom>
-          </p:spPr>
-        </p:pic>
-        <p:sp>
-          <p:nvSpPr>
-            <p:cNvPr id="11" name="TextBox 10"/>
-            <p:cNvSpPr txBox="1"/>
-            <p:nvPr/>
-          </p:nvSpPr>
-          <p:spPr>
-            <a:xfrm>
-              <a:off x="5671457" y="6237515"/>
-              <a:ext cx="849086" cy="400110"/>
-            </a:xfrm>
-            <a:prstGeom prst="rect">
-              <a:avLst/>
-            </a:prstGeom>
-            <a:noFill/>
-          </p:spPr>
-          <p:txBody>
-            <a:bodyPr wrap="square" rtlCol="0">
-              <a:spAutoFit/>
-            </a:bodyPr>
-            <a:lstStyle/>
-            <a:p>
-              <a:pPr algn="ctr"/>
-              <a:r>
-                <a:rPr lang="en-CA" sz="2000" b="1" dirty="0">
-                  <a:hlinkClick r:id="rId2" action="ppaction://program"/>
-                </a:rPr>
-                <a:t>Demo</a:t>
-              </a:r>
-              <a:endParaRPr lang="en-CA" b="1" dirty="0"/>
-            </a:p>
-          </p:txBody>
-        </p:sp>
-      </p:grpSp>
-    </p:spTree>
-    <p:extLst>
-      <p:ext uri="{BB962C8B-B14F-4D97-AF65-F5344CB8AC3E}">
-        <p14:creationId xmlns:p14="http://schemas.microsoft.com/office/powerpoint/2010/main" val="217091789"/>
-      </p:ext>
-    </p:extLst>
-  </p:cSld>
-  <p:clrMapOvr>
-    <a:masterClrMapping/>
-  </p:clrMapOvr>
-  <p:timing>
-    <p:tnLst>
-      <p:par>
-        <p:cTn id="1" dur="indefinite" restart="never" nodeType="tmRoot">
-          <p:childTnLst>
-            <p:seq concurrent="1" nextAc="seek">
-              <p:cTn id="2" dur="indefinite" nodeType="mainSeq">
-                <p:childTnLst>
-                  <p:par>
-                    <p:cTn id="3" fill="hold">
-                      <p:stCondLst>
-                        <p:cond delay="indefinite"/>
-                      </p:stCondLst>
-                      <p:childTnLst>
-                        <p:par>
-                          <p:cTn id="4" fill="hold">
-                            <p:stCondLst>
-                              <p:cond delay="0"/>
-                            </p:stCondLst>
-                            <p:childTnLst>
-                              <p:par>
-                                <p:cTn id="5" presetID="1" presetClass="entr" presetSubtype="0" fill="hold" nodeType="clickEffect">
-                                  <p:stCondLst>
-                                    <p:cond delay="0"/>
-                                  </p:stCondLst>
-                                  <p:childTnLst>
-                                    <p:set>
-                                      <p:cBhvr>
-                                        <p:cTn id="6" dur="1" fill="hold">
-                                          <p:stCondLst>
-                                            <p:cond delay="0"/>
-                                          </p:stCondLst>
-                                        </p:cTn>
-                                        <p:tgtEl>
-                                          <p:spTgt spid="5"/>
-                                        </p:tgtEl>
-                                        <p:attrNameLst>
-                                          <p:attrName>style.visibility</p:attrName>
-                                        </p:attrNameLst>
-                                      </p:cBhvr>
-                                      <p:to>
-                                        <p:strVal val="visible"/>
-                                      </p:to>
-                                    </p:set>
-                                  </p:childTnLst>
-                                </p:cTn>
-                              </p:par>
-                            </p:childTnLst>
-                          </p:cTn>
-                        </p:par>
-                      </p:childTnLst>
-                    </p:cTn>
-                  </p:par>
-                  <p:par>
-                    <p:cTn id="7" fill="hold">
-                      <p:stCondLst>
-                        <p:cond delay="indefinite"/>
-                      </p:stCondLst>
-                      <p:childTnLst>
-                        <p:par>
-                          <p:cTn id="8" fill="hold">
-                            <p:stCondLst>
-                              <p:cond delay="0"/>
-                            </p:stCondLst>
-                            <p:childTnLst>
-                              <p:par>
-                                <p:cTn id="9" presetID="1" presetClass="entr" presetSubtype="0" fill="hold" nodeType="clickEffect">
-                                  <p:stCondLst>
-                                    <p:cond delay="0"/>
-                                  </p:stCondLst>
-                                  <p:childTnLst>
-                                    <p:set>
-                                      <p:cBhvr>
-                                        <p:cTn id="10" dur="1" fill="hold">
-                                          <p:stCondLst>
-                                            <p:cond delay="0"/>
-                                          </p:stCondLst>
-                                        </p:cTn>
-                                        <p:tgtEl>
-                                          <p:spTgt spid="6"/>
-                                        </p:tgtEl>
-                                        <p:attrNameLst>
-                                          <p:attrName>style.visibility</p:attrName>
-                                        </p:attrNameLst>
-                                      </p:cBhvr>
-                                      <p:to>
-                                        <p:strVal val="visible"/>
-                                      </p:to>
-                                    </p:set>
-                                  </p:childTnLst>
-                                </p:cTn>
-                              </p:par>
-                            </p:childTnLst>
-                          </p:cTn>
-                        </p:par>
-                      </p:childTnLst>
-                    </p:cTn>
-                  </p:par>
-                  <p:par>
-                    <p:cTn id="11" fill="hold">
-                      <p:stCondLst>
-                        <p:cond delay="indefinite"/>
-                      </p:stCondLst>
-                      <p:childTnLst>
-                        <p:par>
-                          <p:cTn id="12" fill="hold">
-                            <p:stCondLst>
-                              <p:cond delay="0"/>
-                            </p:stCondLst>
-                            <p:childTnLst>
-                              <p:par>
-                                <p:cTn id="13" presetID="1" presetClass="entr" presetSubtype="0" fill="hold" nodeType="clickEffect">
-                                  <p:stCondLst>
-                                    <p:cond delay="0"/>
-                                  </p:stCondLst>
-                                  <p:childTnLst>
-                                    <p:set>
-                                      <p:cBhvr>
-                                        <p:cTn id="14" dur="1" fill="hold">
-                                          <p:stCondLst>
-                                            <p:cond delay="0"/>
-                                          </p:stCondLst>
-                                        </p:cTn>
-                                        <p:tgtEl>
-                                          <p:spTgt spid="7"/>
-                                        </p:tgtEl>
-                                        <p:attrNameLst>
-                                          <p:attrName>style.visibility</p:attrName>
-                                        </p:attrNameLst>
-                                      </p:cBhvr>
-                                      <p:to>
-                                        <p:strVal val="visible"/>
-                                      </p:to>
-                                    </p:set>
-                                  </p:childTnLst>
-                                </p:cTn>
-                              </p:par>
-                            </p:childTnLst>
-                          </p:cTn>
-                        </p:par>
-                      </p:childTnLst>
-                    </p:cTn>
-                  </p:par>
-                  <p:par>
-                    <p:cTn id="15" fill="hold">
-                      <p:stCondLst>
-                        <p:cond delay="indefinite"/>
-                      </p:stCondLst>
-                      <p:childTnLst>
-                        <p:par>
-                          <p:cTn id="16" fill="hold">
-                            <p:stCondLst>
-                              <p:cond delay="0"/>
-                            </p:stCondLst>
-                            <p:childTnLst>
-                              <p:par>
-                                <p:cTn id="17" presetID="1" presetClass="entr" presetSubtype="0" fill="hold" nodeType="clickEffect">
-                                  <p:stCondLst>
-                                    <p:cond delay="0"/>
-                                  </p:stCondLst>
-                                  <p:childTnLst>
-                                    <p:set>
-                                      <p:cBhvr>
-                                        <p:cTn id="18" dur="1" fill="hold">
-                                          <p:stCondLst>
-                                            <p:cond delay="0"/>
-                                          </p:stCondLst>
-                                        </p:cTn>
-                                        <p:tgtEl>
-                                          <p:spTgt spid="8"/>
-                                        </p:tgtEl>
-                                        <p:attrNameLst>
-                                          <p:attrName>style.visibility</p:attrName>
-                                        </p:attrNameLst>
-                                      </p:cBhvr>
-                                      <p:to>
-                                        <p:strVal val="visible"/>
-                                      </p:to>
-                                    </p:set>
-                                  </p:childTnLst>
-                                </p:cTn>
-                              </p:par>
-                            </p:childTnLst>
-                          </p:cTn>
-                        </p:par>
-                      </p:childTnLst>
-                    </p:cTn>
-                  </p:par>
-                  <p:par>
-                    <p:cTn id="19" fill="hold">
-                      <p:stCondLst>
-                        <p:cond delay="indefinite"/>
-                      </p:stCondLst>
-                      <p:childTnLst>
-                        <p:par>
-                          <p:cTn id="20" fill="hold">
-                            <p:stCondLst>
-                              <p:cond delay="0"/>
-                            </p:stCondLst>
-                            <p:childTnLst>
-                              <p:par>
-                                <p:cTn id="21" presetID="1" presetClass="entr" presetSubtype="0" fill="hold" nodeType="clickEffect">
-                                  <p:stCondLst>
-                                    <p:cond delay="0"/>
-                                  </p:stCondLst>
-                                  <p:childTnLst>
-                                    <p:set>
-                                      <p:cBhvr>
-                                        <p:cTn id="22" dur="1" fill="hold">
-                                          <p:stCondLst>
-                                            <p:cond delay="0"/>
-                                          </p:stCondLst>
-                                        </p:cTn>
-                                        <p:tgtEl>
-                                          <p:spTgt spid="9"/>
-                                        </p:tgtEl>
-                                        <p:attrNameLst>
-                                          <p:attrName>style.visibility</p:attrName>
-                                        </p:attrNameLst>
-                                      </p:cBhvr>
-                                      <p:to>
-                                        <p:strVal val="visible"/>
-                                      </p:to>
-                                    </p:set>
-                                  </p:childTnLst>
-                                </p:cTn>
-                              </p:par>
-                            </p:childTnLst>
-                          </p:cTn>
-                        </p:par>
-                      </p:childTnLst>
-                    </p:cTn>
-                  </p:par>
-                </p:childTnLst>
-              </p:cTn>
-              <p:prevCondLst>
-                <p:cond evt="onPrev" delay="0">
-                  <p:tgtEl>
-                    <p:sldTgt/>
-                  </p:tgtEl>
-                </p:cond>
-              </p:prevCondLst>
-              <p:nextCondLst>
-                <p:cond evt="onNext" delay="0">
-                  <p:tgtEl>
-                    <p:sldTgt/>
-                  </p:tgtEl>
-                </p:cond>
-              </p:nextCondLst>
-            </p:seq>
-          </p:childTnLst>
-        </p:cTn>
-      </p:par>
-    </p:tnLst>
-  </p:timing>
-</p:sld>
-</file>
-
-<file path=ppt/slides/slide12.xml><?xml version="1.0" encoding="utf-8"?>
-<p:sld xmlns:a="http://schemas.openxmlformats.org/drawingml/2006/main" xmlns:r="http://schemas.openxmlformats.org/officeDocument/2006/relationships" xmlns:p="http://schemas.openxmlformats.org/presentationml/2006/main">
-  <p:cSld>
-    <p:spTree>
-      <p:nvGrpSpPr>
-        <p:cNvPr id="1" name=""/>
-        <p:cNvGrpSpPr/>
-        <p:nvPr/>
-      </p:nvGrpSpPr>
-      <p:grpSpPr>
-        <a:xfrm>
-          <a:off x="0" y="0"/>
-          <a:ext cx="0" cy="0"/>
-          <a:chOff x="0" y="0"/>
-          <a:chExt cx="0" cy="0"/>
-        </a:xfrm>
-      </p:grpSpPr>
-      <p:sp>
-        <p:nvSpPr>
-          <p:cNvPr id="2" name="Title 1"/>
-          <p:cNvSpPr>
-            <a:spLocks noGrp="1"/>
-          </p:cNvSpPr>
-          <p:nvPr>
-            <p:ph type="title"/>
-          </p:nvPr>
-        </p:nvSpPr>
-        <p:spPr>
-          <a:xfrm>
-            <a:off x="0" y="0"/>
-            <a:ext cx="12192000" cy="1325563"/>
-          </a:xfrm>
-          <a:solidFill>
-            <a:srgbClr val="0070C0"/>
-          </a:solidFill>
-        </p:spPr>
-        <p:txBody>
-          <a:bodyPr/>
-          <a:lstStyle/>
-          <a:p>
-            <a:r>
-              <a:rPr lang="en-CA" b="1" dirty="0">
-                <a:solidFill>
-                  <a:schemeClr val="bg1"/>
-                </a:solidFill>
-              </a:rPr>
-              <a:t>Receiving Properties</a:t>
-            </a:r>
-          </a:p>
-        </p:txBody>
-      </p:sp>
-      <p:graphicFrame>
-        <p:nvGraphicFramePr>
-          <p:cNvPr id="4" name="Table 3"/>
-          <p:cNvGraphicFramePr>
-            <a:graphicFrameLocks noGrp="1"/>
-          </p:cNvGraphicFramePr>
-          <p:nvPr/>
-        </p:nvGraphicFramePr>
-        <p:xfrm>
-          <a:off x="237672" y="1487109"/>
-          <a:ext cx="11752941" cy="370840"/>
-        </p:xfrm>
-        <a:graphic>
-          <a:graphicData uri="http://schemas.openxmlformats.org/drawingml/2006/table">
-            <a:tbl>
-              <a:tblPr firstRow="1" bandRow="1">
-                <a:tableStyleId>{5C22544A-7EE6-4342-B048-85BDC9FD1C3A}</a:tableStyleId>
-              </a:tblPr>
-              <a:tblGrid>
-                <a:gridCol w="4301671">
-                  <a:extLst>
-                    <a:ext uri="{9D8B030D-6E8A-4147-A177-3AD203B41FA5}">
-                      <a16:colId xmlns:a16="http://schemas.microsoft.com/office/drawing/2014/main" val="1699504934"/>
-                    </a:ext>
-                  </a:extLst>
-                </a:gridCol>
-                <a:gridCol w="7451270">
-                  <a:extLst>
-                    <a:ext uri="{9D8B030D-6E8A-4147-A177-3AD203B41FA5}">
-                      <a16:colId xmlns:a16="http://schemas.microsoft.com/office/drawing/2014/main" val="92080481"/>
-                    </a:ext>
-                  </a:extLst>
-                </a:gridCol>
-              </a:tblGrid>
-              <a:tr h="370840">
-                <a:tc>
-                  <a:txBody>
-                    <a:bodyPr/>
-                    <a:lstStyle/>
-                    <a:p>
-                      <a:r>
-                        <a:rPr lang="en-CA" dirty="0"/>
-                        <a:t>Property</a:t>
-                      </a:r>
-                    </a:p>
-                  </a:txBody>
-                  <a:tcPr/>
-                </a:tc>
-                <a:tc>
-                  <a:txBody>
-                    <a:bodyPr/>
-                    <a:lstStyle/>
-                    <a:p>
-                      <a:pPr algn="l"/>
-                      <a:r>
-                        <a:rPr lang="en-CA" dirty="0"/>
-                        <a:t>Description</a:t>
-                      </a:r>
-                    </a:p>
-                  </a:txBody>
-                  <a:tcPr/>
-                </a:tc>
-                <a:extLst>
-                  <a:ext uri="{0D108BD9-81ED-4DB2-BD59-A6C34878D82A}">
-                    <a16:rowId xmlns:a16="http://schemas.microsoft.com/office/drawing/2014/main" val="1248774390"/>
-                  </a:ext>
-                </a:extLst>
-              </a:tr>
-            </a:tbl>
-          </a:graphicData>
-        </a:graphic>
-      </p:graphicFrame>
-      <p:graphicFrame>
-        <p:nvGraphicFramePr>
-          <p:cNvPr id="5" name="Table 4"/>
-          <p:cNvGraphicFramePr>
-            <a:graphicFrameLocks noGrp="1"/>
-          </p:cNvGraphicFramePr>
-          <p:nvPr>
-            <p:extLst>
-              <p:ext uri="{D42A27DB-BD31-4B8C-83A1-F6EECF244321}">
-                <p14:modId xmlns:p14="http://schemas.microsoft.com/office/powerpoint/2010/main" val="4267482714"/>
-              </p:ext>
-            </p:extLst>
-          </p:nvPr>
-        </p:nvGraphicFramePr>
-        <p:xfrm>
-          <a:off x="237672" y="1857949"/>
-          <a:ext cx="11752941" cy="640080"/>
-        </p:xfrm>
-        <a:graphic>
-          <a:graphicData uri="http://schemas.openxmlformats.org/drawingml/2006/table">
-            <a:tbl>
-              <a:tblPr firstRow="1" bandRow="1">
-                <a:tableStyleId>{BC89EF96-8CEA-46FF-86C4-4CE0E7609802}</a:tableStyleId>
-              </a:tblPr>
-              <a:tblGrid>
-                <a:gridCol w="4307114">
-                  <a:extLst>
-                    <a:ext uri="{9D8B030D-6E8A-4147-A177-3AD203B41FA5}">
-                      <a16:colId xmlns:a16="http://schemas.microsoft.com/office/drawing/2014/main" val="3207723062"/>
-                    </a:ext>
-                  </a:extLst>
-                </a:gridCol>
-                <a:gridCol w="7445827">
-                  <a:extLst>
-                    <a:ext uri="{9D8B030D-6E8A-4147-A177-3AD203B41FA5}">
-                      <a16:colId xmlns:a16="http://schemas.microsoft.com/office/drawing/2014/main" val="1658324364"/>
-                    </a:ext>
-                  </a:extLst>
-                </a:gridCol>
-              </a:tblGrid>
-              <a:tr h="370840">
-                <a:tc>
-                  <a:txBody>
-                    <a:bodyPr/>
-                    <a:lstStyle/>
-                    <a:p>
-                      <a:r>
-                        <a:rPr lang="en-CA" dirty="0" err="1"/>
-                        <a:t>EnableDeadLetteringOnMessageExpiration</a:t>
-                      </a:r>
-                      <a:endParaRPr lang="en-CA" dirty="0"/>
-                    </a:p>
-                  </a:txBody>
-                  <a:tcPr/>
-                </a:tc>
-                <a:tc>
-                  <a:txBody>
-                    <a:bodyPr/>
-                    <a:lstStyle/>
-                    <a:p>
-                      <a:r>
-                        <a:rPr lang="en-CA" sz="1800" b="1" kern="1200" dirty="0">
-                          <a:solidFill>
-                            <a:schemeClr val="tx1"/>
-                          </a:solidFill>
-                          <a:effectLst/>
-                          <a:latin typeface="+mn-lt"/>
-                          <a:ea typeface="+mn-ea"/>
-                          <a:cs typeface="+mn-cs"/>
-                        </a:rPr>
-                        <a:t>Specifies whether messages will be moved to the dead-letter queue when their time to live expires. </a:t>
-                      </a:r>
-                      <a:endParaRPr lang="en-US" sz="1800" b="1" kern="1200" dirty="0">
-                        <a:solidFill>
-                          <a:schemeClr val="tx1"/>
-                        </a:solidFill>
-                        <a:effectLst/>
-                        <a:latin typeface="+mn-lt"/>
-                        <a:ea typeface="+mn-ea"/>
-                        <a:cs typeface="+mn-cs"/>
-                      </a:endParaRPr>
-                    </a:p>
-                  </a:txBody>
-                  <a:tcPr/>
-                </a:tc>
-                <a:extLst>
-                  <a:ext uri="{0D108BD9-81ED-4DB2-BD59-A6C34878D82A}">
-                    <a16:rowId xmlns:a16="http://schemas.microsoft.com/office/drawing/2014/main" val="3125305022"/>
-                  </a:ext>
-                </a:extLst>
-              </a:tr>
-            </a:tbl>
-          </a:graphicData>
-        </a:graphic>
-      </p:graphicFrame>
-      <p:graphicFrame>
-        <p:nvGraphicFramePr>
-          <p:cNvPr id="6" name="Table 5"/>
-          <p:cNvGraphicFramePr>
-            <a:graphicFrameLocks noGrp="1"/>
-          </p:cNvGraphicFramePr>
-          <p:nvPr>
-            <p:extLst>
-              <p:ext uri="{D42A27DB-BD31-4B8C-83A1-F6EECF244321}">
-                <p14:modId xmlns:p14="http://schemas.microsoft.com/office/powerpoint/2010/main" val="4204359989"/>
-              </p:ext>
-            </p:extLst>
-          </p:nvPr>
-        </p:nvGraphicFramePr>
-        <p:xfrm>
-          <a:off x="237672" y="2507221"/>
-          <a:ext cx="11752941" cy="640080"/>
-        </p:xfrm>
-        <a:graphic>
-          <a:graphicData uri="http://schemas.openxmlformats.org/drawingml/2006/table">
-            <a:tbl>
-              <a:tblPr firstRow="1" bandRow="1">
-                <a:tableStyleId>{BC89EF96-8CEA-46FF-86C4-4CE0E7609802}</a:tableStyleId>
-              </a:tblPr>
-              <a:tblGrid>
-                <a:gridCol w="4307114">
-                  <a:extLst>
-                    <a:ext uri="{9D8B030D-6E8A-4147-A177-3AD203B41FA5}">
-                      <a16:colId xmlns:a16="http://schemas.microsoft.com/office/drawing/2014/main" val="1091211104"/>
-                    </a:ext>
-                  </a:extLst>
-                </a:gridCol>
-                <a:gridCol w="7445827">
-                  <a:extLst>
-                    <a:ext uri="{9D8B030D-6E8A-4147-A177-3AD203B41FA5}">
-                      <a16:colId xmlns:a16="http://schemas.microsoft.com/office/drawing/2014/main" val="1150722414"/>
-                    </a:ext>
-                  </a:extLst>
-                </a:gridCol>
-              </a:tblGrid>
-              <a:tr h="370840">
-                <a:tc>
-                  <a:txBody>
-                    <a:bodyPr/>
-                    <a:lstStyle/>
-                    <a:p>
-                      <a:r>
-                        <a:rPr lang="en-CA" sz="1800" b="1" kern="1200" dirty="0" err="1">
-                          <a:solidFill>
-                            <a:schemeClr val="tx1"/>
-                          </a:solidFill>
-                          <a:effectLst/>
-                          <a:latin typeface="+mn-lt"/>
-                          <a:ea typeface="+mn-ea"/>
-                          <a:cs typeface="+mn-cs"/>
-                        </a:rPr>
-                        <a:t>LockDuration</a:t>
-                      </a:r>
-                      <a:endParaRPr lang="en-CA" dirty="0"/>
-                    </a:p>
-                  </a:txBody>
-                  <a:tcPr>
-                    <a:solidFill>
-                      <a:schemeClr val="accent1">
-                        <a:lumMod val="40000"/>
-                        <a:lumOff val="60000"/>
-                      </a:schemeClr>
-                    </a:solidFill>
-                  </a:tcPr>
-                </a:tc>
-                <a:tc>
-                  <a:txBody>
-                    <a:bodyPr/>
-                    <a:lstStyle/>
-                    <a:p>
-                      <a:pPr algn="l"/>
-                      <a:r>
-                        <a:rPr lang="en-CA" sz="1800" b="1" kern="1200" dirty="0">
-                          <a:solidFill>
-                            <a:schemeClr val="tx1"/>
-                          </a:solidFill>
-                          <a:effectLst/>
-                          <a:latin typeface="+mn-lt"/>
-                          <a:ea typeface="+mn-ea"/>
-                          <a:cs typeface="+mn-cs"/>
-                        </a:rPr>
-                        <a:t>Specifies the time interval a message will remain in the locked state after it has been revived using the peek-lock mode.</a:t>
-                      </a:r>
-                      <a:endParaRPr lang="en-CA" dirty="0"/>
-                    </a:p>
-                  </a:txBody>
-                  <a:tcPr>
-                    <a:solidFill>
-                      <a:schemeClr val="accent1">
-                        <a:lumMod val="40000"/>
-                        <a:lumOff val="60000"/>
-                      </a:schemeClr>
-                    </a:solidFill>
-                  </a:tcPr>
-                </a:tc>
-                <a:extLst>
-                  <a:ext uri="{0D108BD9-81ED-4DB2-BD59-A6C34878D82A}">
-                    <a16:rowId xmlns:a16="http://schemas.microsoft.com/office/drawing/2014/main" val="370781235"/>
-                  </a:ext>
-                </a:extLst>
-              </a:tr>
-            </a:tbl>
-          </a:graphicData>
-        </a:graphic>
-      </p:graphicFrame>
-      <p:graphicFrame>
-        <p:nvGraphicFramePr>
-          <p:cNvPr id="7" name="Table 6"/>
-          <p:cNvGraphicFramePr>
-            <a:graphicFrameLocks noGrp="1"/>
-          </p:cNvGraphicFramePr>
-          <p:nvPr>
-            <p:extLst>
-              <p:ext uri="{D42A27DB-BD31-4B8C-83A1-F6EECF244321}">
-                <p14:modId xmlns:p14="http://schemas.microsoft.com/office/powerpoint/2010/main" val="3257098119"/>
-              </p:ext>
-            </p:extLst>
-          </p:nvPr>
-        </p:nvGraphicFramePr>
-        <p:xfrm>
-          <a:off x="237673" y="3147301"/>
-          <a:ext cx="11752941" cy="370840"/>
-        </p:xfrm>
-        <a:graphic>
-          <a:graphicData uri="http://schemas.openxmlformats.org/drawingml/2006/table">
-            <a:tbl>
-              <a:tblPr firstRow="1" bandRow="1">
-                <a:tableStyleId>{BC89EF96-8CEA-46FF-86C4-4CE0E7609802}</a:tableStyleId>
-              </a:tblPr>
-              <a:tblGrid>
-                <a:gridCol w="4312557">
-                  <a:extLst>
-                    <a:ext uri="{9D8B030D-6E8A-4147-A177-3AD203B41FA5}">
-                      <a16:colId xmlns:a16="http://schemas.microsoft.com/office/drawing/2014/main" val="1091211104"/>
-                    </a:ext>
-                  </a:extLst>
-                </a:gridCol>
-                <a:gridCol w="7440384">
-                  <a:extLst>
-                    <a:ext uri="{9D8B030D-6E8A-4147-A177-3AD203B41FA5}">
-                      <a16:colId xmlns:a16="http://schemas.microsoft.com/office/drawing/2014/main" val="1150722414"/>
-                    </a:ext>
-                  </a:extLst>
-                </a:gridCol>
-              </a:tblGrid>
-              <a:tr h="370840">
-                <a:tc>
-                  <a:txBody>
-                    <a:bodyPr/>
-                    <a:lstStyle/>
-                    <a:p>
-                      <a:r>
-                        <a:rPr lang="en-CA" sz="1800" b="1" kern="1200" dirty="0" err="1">
-                          <a:solidFill>
-                            <a:schemeClr val="tx1"/>
-                          </a:solidFill>
-                          <a:effectLst/>
-                          <a:latin typeface="+mn-lt"/>
-                          <a:ea typeface="+mn-ea"/>
-                          <a:cs typeface="+mn-cs"/>
-                        </a:rPr>
-                        <a:t>MaxDeIiveryCount</a:t>
-                      </a:r>
-                      <a:endParaRPr lang="en-CA" dirty="0"/>
-                    </a:p>
-                  </a:txBody>
-                  <a:tcPr>
-                    <a:solidFill>
-                      <a:schemeClr val="bg1"/>
-                    </a:solidFill>
-                  </a:tcPr>
-                </a:tc>
-                <a:tc>
-                  <a:txBody>
-                    <a:bodyPr/>
-                    <a:lstStyle/>
-                    <a:p>
-                      <a:r>
-                        <a:rPr lang="en-CA" sz="1800" b="1" kern="1200" dirty="0">
-                          <a:solidFill>
-                            <a:schemeClr val="tx1"/>
-                          </a:solidFill>
-                          <a:effectLst/>
-                          <a:latin typeface="+mn-lt"/>
-                          <a:ea typeface="+mn-ea"/>
-                          <a:cs typeface="+mn-cs"/>
-                        </a:rPr>
-                        <a:t>The number of times a message can be received before being dead-lettered.</a:t>
-                      </a:r>
-                      <a:endParaRPr lang="en-CA" dirty="0"/>
-                    </a:p>
-                  </a:txBody>
-                  <a:tcPr>
-                    <a:solidFill>
-                      <a:schemeClr val="bg1"/>
-                    </a:solidFill>
-                  </a:tcPr>
-                </a:tc>
-                <a:extLst>
-                  <a:ext uri="{0D108BD9-81ED-4DB2-BD59-A6C34878D82A}">
-                    <a16:rowId xmlns:a16="http://schemas.microsoft.com/office/drawing/2014/main" val="370781235"/>
-                  </a:ext>
-                </a:extLst>
-              </a:tr>
-            </a:tbl>
-          </a:graphicData>
-        </a:graphic>
-      </p:graphicFrame>
-      <p:graphicFrame>
-        <p:nvGraphicFramePr>
-          <p:cNvPr id="8" name="Table 7"/>
-          <p:cNvGraphicFramePr>
-            <a:graphicFrameLocks noGrp="1"/>
-          </p:cNvGraphicFramePr>
-          <p:nvPr>
-            <p:extLst>
-              <p:ext uri="{D42A27DB-BD31-4B8C-83A1-F6EECF244321}">
-                <p14:modId xmlns:p14="http://schemas.microsoft.com/office/powerpoint/2010/main" val="2933859142"/>
-              </p:ext>
-            </p:extLst>
-          </p:nvPr>
-        </p:nvGraphicFramePr>
-        <p:xfrm>
-          <a:off x="237672" y="3518141"/>
-          <a:ext cx="11752941" cy="370840"/>
-        </p:xfrm>
-        <a:graphic>
-          <a:graphicData uri="http://schemas.openxmlformats.org/drawingml/2006/table">
-            <a:tbl>
-              <a:tblPr firstRow="1" bandRow="1">
-                <a:tableStyleId>{BC89EF96-8CEA-46FF-86C4-4CE0E7609802}</a:tableStyleId>
-              </a:tblPr>
-              <a:tblGrid>
-                <a:gridCol w="4307114">
-                  <a:extLst>
-                    <a:ext uri="{9D8B030D-6E8A-4147-A177-3AD203B41FA5}">
-                      <a16:colId xmlns:a16="http://schemas.microsoft.com/office/drawing/2014/main" val="3104330619"/>
-                    </a:ext>
-                  </a:extLst>
-                </a:gridCol>
-                <a:gridCol w="7445827">
-                  <a:extLst>
-                    <a:ext uri="{9D8B030D-6E8A-4147-A177-3AD203B41FA5}">
-                      <a16:colId xmlns:a16="http://schemas.microsoft.com/office/drawing/2014/main" val="4204515562"/>
-                    </a:ext>
-                  </a:extLst>
-                </a:gridCol>
-              </a:tblGrid>
-              <a:tr h="370840">
-                <a:tc>
-                  <a:txBody>
-                    <a:bodyPr/>
-                    <a:lstStyle/>
-                    <a:p>
-                      <a:r>
-                        <a:rPr lang="en-CA" sz="1800" b="1" kern="1200" dirty="0" err="1">
-                          <a:solidFill>
-                            <a:schemeClr val="tx1"/>
-                          </a:solidFill>
-                          <a:effectLst/>
-                          <a:latin typeface="+mn-lt"/>
-                          <a:ea typeface="+mn-ea"/>
-                          <a:cs typeface="+mn-cs"/>
-                        </a:rPr>
-                        <a:t>RequiresSession</a:t>
-                      </a:r>
-                      <a:endParaRPr lang="en-CA" dirty="0"/>
-                    </a:p>
-                  </a:txBody>
-                  <a:tcPr>
-                    <a:solidFill>
-                      <a:schemeClr val="accent1">
-                        <a:lumMod val="40000"/>
-                        <a:lumOff val="60000"/>
-                      </a:schemeClr>
-                    </a:solidFill>
-                  </a:tcPr>
-                </a:tc>
-                <a:tc>
-                  <a:txBody>
-                    <a:bodyPr/>
-                    <a:lstStyle/>
-                    <a:p>
-                      <a:pPr algn="l"/>
-                      <a:r>
-                        <a:rPr lang="en-CA" sz="1800" b="1" kern="1200" dirty="0">
-                          <a:solidFill>
-                            <a:schemeClr val="tx1"/>
-                          </a:solidFill>
-                          <a:effectLst/>
-                          <a:latin typeface="+mn-lt"/>
-                          <a:ea typeface="+mn-ea"/>
-                          <a:cs typeface="+mn-cs"/>
-                        </a:rPr>
-                        <a:t>Specifies whether message sessions will be used on the messaging entity.</a:t>
-                      </a:r>
-                      <a:endParaRPr lang="en-CA" dirty="0"/>
-                    </a:p>
-                  </a:txBody>
-                  <a:tcPr>
-                    <a:solidFill>
-                      <a:schemeClr val="accent1">
-                        <a:lumMod val="40000"/>
-                        <a:lumOff val="60000"/>
-                      </a:schemeClr>
-                    </a:solidFill>
-                  </a:tcPr>
-                </a:tc>
-                <a:extLst>
-                  <a:ext uri="{0D108BD9-81ED-4DB2-BD59-A6C34878D82A}">
-                    <a16:rowId xmlns:a16="http://schemas.microsoft.com/office/drawing/2014/main" val="1137435020"/>
-                  </a:ext>
-                </a:extLst>
-              </a:tr>
-            </a:tbl>
-          </a:graphicData>
-        </a:graphic>
-      </p:graphicFrame>
-      <p:grpSp>
-        <p:nvGrpSpPr>
-          <p:cNvPr id="9" name="Group 8"/>
-          <p:cNvGrpSpPr/>
-          <p:nvPr/>
-        </p:nvGrpSpPr>
-        <p:grpSpPr>
-          <a:xfrm>
-            <a:off x="5553149" y="6041570"/>
-            <a:ext cx="1085702" cy="684439"/>
-            <a:chOff x="5553149" y="6041570"/>
-            <a:chExt cx="1085702" cy="684439"/>
-          </a:xfrm>
-        </p:grpSpPr>
-        <p:pic>
-          <p:nvPicPr>
-            <p:cNvPr id="10" name="Picture 9">
-              <a:hlinkClick r:id="rId2" action="ppaction://program"/>
-            </p:cNvPr>
-            <p:cNvPicPr>
-              <a:picLocks noChangeAspect="1"/>
-            </p:cNvPicPr>
-            <p:nvPr/>
-          </p:nvPicPr>
-          <p:blipFill>
-            <a:blip r:embed="rId3"/>
-            <a:stretch>
-              <a:fillRect/>
-            </a:stretch>
-          </p:blipFill>
-          <p:spPr>
-            <a:xfrm>
-              <a:off x="5553149" y="6041570"/>
-              <a:ext cx="1085702" cy="684439"/>
-            </a:xfrm>
-            <a:prstGeom prst="rect">
-              <a:avLst/>
-            </a:prstGeom>
-          </p:spPr>
-        </p:pic>
-        <p:sp>
-          <p:nvSpPr>
-            <p:cNvPr id="11" name="TextBox 10"/>
-            <p:cNvSpPr txBox="1"/>
-            <p:nvPr/>
-          </p:nvSpPr>
-          <p:spPr>
-            <a:xfrm>
-              <a:off x="5671457" y="6237515"/>
-              <a:ext cx="849086" cy="400110"/>
-            </a:xfrm>
-            <a:prstGeom prst="rect">
-              <a:avLst/>
-            </a:prstGeom>
-            <a:noFill/>
-          </p:spPr>
-          <p:txBody>
-            <a:bodyPr wrap="square" rtlCol="0">
-              <a:spAutoFit/>
-            </a:bodyPr>
-            <a:lstStyle/>
-            <a:p>
-              <a:pPr algn="ctr"/>
-              <a:r>
-                <a:rPr lang="en-CA" sz="2000" b="1" dirty="0">
-                  <a:hlinkClick r:id="rId2" action="ppaction://program"/>
-                </a:rPr>
-                <a:t>Demo</a:t>
-              </a:r>
-              <a:endParaRPr lang="en-CA" b="1" dirty="0"/>
-            </a:p>
-          </p:txBody>
-        </p:sp>
-      </p:grpSp>
-    </p:spTree>
-    <p:extLst>
-      <p:ext uri="{BB962C8B-B14F-4D97-AF65-F5344CB8AC3E}">
-        <p14:creationId xmlns:p14="http://schemas.microsoft.com/office/powerpoint/2010/main" val="510520479"/>
-      </p:ext>
-    </p:extLst>
-  </p:cSld>
-  <p:clrMapOvr>
-    <a:masterClrMapping/>
-  </p:clrMapOvr>
-  <p:timing>
-    <p:tnLst>
-      <p:par>
-        <p:cTn id="1" dur="indefinite" restart="never" nodeType="tmRoot">
-          <p:childTnLst>
-            <p:seq concurrent="1" nextAc="seek">
-              <p:cTn id="2" dur="indefinite" nodeType="mainSeq">
-                <p:childTnLst>
-                  <p:par>
-                    <p:cTn id="3" fill="hold">
-                      <p:stCondLst>
-                        <p:cond delay="indefinite"/>
-                      </p:stCondLst>
-                      <p:childTnLst>
-                        <p:par>
-                          <p:cTn id="4" fill="hold">
-                            <p:stCondLst>
-                              <p:cond delay="0"/>
-                            </p:stCondLst>
-                            <p:childTnLst>
-                              <p:par>
-                                <p:cTn id="5" presetID="1" presetClass="entr" presetSubtype="0" fill="hold" nodeType="clickEffect">
-                                  <p:stCondLst>
-                                    <p:cond delay="0"/>
-                                  </p:stCondLst>
-                                  <p:childTnLst>
-                                    <p:set>
-                                      <p:cBhvr>
-                                        <p:cTn id="6" dur="1" fill="hold">
-                                          <p:stCondLst>
-                                            <p:cond delay="0"/>
-                                          </p:stCondLst>
-                                        </p:cTn>
-                                        <p:tgtEl>
-                                          <p:spTgt spid="5"/>
-                                        </p:tgtEl>
-                                        <p:attrNameLst>
-                                          <p:attrName>style.visibility</p:attrName>
-                                        </p:attrNameLst>
-                                      </p:cBhvr>
-                                      <p:to>
-                                        <p:strVal val="visible"/>
-                                      </p:to>
-                                    </p:set>
-                                  </p:childTnLst>
-                                </p:cTn>
-                              </p:par>
-                            </p:childTnLst>
-                          </p:cTn>
-                        </p:par>
-                      </p:childTnLst>
-                    </p:cTn>
-                  </p:par>
-                  <p:par>
-                    <p:cTn id="7" fill="hold">
-                      <p:stCondLst>
-                        <p:cond delay="indefinite"/>
-                      </p:stCondLst>
-                      <p:childTnLst>
-                        <p:par>
-                          <p:cTn id="8" fill="hold">
-                            <p:stCondLst>
-                              <p:cond delay="0"/>
-                            </p:stCondLst>
-                            <p:childTnLst>
-                              <p:par>
-                                <p:cTn id="9" presetID="1" presetClass="entr" presetSubtype="0" fill="hold" nodeType="clickEffect">
-                                  <p:stCondLst>
-                                    <p:cond delay="0"/>
-                                  </p:stCondLst>
-                                  <p:childTnLst>
-                                    <p:set>
-                                      <p:cBhvr>
-                                        <p:cTn id="10" dur="1" fill="hold">
-                                          <p:stCondLst>
-                                            <p:cond delay="0"/>
-                                          </p:stCondLst>
-                                        </p:cTn>
-                                        <p:tgtEl>
-                                          <p:spTgt spid="6"/>
-                                        </p:tgtEl>
-                                        <p:attrNameLst>
-                                          <p:attrName>style.visibility</p:attrName>
-                                        </p:attrNameLst>
-                                      </p:cBhvr>
-                                      <p:to>
-                                        <p:strVal val="visible"/>
-                                      </p:to>
-                                    </p:set>
-                                  </p:childTnLst>
-                                </p:cTn>
-                              </p:par>
-                            </p:childTnLst>
-                          </p:cTn>
-                        </p:par>
-                      </p:childTnLst>
-                    </p:cTn>
-                  </p:par>
-                  <p:par>
-                    <p:cTn id="11" fill="hold">
-                      <p:stCondLst>
-                        <p:cond delay="indefinite"/>
-                      </p:stCondLst>
-                      <p:childTnLst>
-                        <p:par>
-                          <p:cTn id="12" fill="hold">
-                            <p:stCondLst>
-                              <p:cond delay="0"/>
-                            </p:stCondLst>
-                            <p:childTnLst>
-                              <p:par>
-                                <p:cTn id="13" presetID="1" presetClass="entr" presetSubtype="0" fill="hold" nodeType="clickEffect">
-                                  <p:stCondLst>
-                                    <p:cond delay="0"/>
-                                  </p:stCondLst>
-                                  <p:childTnLst>
-                                    <p:set>
-                                      <p:cBhvr>
-                                        <p:cTn id="14" dur="1" fill="hold">
-                                          <p:stCondLst>
-                                            <p:cond delay="0"/>
-                                          </p:stCondLst>
-                                        </p:cTn>
-                                        <p:tgtEl>
-                                          <p:spTgt spid="7"/>
-                                        </p:tgtEl>
-                                        <p:attrNameLst>
-                                          <p:attrName>style.visibility</p:attrName>
-                                        </p:attrNameLst>
-                                      </p:cBhvr>
-                                      <p:to>
-                                        <p:strVal val="visible"/>
-                                      </p:to>
-                                    </p:set>
-                                  </p:childTnLst>
-                                </p:cTn>
-                              </p:par>
-                            </p:childTnLst>
-                          </p:cTn>
-                        </p:par>
-                      </p:childTnLst>
-                    </p:cTn>
-                  </p:par>
-                  <p:par>
-                    <p:cTn id="15" fill="hold">
-                      <p:stCondLst>
-                        <p:cond delay="indefinite"/>
-                      </p:stCondLst>
-                      <p:childTnLst>
-                        <p:par>
-                          <p:cTn id="16" fill="hold">
-                            <p:stCondLst>
-                              <p:cond delay="0"/>
-                            </p:stCondLst>
-                            <p:childTnLst>
-                              <p:par>
-                                <p:cTn id="17" presetID="1" presetClass="entr" presetSubtype="0" fill="hold" nodeType="clickEffect">
-                                  <p:stCondLst>
-                                    <p:cond delay="0"/>
-                                  </p:stCondLst>
-                                  <p:childTnLst>
-                                    <p:set>
-                                      <p:cBhvr>
-                                        <p:cTn id="18" dur="1" fill="hold">
-                                          <p:stCondLst>
-                                            <p:cond delay="0"/>
-                                          </p:stCondLst>
-                                        </p:cTn>
-                                        <p:tgtEl>
-                                          <p:spTgt spid="8"/>
-                                        </p:tgtEl>
-                                        <p:attrNameLst>
-                                          <p:attrName>style.visibility</p:attrName>
-                                        </p:attrNameLst>
-                                      </p:cBhvr>
-                                      <p:to>
-                                        <p:strVal val="visible"/>
-                                      </p:to>
-                                    </p:set>
-                                  </p:childTnLst>
-                                </p:cTn>
-                              </p:par>
-                            </p:childTnLst>
-                          </p:cTn>
-                        </p:par>
-                      </p:childTnLst>
-                    </p:cTn>
-                  </p:par>
-                  <p:par>
-                    <p:cTn id="19" fill="hold">
-                      <p:stCondLst>
-                        <p:cond delay="indefinite"/>
-                      </p:stCondLst>
-                      <p:childTnLst>
-                        <p:par>
-                          <p:cTn id="20" fill="hold">
-                            <p:stCondLst>
-                              <p:cond delay="0"/>
-                            </p:stCondLst>
-                            <p:childTnLst>
-                              <p:par>
-                                <p:cTn id="21" presetID="1" presetClass="entr" presetSubtype="0" fill="hold" nodeType="clickEffect">
-                                  <p:stCondLst>
-                                    <p:cond delay="0"/>
-                                  </p:stCondLst>
-                                  <p:childTnLst>
-                                    <p:set>
-                                      <p:cBhvr>
-                                        <p:cTn id="22" dur="1" fill="hold">
-                                          <p:stCondLst>
-                                            <p:cond delay="0"/>
-                                          </p:stCondLst>
-                                        </p:cTn>
-                                        <p:tgtEl>
-                                          <p:spTgt spid="9"/>
-                                        </p:tgtEl>
-                                        <p:attrNameLst>
-                                          <p:attrName>style.visibility</p:attrName>
-                                        </p:attrNameLst>
-                                      </p:cBhvr>
-                                      <p:to>
-                                        <p:strVal val="visible"/>
-                                      </p:to>
-                                    </p:set>
-                                  </p:childTnLst>
-                                </p:cTn>
-                              </p:par>
-                            </p:childTnLst>
-                          </p:cTn>
-                        </p:par>
-                      </p:childTnLst>
-                    </p:cTn>
-                  </p:par>
-                </p:childTnLst>
-              </p:cTn>
-              <p:prevCondLst>
-                <p:cond evt="onPrev" delay="0">
-                  <p:tgtEl>
-                    <p:sldTgt/>
-                  </p:tgtEl>
-                </p:cond>
-              </p:prevCondLst>
-              <p:nextCondLst>
-                <p:cond evt="onNext" delay="0">
-                  <p:tgtEl>
-                    <p:sldTgt/>
-                  </p:tgtEl>
-                </p:cond>
-              </p:nextCondLst>
-            </p:seq>
-          </p:childTnLst>
-        </p:cTn>
-      </p:par>
-    </p:tnLst>
-  </p:timing>
-</p:sld>
-</file>
-
-<file path=ppt/slides/slide13.xml><?xml version="1.0" encoding="utf-8"?>
-<p:sld xmlns:a="http://schemas.openxmlformats.org/drawingml/2006/main" xmlns:r="http://schemas.openxmlformats.org/officeDocument/2006/relationships" xmlns:p="http://schemas.openxmlformats.org/presentationml/2006/main">
-  <p:cSld>
-    <p:spTree>
-      <p:nvGrpSpPr>
-        <p:cNvPr id="1" name=""/>
-        <p:cNvGrpSpPr/>
-        <p:nvPr/>
-      </p:nvGrpSpPr>
-      <p:grpSpPr>
-        <a:xfrm>
-          <a:off x="0" y="0"/>
-          <a:ext cx="0" cy="0"/>
-          <a:chOff x="0" y="0"/>
-          <a:chExt cx="0" cy="0"/>
-        </a:xfrm>
-      </p:grpSpPr>
-      <p:sp>
-        <p:nvSpPr>
-          <p:cNvPr id="2" name="Title 1"/>
-          <p:cNvSpPr>
-            <a:spLocks noGrp="1"/>
-          </p:cNvSpPr>
-          <p:nvPr>
-            <p:ph type="title"/>
-          </p:nvPr>
-        </p:nvSpPr>
-        <p:spPr>
-          <a:xfrm>
-            <a:off x="0" y="0"/>
-            <a:ext cx="12192000" cy="1325563"/>
-          </a:xfrm>
-          <a:solidFill>
-            <a:srgbClr val="0070C0"/>
-          </a:solidFill>
-        </p:spPr>
-        <p:txBody>
-          <a:bodyPr/>
-          <a:lstStyle/>
-          <a:p>
-            <a:r>
-              <a:rPr lang="en-CA" b="1" dirty="0">
-                <a:solidFill>
-                  <a:schemeClr val="bg1"/>
-                </a:solidFill>
-              </a:rPr>
               <a:t>Common Types</a:t>
             </a:r>
           </a:p>
@@ -15283,7 +13537,7 @@
 </p:sld>
 </file>
 
-<file path=ppt/slides/slide14.xml><?xml version="1.0" encoding="utf-8"?>
+<file path=ppt/slides/slide12.xml><?xml version="1.0" encoding="utf-8"?>
 <p:sld xmlns:a="http://schemas.openxmlformats.org/drawingml/2006/main" xmlns:r="http://schemas.openxmlformats.org/officeDocument/2006/relationships" xmlns:p="http://schemas.openxmlformats.org/presentationml/2006/main">
   <p:cSld>
     <p:spTree>
@@ -15933,7 +14187,7 @@
 </p:sld>
 </file>
 
-<file path=ppt/slides/slide15.xml><?xml version="1.0" encoding="utf-8"?>
+<file path=ppt/slides/slide13.xml><?xml version="1.0" encoding="utf-8"?>
 <p:sld xmlns:a="http://schemas.openxmlformats.org/drawingml/2006/main" xmlns:r="http://schemas.openxmlformats.org/officeDocument/2006/relationships" xmlns:p="http://schemas.openxmlformats.org/presentationml/2006/main">
   <p:cSld>
     <p:spTree>
@@ -16023,7 +14277,7 @@
 </p:sld>
 </file>
 
-<file path=ppt/slides/slide16.xml><?xml version="1.0" encoding="utf-8"?>
+<file path=ppt/slides/slide14.xml><?xml version="1.0" encoding="utf-8"?>
 <p:sld xmlns:a="http://schemas.openxmlformats.org/drawingml/2006/main" xmlns:r="http://schemas.openxmlformats.org/officeDocument/2006/relationships" xmlns:p="http://schemas.openxmlformats.org/presentationml/2006/main">
   <p:cSld>
     <p:spTree>
@@ -16641,7 +14895,7 @@
 </p:sld>
 </file>
 
-<file path=ppt/slides/slide17.xml><?xml version="1.0" encoding="utf-8"?>
+<file path=ppt/slides/slide15.xml><?xml version="1.0" encoding="utf-8"?>
 <p:sld xmlns:a="http://schemas.openxmlformats.org/drawingml/2006/main" xmlns:r="http://schemas.openxmlformats.org/officeDocument/2006/relationships" xmlns:p="http://schemas.openxmlformats.org/presentationml/2006/main">
   <p:cSld>
     <p:spTree>
@@ -17503,7 +15757,7 @@
 </p:sld>
 </file>
 
-<file path=ppt/slides/slide18.xml><?xml version="1.0" encoding="utf-8"?>
+<file path=ppt/slides/slide16.xml><?xml version="1.0" encoding="utf-8"?>
 <p:sld xmlns:a="http://schemas.openxmlformats.org/drawingml/2006/main" xmlns:r="http://schemas.openxmlformats.org/officeDocument/2006/relationships" xmlns:p="http://schemas.openxmlformats.org/presentationml/2006/main">
   <p:cSld>
     <p:spTree>
@@ -17806,8 +16060,13 @@
             <a:pPr algn="ctr"/>
             <a:r>
               <a:rPr lang="en-CA" dirty="0"/>
-              <a:t>Lock timeout expired</a:t>
+              <a:t>Lock timeout expired x </a:t>
             </a:r>
+            <a:r>
+              <a:rPr lang="en-CA" dirty="0" err="1"/>
+              <a:t>MaxDeliveryCout</a:t>
+            </a:r>
+            <a:endParaRPr lang="en-CA" dirty="0"/>
           </a:p>
         </p:txBody>
       </p:sp>
@@ -18073,7 +16332,7 @@
           <a:p>
             <a:r>
               <a:rPr lang="en-CA" dirty="0"/>
-              <a:t>Message remains on the queue and can will be received later.</a:t>
+              <a:t>Message remains on the queue and will be received later.</a:t>
             </a:r>
           </a:p>
         </p:txBody>
@@ -18765,7 +17024,7 @@
 </p:sld>
 </file>
 
-<file path=ppt/slides/slide19.xml><?xml version="1.0" encoding="utf-8"?>
+<file path=ppt/slides/slide17.xml><?xml version="1.0" encoding="utf-8"?>
 <p:sld xmlns:a="http://schemas.openxmlformats.org/drawingml/2006/main" xmlns:r="http://schemas.openxmlformats.org/officeDocument/2006/relationships" xmlns:p="http://schemas.openxmlformats.org/presentationml/2006/main">
   <p:cSld>
     <p:spTree>
@@ -18913,6 +17172,93 @@
               <a:t>OnMessageAsync</a:t>
             </a:r>
             <a:endParaRPr lang="en-CA" b="1" dirty="0"/>
+          </a:p>
+        </p:txBody>
+      </p:sp>
+      <p:pic>
+        <p:nvPicPr>
+          <p:cNvPr id="1026" name="Picture 2" descr="https://www.linqpad.net/images/maincodescratchpad.png">
+            <a:hlinkClick r:id="rId7" action="ppaction://program"/>
+          </p:cNvPr>
+          <p:cNvPicPr>
+            <a:picLocks noChangeAspect="1" noChangeArrowheads="1"/>
+          </p:cNvPicPr>
+          <p:nvPr/>
+        </p:nvPicPr>
+        <p:blipFill>
+          <a:blip r:embed="rId8" cstate="print">
+            <a:extLst>
+              <a:ext uri="{28A0092B-C50C-407E-A947-70E740481C1C}">
+                <a14:useLocalDpi xmlns:a14="http://schemas.microsoft.com/office/drawing/2010/main" val="0"/>
+              </a:ext>
+            </a:extLst>
+          </a:blip>
+          <a:srcRect/>
+          <a:stretch>
+            <a:fillRect/>
+          </a:stretch>
+        </p:blipFill>
+        <p:spPr bwMode="auto">
+          <a:xfrm>
+            <a:off x="5217563" y="5691884"/>
+            <a:ext cx="1609615" cy="938929"/>
+          </a:xfrm>
+          <a:prstGeom prst="rect">
+            <a:avLst/>
+          </a:prstGeom>
+          <a:noFill/>
+          <a:extLst>
+            <a:ext uri="{909E8E84-426E-40DD-AFC4-6F175D3DCCD1}">
+              <a14:hiddenFill xmlns:a14="http://schemas.microsoft.com/office/drawing/2010/main">
+                <a:solidFill>
+                  <a:srgbClr val="FFFFFF"/>
+                </a:solidFill>
+              </a14:hiddenFill>
+            </a:ext>
+          </a:extLst>
+        </p:spPr>
+      </p:pic>
+      <p:sp>
+        <p:nvSpPr>
+          <p:cNvPr id="3" name="TextBox 2"/>
+          <p:cNvSpPr txBox="1"/>
+          <p:nvPr/>
+        </p:nvSpPr>
+        <p:spPr>
+          <a:xfrm>
+            <a:off x="5534464" y="6165855"/>
+            <a:ext cx="1082494" cy="523220"/>
+          </a:xfrm>
+          <a:prstGeom prst="rect">
+            <a:avLst/>
+          </a:prstGeom>
+          <a:noFill/>
+        </p:spPr>
+        <p:txBody>
+          <a:bodyPr wrap="square" rtlCol="0">
+            <a:spAutoFit/>
+          </a:bodyPr>
+          <a:lstStyle/>
+          <a:p>
+            <a:pPr algn="ctr"/>
+            <a:r>
+              <a:rPr lang="en-CA" sz="2800" b="1" dirty="0">
+                <a:solidFill>
+                  <a:schemeClr val="accent5">
+                    <a:lumMod val="75000"/>
+                  </a:schemeClr>
+                </a:solidFill>
+                <a:hlinkClick r:id="rId7" action="ppaction://program"/>
+              </a:rPr>
+              <a:t>Demo</a:t>
+            </a:r>
+            <a:endParaRPr lang="en-CA" sz="2800" b="1" dirty="0">
+              <a:solidFill>
+                <a:schemeClr val="accent5">
+                  <a:lumMod val="75000"/>
+                </a:schemeClr>
+              </a:solidFill>
+            </a:endParaRPr>
           </a:p>
         </p:txBody>
       </p:sp>
@@ -19109,933 +17455,7 @@
 </p:sld>
 </file>
 
-<file path=ppt/slides/slide2.xml><?xml version="1.0" encoding="utf-8"?>
-<p:sld xmlns:a="http://schemas.openxmlformats.org/drawingml/2006/main" xmlns:r="http://schemas.openxmlformats.org/officeDocument/2006/relationships" xmlns:p="http://schemas.openxmlformats.org/presentationml/2006/main">
-  <p:cSld>
-    <p:spTree>
-      <p:nvGrpSpPr>
-        <p:cNvPr id="1" name=""/>
-        <p:cNvGrpSpPr/>
-        <p:nvPr/>
-      </p:nvGrpSpPr>
-      <p:grpSpPr>
-        <a:xfrm>
-          <a:off x="0" y="0"/>
-          <a:ext cx="0" cy="0"/>
-          <a:chOff x="0" y="0"/>
-          <a:chExt cx="0" cy="0"/>
-        </a:xfrm>
-      </p:grpSpPr>
-      <p:pic>
-        <p:nvPicPr>
-          <p:cNvPr id="9" name="Relays"/>
-          <p:cNvPicPr>
-            <a:picLocks noChangeAspect="1"/>
-          </p:cNvPicPr>
-          <p:nvPr/>
-        </p:nvPicPr>
-        <p:blipFill>
-          <a:blip r:embed="rId3" cstate="print">
-            <a:extLst>
-              <a:ext uri="{28A0092B-C50C-407E-A947-70E740481C1C}">
-                <a14:useLocalDpi xmlns:a14="http://schemas.microsoft.com/office/drawing/2010/main" val="0"/>
-              </a:ext>
-            </a:extLst>
-          </a:blip>
-          <a:stretch>
-            <a:fillRect/>
-          </a:stretch>
-        </p:blipFill>
-        <p:spPr>
-          <a:xfrm>
-            <a:off x="9645678" y="3885523"/>
-            <a:ext cx="780290" cy="780290"/>
-          </a:xfrm>
-          <a:prstGeom prst="rect">
-            <a:avLst/>
-          </a:prstGeom>
-        </p:spPr>
-      </p:pic>
-      <p:cxnSp>
-        <p:nvCxnSpPr>
-          <p:cNvPr id="14" name="Relays connector"/>
-          <p:cNvCxnSpPr>
-            <a:stCxn id="4" idx="2"/>
-            <a:endCxn id="9" idx="0"/>
-          </p:cNvCxnSpPr>
-          <p:nvPr/>
-        </p:nvCxnSpPr>
-        <p:spPr>
-          <a:xfrm rot="16200000" flipH="1">
-            <a:off x="7713347" y="1563047"/>
-            <a:ext cx="801084" cy="3843867"/>
-          </a:xfrm>
-          <a:prstGeom prst="bentConnector3">
-            <a:avLst/>
-          </a:prstGeom>
-        </p:spPr>
-        <p:style>
-          <a:lnRef idx="1">
-            <a:schemeClr val="accent1"/>
-          </a:lnRef>
-          <a:fillRef idx="0">
-            <a:schemeClr val="accent1"/>
-          </a:fillRef>
-          <a:effectRef idx="0">
-            <a:schemeClr val="accent1"/>
-          </a:effectRef>
-          <a:fontRef idx="minor">
-            <a:schemeClr val="tx1"/>
-          </a:fontRef>
-        </p:style>
-      </p:cxnSp>
-      <p:pic>
-        <p:nvPicPr>
-          <p:cNvPr id="5" name="EventHubs"/>
-          <p:cNvPicPr>
-            <a:picLocks noChangeAspect="1"/>
-          </p:cNvPicPr>
-          <p:nvPr/>
-        </p:nvPicPr>
-        <p:blipFill>
-          <a:blip r:embed="rId4" cstate="print">
-            <a:extLst>
-              <a:ext uri="{28A0092B-C50C-407E-A947-70E740481C1C}">
-                <a14:useLocalDpi xmlns:a14="http://schemas.microsoft.com/office/drawing/2010/main" val="0"/>
-              </a:ext>
-            </a:extLst>
-          </a:blip>
-          <a:stretch>
-            <a:fillRect/>
-          </a:stretch>
-        </p:blipFill>
-        <p:spPr>
-          <a:xfrm>
-            <a:off x="7173412" y="3885523"/>
-            <a:ext cx="780290" cy="780290"/>
-          </a:xfrm>
-          <a:prstGeom prst="rect">
-            <a:avLst/>
-          </a:prstGeom>
-        </p:spPr>
-      </p:pic>
-      <p:cxnSp>
-        <p:nvCxnSpPr>
-          <p:cNvPr id="18" name="EventHubs connector"/>
-          <p:cNvCxnSpPr>
-            <a:stCxn id="4" idx="2"/>
-            <a:endCxn id="5" idx="0"/>
-          </p:cNvCxnSpPr>
-          <p:nvPr/>
-        </p:nvCxnSpPr>
-        <p:spPr>
-          <a:xfrm rot="16200000" flipH="1">
-            <a:off x="6477214" y="2799180"/>
-            <a:ext cx="801084" cy="1371601"/>
-          </a:xfrm>
-          <a:prstGeom prst="bentConnector3">
-            <a:avLst/>
-          </a:prstGeom>
-        </p:spPr>
-        <p:style>
-          <a:lnRef idx="1">
-            <a:schemeClr val="accent1"/>
-          </a:lnRef>
-          <a:fillRef idx="0">
-            <a:schemeClr val="accent1"/>
-          </a:fillRef>
-          <a:effectRef idx="0">
-            <a:schemeClr val="accent1"/>
-          </a:effectRef>
-          <a:fontRef idx="minor">
-            <a:schemeClr val="tx1"/>
-          </a:fontRef>
-        </p:style>
-      </p:cxnSp>
-      <p:pic>
-        <p:nvPicPr>
-          <p:cNvPr id="8" name="Topics"/>
-          <p:cNvPicPr>
-            <a:picLocks noChangeAspect="1"/>
-          </p:cNvPicPr>
-          <p:nvPr/>
-        </p:nvPicPr>
-        <p:blipFill>
-          <a:blip r:embed="rId5" cstate="print">
-            <a:extLst>
-              <a:ext uri="{28A0092B-C50C-407E-A947-70E740481C1C}">
-                <a14:useLocalDpi xmlns:a14="http://schemas.microsoft.com/office/drawing/2010/main" val="0"/>
-              </a:ext>
-            </a:extLst>
-          </a:blip>
-          <a:stretch>
-            <a:fillRect/>
-          </a:stretch>
-        </p:blipFill>
-        <p:spPr>
-          <a:xfrm>
-            <a:off x="4701145" y="3885523"/>
-            <a:ext cx="780290" cy="780290"/>
-          </a:xfrm>
-          <a:prstGeom prst="rect">
-            <a:avLst/>
-          </a:prstGeom>
-        </p:spPr>
-      </p:pic>
-      <p:cxnSp>
-        <p:nvCxnSpPr>
-          <p:cNvPr id="16" name="Topics connector"/>
-          <p:cNvCxnSpPr>
-            <a:stCxn id="4" idx="2"/>
-            <a:endCxn id="8" idx="0"/>
-          </p:cNvCxnSpPr>
-          <p:nvPr/>
-        </p:nvCxnSpPr>
-        <p:spPr>
-          <a:xfrm rot="5400000">
-            <a:off x="5241081" y="2934648"/>
-            <a:ext cx="801084" cy="1100666"/>
-          </a:xfrm>
-          <a:prstGeom prst="bentConnector3">
-            <a:avLst/>
-          </a:prstGeom>
-        </p:spPr>
-        <p:style>
-          <a:lnRef idx="1">
-            <a:schemeClr val="accent1"/>
-          </a:lnRef>
-          <a:fillRef idx="0">
-            <a:schemeClr val="accent1"/>
-          </a:fillRef>
-          <a:effectRef idx="0">
-            <a:schemeClr val="accent1"/>
-          </a:effectRef>
-          <a:fontRef idx="minor">
-            <a:schemeClr val="tx1"/>
-          </a:fontRef>
-        </p:style>
-      </p:cxnSp>
-      <p:pic>
-        <p:nvPicPr>
-          <p:cNvPr id="7" name="Queues"/>
-          <p:cNvPicPr>
-            <a:picLocks noChangeAspect="1"/>
-          </p:cNvPicPr>
-          <p:nvPr/>
-        </p:nvPicPr>
-        <p:blipFill>
-          <a:blip r:embed="rId6" cstate="print">
-            <a:extLst>
-              <a:ext uri="{28A0092B-C50C-407E-A947-70E740481C1C}">
-                <a14:useLocalDpi xmlns:a14="http://schemas.microsoft.com/office/drawing/2010/main" val="0"/>
-              </a:ext>
-            </a:extLst>
-          </a:blip>
-          <a:stretch>
-            <a:fillRect/>
-          </a:stretch>
-        </p:blipFill>
-        <p:spPr>
-          <a:xfrm>
-            <a:off x="2228878" y="3885523"/>
-            <a:ext cx="780290" cy="780290"/>
-          </a:xfrm>
-          <a:prstGeom prst="rect">
-            <a:avLst/>
-          </a:prstGeom>
-        </p:spPr>
-      </p:pic>
-      <p:cxnSp>
-        <p:nvCxnSpPr>
-          <p:cNvPr id="12" name="Queues connector"/>
-          <p:cNvCxnSpPr>
-            <a:stCxn id="4" idx="2"/>
-            <a:endCxn id="7" idx="0"/>
-          </p:cNvCxnSpPr>
-          <p:nvPr/>
-        </p:nvCxnSpPr>
-        <p:spPr>
-          <a:xfrm rot="5400000">
-            <a:off x="4004948" y="1698515"/>
-            <a:ext cx="801084" cy="3572933"/>
-          </a:xfrm>
-          <a:prstGeom prst="bentConnector3">
-            <a:avLst/>
-          </a:prstGeom>
-        </p:spPr>
-        <p:style>
-          <a:lnRef idx="1">
-            <a:schemeClr val="accent1"/>
-          </a:lnRef>
-          <a:fillRef idx="0">
-            <a:schemeClr val="accent1"/>
-          </a:fillRef>
-          <a:effectRef idx="0">
-            <a:schemeClr val="accent1"/>
-          </a:effectRef>
-          <a:fontRef idx="minor">
-            <a:schemeClr val="tx1"/>
-          </a:fontRef>
-        </p:style>
-      </p:cxnSp>
-      <p:sp>
-        <p:nvSpPr>
-          <p:cNvPr id="2" name="Title 1"/>
-          <p:cNvSpPr>
-            <a:spLocks noGrp="1"/>
-          </p:cNvSpPr>
-          <p:nvPr>
-            <p:ph type="title"/>
-          </p:nvPr>
-        </p:nvSpPr>
-        <p:spPr>
-          <a:xfrm>
-            <a:off x="0" y="0"/>
-            <a:ext cx="12192000" cy="1325563"/>
-          </a:xfrm>
-          <a:solidFill>
-            <a:srgbClr val="0070C0"/>
-          </a:solidFill>
-        </p:spPr>
-        <p:txBody>
-          <a:bodyPr/>
-          <a:lstStyle/>
-          <a:p>
-            <a:r>
-              <a:rPr lang="en-CA" b="1" dirty="0">
-                <a:solidFill>
-                  <a:schemeClr val="bg1"/>
-                </a:solidFill>
-              </a:rPr>
-              <a:t>Service provided by ASB</a:t>
-            </a:r>
-          </a:p>
-        </p:txBody>
-      </p:sp>
-      <p:pic>
-        <p:nvPicPr>
-          <p:cNvPr id="4" name="Picture 3"/>
-          <p:cNvPicPr>
-            <a:picLocks noChangeAspect="1"/>
-          </p:cNvPicPr>
-          <p:nvPr/>
-        </p:nvPicPr>
-        <p:blipFill>
-          <a:blip r:embed="rId7" cstate="print">
-            <a:extLst>
-              <a:ext uri="{28A0092B-C50C-407E-A947-70E740481C1C}">
-                <a14:useLocalDpi xmlns:a14="http://schemas.microsoft.com/office/drawing/2010/main" val="0"/>
-              </a:ext>
-            </a:extLst>
-          </a:blip>
-          <a:stretch>
-            <a:fillRect/>
-          </a:stretch>
-        </p:blipFill>
-        <p:spPr>
-          <a:xfrm>
-            <a:off x="5801811" y="2304149"/>
-            <a:ext cx="780290" cy="780290"/>
-          </a:xfrm>
-          <a:prstGeom prst="rect">
-            <a:avLst/>
-          </a:prstGeom>
-        </p:spPr>
-      </p:pic>
-      <p:sp>
-        <p:nvSpPr>
-          <p:cNvPr id="6" name="TextBox 5"/>
-          <p:cNvSpPr txBox="1"/>
-          <p:nvPr/>
-        </p:nvSpPr>
-        <p:spPr>
-          <a:xfrm>
-            <a:off x="2008598" y="4665813"/>
-            <a:ext cx="1176391" cy="369332"/>
-          </a:xfrm>
-          <a:prstGeom prst="rect">
-            <a:avLst/>
-          </a:prstGeom>
-          <a:noFill/>
-        </p:spPr>
-        <p:txBody>
-          <a:bodyPr wrap="square" rtlCol="0">
-            <a:spAutoFit/>
-          </a:bodyPr>
-          <a:lstStyle/>
-          <a:p>
-            <a:pPr algn="ctr"/>
-            <a:r>
-              <a:rPr lang="en-CA" dirty="0"/>
-              <a:t>Queues</a:t>
-            </a:r>
-          </a:p>
-        </p:txBody>
-      </p:sp>
-      <p:sp>
-        <p:nvSpPr>
-          <p:cNvPr id="15" name="TextBox 14"/>
-          <p:cNvSpPr txBox="1"/>
-          <p:nvPr/>
-        </p:nvSpPr>
-        <p:spPr>
-          <a:xfrm>
-            <a:off x="4305044" y="4665813"/>
-            <a:ext cx="1571774" cy="646331"/>
-          </a:xfrm>
-          <a:prstGeom prst="rect">
-            <a:avLst/>
-          </a:prstGeom>
-          <a:noFill/>
-        </p:spPr>
-        <p:txBody>
-          <a:bodyPr wrap="square" rtlCol="0">
-            <a:spAutoFit/>
-          </a:bodyPr>
-          <a:lstStyle/>
-          <a:p>
-            <a:pPr algn="ctr"/>
-            <a:r>
-              <a:rPr lang="en-CA" dirty="0"/>
-              <a:t>Topics &amp; Subscriptions</a:t>
-            </a:r>
-          </a:p>
-        </p:txBody>
-      </p:sp>
-      <p:sp>
-        <p:nvSpPr>
-          <p:cNvPr id="17" name="TextBox 16"/>
-          <p:cNvSpPr txBox="1"/>
-          <p:nvPr/>
-        </p:nvSpPr>
-        <p:spPr>
-          <a:xfrm>
-            <a:off x="6975361" y="4665813"/>
-            <a:ext cx="1176391" cy="369332"/>
-          </a:xfrm>
-          <a:prstGeom prst="rect">
-            <a:avLst/>
-          </a:prstGeom>
-          <a:noFill/>
-        </p:spPr>
-        <p:txBody>
-          <a:bodyPr wrap="square" rtlCol="0">
-            <a:spAutoFit/>
-          </a:bodyPr>
-          <a:lstStyle/>
-          <a:p>
-            <a:pPr algn="ctr"/>
-            <a:r>
-              <a:rPr lang="en-CA" dirty="0" err="1"/>
-              <a:t>EventHubs</a:t>
-            </a:r>
-            <a:endParaRPr lang="en-CA" dirty="0"/>
-          </a:p>
-        </p:txBody>
-      </p:sp>
-      <p:sp>
-        <p:nvSpPr>
-          <p:cNvPr id="19" name="TextBox 18"/>
-          <p:cNvSpPr txBox="1"/>
-          <p:nvPr/>
-        </p:nvSpPr>
-        <p:spPr>
-          <a:xfrm>
-            <a:off x="9447628" y="4665813"/>
-            <a:ext cx="1176391" cy="369332"/>
-          </a:xfrm>
-          <a:prstGeom prst="rect">
-            <a:avLst/>
-          </a:prstGeom>
-          <a:noFill/>
-        </p:spPr>
-        <p:txBody>
-          <a:bodyPr wrap="square" rtlCol="0">
-            <a:spAutoFit/>
-          </a:bodyPr>
-          <a:lstStyle/>
-          <a:p>
-            <a:pPr algn="ctr"/>
-            <a:r>
-              <a:rPr lang="en-CA" dirty="0"/>
-              <a:t>Relays</a:t>
-            </a:r>
-          </a:p>
-        </p:txBody>
-      </p:sp>
-    </p:spTree>
-    <p:extLst>
-      <p:ext uri="{BB962C8B-B14F-4D97-AF65-F5344CB8AC3E}">
-        <p14:creationId xmlns:p14="http://schemas.microsoft.com/office/powerpoint/2010/main" val="3222334169"/>
-      </p:ext>
-    </p:extLst>
-  </p:cSld>
-  <p:clrMapOvr>
-    <a:masterClrMapping/>
-  </p:clrMapOvr>
-  <p:timing>
-    <p:tnLst>
-      <p:par>
-        <p:cTn id="1" dur="indefinite" restart="never" nodeType="tmRoot">
-          <p:childTnLst>
-            <p:seq concurrent="1" nextAc="seek">
-              <p:cTn id="2" dur="indefinite" nodeType="mainSeq">
-                <p:childTnLst>
-                  <p:par>
-                    <p:cTn id="3" fill="hold">
-                      <p:stCondLst>
-                        <p:cond delay="indefinite"/>
-                      </p:stCondLst>
-                      <p:childTnLst>
-                        <p:par>
-                          <p:cTn id="4" fill="hold">
-                            <p:stCondLst>
-                              <p:cond delay="0"/>
-                            </p:stCondLst>
-                            <p:childTnLst>
-                              <p:par>
-                                <p:cTn id="5" presetID="1" presetClass="entr" presetSubtype="0" fill="hold" nodeType="clickEffect">
-                                  <p:stCondLst>
-                                    <p:cond delay="0"/>
-                                  </p:stCondLst>
-                                  <p:childTnLst>
-                                    <p:set>
-                                      <p:cBhvr>
-                                        <p:cTn id="6" dur="1" fill="hold">
-                                          <p:stCondLst>
-                                            <p:cond delay="0"/>
-                                          </p:stCondLst>
-                                        </p:cTn>
-                                        <p:tgtEl>
-                                          <p:spTgt spid="12"/>
-                                        </p:tgtEl>
-                                        <p:attrNameLst>
-                                          <p:attrName>style.visibility</p:attrName>
-                                        </p:attrNameLst>
-                                      </p:cBhvr>
-                                      <p:to>
-                                        <p:strVal val="visible"/>
-                                      </p:to>
-                                    </p:set>
-                                  </p:childTnLst>
-                                </p:cTn>
-                              </p:par>
-                            </p:childTnLst>
-                          </p:cTn>
-                        </p:par>
-                        <p:par>
-                          <p:cTn id="7" fill="hold">
-                            <p:stCondLst>
-                              <p:cond delay="0"/>
-                            </p:stCondLst>
-                            <p:childTnLst>
-                              <p:par>
-                                <p:cTn id="8" presetID="1" presetClass="entr" presetSubtype="0" fill="hold" nodeType="afterEffect">
-                                  <p:stCondLst>
-                                    <p:cond delay="0"/>
-                                  </p:stCondLst>
-                                  <p:childTnLst>
-                                    <p:set>
-                                      <p:cBhvr>
-                                        <p:cTn id="9" dur="1" fill="hold">
-                                          <p:stCondLst>
-                                            <p:cond delay="0"/>
-                                          </p:stCondLst>
-                                        </p:cTn>
-                                        <p:tgtEl>
-                                          <p:spTgt spid="7"/>
-                                        </p:tgtEl>
-                                        <p:attrNameLst>
-                                          <p:attrName>style.visibility</p:attrName>
-                                        </p:attrNameLst>
-                                      </p:cBhvr>
-                                      <p:to>
-                                        <p:strVal val="visible"/>
-                                      </p:to>
-                                    </p:set>
-                                  </p:childTnLst>
-                                </p:cTn>
-                              </p:par>
-                              <p:par>
-                                <p:cTn id="10" presetID="1" presetClass="entr" presetSubtype="0" fill="hold" grpId="0" nodeType="withEffect">
-                                  <p:stCondLst>
-                                    <p:cond delay="0"/>
-                                  </p:stCondLst>
-                                  <p:childTnLst>
-                                    <p:set>
-                                      <p:cBhvr>
-                                        <p:cTn id="11" dur="1" fill="hold">
-                                          <p:stCondLst>
-                                            <p:cond delay="0"/>
-                                          </p:stCondLst>
-                                        </p:cTn>
-                                        <p:tgtEl>
-                                          <p:spTgt spid="6"/>
-                                        </p:tgtEl>
-                                        <p:attrNameLst>
-                                          <p:attrName>style.visibility</p:attrName>
-                                        </p:attrNameLst>
-                                      </p:cBhvr>
-                                      <p:to>
-                                        <p:strVal val="visible"/>
-                                      </p:to>
-                                    </p:set>
-                                  </p:childTnLst>
-                                </p:cTn>
-                              </p:par>
-                            </p:childTnLst>
-                          </p:cTn>
-                        </p:par>
-                      </p:childTnLst>
-                    </p:cTn>
-                  </p:par>
-                  <p:par>
-                    <p:cTn id="12" fill="hold">
-                      <p:stCondLst>
-                        <p:cond delay="indefinite"/>
-                      </p:stCondLst>
-                      <p:childTnLst>
-                        <p:par>
-                          <p:cTn id="13" fill="hold">
-                            <p:stCondLst>
-                              <p:cond delay="0"/>
-                            </p:stCondLst>
-                            <p:childTnLst>
-                              <p:par>
-                                <p:cTn id="14" presetID="1" presetClass="entr" presetSubtype="0" fill="hold" nodeType="clickEffect">
-                                  <p:stCondLst>
-                                    <p:cond delay="0"/>
-                                  </p:stCondLst>
-                                  <p:childTnLst>
-                                    <p:set>
-                                      <p:cBhvr>
-                                        <p:cTn id="15" dur="1" fill="hold">
-                                          <p:stCondLst>
-                                            <p:cond delay="0"/>
-                                          </p:stCondLst>
-                                        </p:cTn>
-                                        <p:tgtEl>
-                                          <p:spTgt spid="16"/>
-                                        </p:tgtEl>
-                                        <p:attrNameLst>
-                                          <p:attrName>style.visibility</p:attrName>
-                                        </p:attrNameLst>
-                                      </p:cBhvr>
-                                      <p:to>
-                                        <p:strVal val="visible"/>
-                                      </p:to>
-                                    </p:set>
-                                  </p:childTnLst>
-                                </p:cTn>
-                              </p:par>
-                              <p:par>
-                                <p:cTn id="16" presetID="1" presetClass="entr" presetSubtype="0" fill="hold" nodeType="withEffect">
-                                  <p:stCondLst>
-                                    <p:cond delay="0"/>
-                                  </p:stCondLst>
-                                  <p:childTnLst>
-                                    <p:set>
-                                      <p:cBhvr>
-                                        <p:cTn id="17" dur="1" fill="hold">
-                                          <p:stCondLst>
-                                            <p:cond delay="0"/>
-                                          </p:stCondLst>
-                                        </p:cTn>
-                                        <p:tgtEl>
-                                          <p:spTgt spid="8"/>
-                                        </p:tgtEl>
-                                        <p:attrNameLst>
-                                          <p:attrName>style.visibility</p:attrName>
-                                        </p:attrNameLst>
-                                      </p:cBhvr>
-                                      <p:to>
-                                        <p:strVal val="visible"/>
-                                      </p:to>
-                                    </p:set>
-                                  </p:childTnLst>
-                                </p:cTn>
-                              </p:par>
-                              <p:par>
-                                <p:cTn id="18" presetID="1" presetClass="entr" presetSubtype="0" fill="hold" grpId="0" nodeType="withEffect">
-                                  <p:stCondLst>
-                                    <p:cond delay="0"/>
-                                  </p:stCondLst>
-                                  <p:childTnLst>
-                                    <p:set>
-                                      <p:cBhvr>
-                                        <p:cTn id="19" dur="1" fill="hold">
-                                          <p:stCondLst>
-                                            <p:cond delay="0"/>
-                                          </p:stCondLst>
-                                        </p:cTn>
-                                        <p:tgtEl>
-                                          <p:spTgt spid="15"/>
-                                        </p:tgtEl>
-                                        <p:attrNameLst>
-                                          <p:attrName>style.visibility</p:attrName>
-                                        </p:attrNameLst>
-                                      </p:cBhvr>
-                                      <p:to>
-                                        <p:strVal val="visible"/>
-                                      </p:to>
-                                    </p:set>
-                                  </p:childTnLst>
-                                </p:cTn>
-                              </p:par>
-                            </p:childTnLst>
-                          </p:cTn>
-                        </p:par>
-                      </p:childTnLst>
-                    </p:cTn>
-                  </p:par>
-                  <p:par>
-                    <p:cTn id="20" fill="hold">
-                      <p:stCondLst>
-                        <p:cond delay="indefinite"/>
-                      </p:stCondLst>
-                      <p:childTnLst>
-                        <p:par>
-                          <p:cTn id="21" fill="hold">
-                            <p:stCondLst>
-                              <p:cond delay="0"/>
-                            </p:stCondLst>
-                            <p:childTnLst>
-                              <p:par>
-                                <p:cTn id="22" presetID="1" presetClass="entr" presetSubtype="0" fill="hold" nodeType="clickEffect">
-                                  <p:stCondLst>
-                                    <p:cond delay="0"/>
-                                  </p:stCondLst>
-                                  <p:childTnLst>
-                                    <p:set>
-                                      <p:cBhvr>
-                                        <p:cTn id="23" dur="1" fill="hold">
-                                          <p:stCondLst>
-                                            <p:cond delay="0"/>
-                                          </p:stCondLst>
-                                        </p:cTn>
-                                        <p:tgtEl>
-                                          <p:spTgt spid="18"/>
-                                        </p:tgtEl>
-                                        <p:attrNameLst>
-                                          <p:attrName>style.visibility</p:attrName>
-                                        </p:attrNameLst>
-                                      </p:cBhvr>
-                                      <p:to>
-                                        <p:strVal val="visible"/>
-                                      </p:to>
-                                    </p:set>
-                                  </p:childTnLst>
-                                </p:cTn>
-                              </p:par>
-                            </p:childTnLst>
-                          </p:cTn>
-                        </p:par>
-                        <p:par>
-                          <p:cTn id="24" fill="hold">
-                            <p:stCondLst>
-                              <p:cond delay="0"/>
-                            </p:stCondLst>
-                            <p:childTnLst>
-                              <p:par>
-                                <p:cTn id="25" presetID="1" presetClass="entr" presetSubtype="0" fill="hold" nodeType="afterEffect">
-                                  <p:stCondLst>
-                                    <p:cond delay="0"/>
-                                  </p:stCondLst>
-                                  <p:childTnLst>
-                                    <p:set>
-                                      <p:cBhvr>
-                                        <p:cTn id="26" dur="1" fill="hold">
-                                          <p:stCondLst>
-                                            <p:cond delay="0"/>
-                                          </p:stCondLst>
-                                        </p:cTn>
-                                        <p:tgtEl>
-                                          <p:spTgt spid="5"/>
-                                        </p:tgtEl>
-                                        <p:attrNameLst>
-                                          <p:attrName>style.visibility</p:attrName>
-                                        </p:attrNameLst>
-                                      </p:cBhvr>
-                                      <p:to>
-                                        <p:strVal val="visible"/>
-                                      </p:to>
-                                    </p:set>
-                                  </p:childTnLst>
-                                </p:cTn>
-                              </p:par>
-                              <p:par>
-                                <p:cTn id="27" presetID="1" presetClass="entr" presetSubtype="0" fill="hold" grpId="0" nodeType="withEffect">
-                                  <p:stCondLst>
-                                    <p:cond delay="0"/>
-                                  </p:stCondLst>
-                                  <p:childTnLst>
-                                    <p:set>
-                                      <p:cBhvr>
-                                        <p:cTn id="28" dur="1" fill="hold">
-                                          <p:stCondLst>
-                                            <p:cond delay="0"/>
-                                          </p:stCondLst>
-                                        </p:cTn>
-                                        <p:tgtEl>
-                                          <p:spTgt spid="17"/>
-                                        </p:tgtEl>
-                                        <p:attrNameLst>
-                                          <p:attrName>style.visibility</p:attrName>
-                                        </p:attrNameLst>
-                                      </p:cBhvr>
-                                      <p:to>
-                                        <p:strVal val="visible"/>
-                                      </p:to>
-                                    </p:set>
-                                  </p:childTnLst>
-                                </p:cTn>
-                              </p:par>
-                            </p:childTnLst>
-                          </p:cTn>
-                        </p:par>
-                      </p:childTnLst>
-                    </p:cTn>
-                  </p:par>
-                  <p:par>
-                    <p:cTn id="29" fill="hold">
-                      <p:stCondLst>
-                        <p:cond delay="indefinite"/>
-                      </p:stCondLst>
-                      <p:childTnLst>
-                        <p:par>
-                          <p:cTn id="30" fill="hold">
-                            <p:stCondLst>
-                              <p:cond delay="0"/>
-                            </p:stCondLst>
-                            <p:childTnLst>
-                              <p:par>
-                                <p:cTn id="31" presetID="1" presetClass="entr" presetSubtype="0" fill="hold" nodeType="clickEffect">
-                                  <p:stCondLst>
-                                    <p:cond delay="0"/>
-                                  </p:stCondLst>
-                                  <p:childTnLst>
-                                    <p:set>
-                                      <p:cBhvr>
-                                        <p:cTn id="32" dur="1" fill="hold">
-                                          <p:stCondLst>
-                                            <p:cond delay="0"/>
-                                          </p:stCondLst>
-                                        </p:cTn>
-                                        <p:tgtEl>
-                                          <p:spTgt spid="14"/>
-                                        </p:tgtEl>
-                                        <p:attrNameLst>
-                                          <p:attrName>style.visibility</p:attrName>
-                                        </p:attrNameLst>
-                                      </p:cBhvr>
-                                      <p:to>
-                                        <p:strVal val="visible"/>
-                                      </p:to>
-                                    </p:set>
-                                  </p:childTnLst>
-                                </p:cTn>
-                              </p:par>
-                            </p:childTnLst>
-                          </p:cTn>
-                        </p:par>
-                        <p:par>
-                          <p:cTn id="33" fill="hold">
-                            <p:stCondLst>
-                              <p:cond delay="0"/>
-                            </p:stCondLst>
-                            <p:childTnLst>
-                              <p:par>
-                                <p:cTn id="34" presetID="1" presetClass="entr" presetSubtype="0" fill="hold" nodeType="afterEffect">
-                                  <p:stCondLst>
-                                    <p:cond delay="0"/>
-                                  </p:stCondLst>
-                                  <p:childTnLst>
-                                    <p:set>
-                                      <p:cBhvr>
-                                        <p:cTn id="35" dur="1" fill="hold">
-                                          <p:stCondLst>
-                                            <p:cond delay="0"/>
-                                          </p:stCondLst>
-                                        </p:cTn>
-                                        <p:tgtEl>
-                                          <p:spTgt spid="9"/>
-                                        </p:tgtEl>
-                                        <p:attrNameLst>
-                                          <p:attrName>style.visibility</p:attrName>
-                                        </p:attrNameLst>
-                                      </p:cBhvr>
-                                      <p:to>
-                                        <p:strVal val="visible"/>
-                                      </p:to>
-                                    </p:set>
-                                  </p:childTnLst>
-                                </p:cTn>
-                              </p:par>
-                              <p:par>
-                                <p:cTn id="36" presetID="1" presetClass="entr" presetSubtype="0" fill="hold" grpId="0" nodeType="withEffect">
-                                  <p:stCondLst>
-                                    <p:cond delay="0"/>
-                                  </p:stCondLst>
-                                  <p:childTnLst>
-                                    <p:set>
-                                      <p:cBhvr>
-                                        <p:cTn id="37" dur="1" fill="hold">
-                                          <p:stCondLst>
-                                            <p:cond delay="0"/>
-                                          </p:stCondLst>
-                                        </p:cTn>
-                                        <p:tgtEl>
-                                          <p:spTgt spid="19"/>
-                                        </p:tgtEl>
-                                        <p:attrNameLst>
-                                          <p:attrName>style.visibility</p:attrName>
-                                        </p:attrNameLst>
-                                      </p:cBhvr>
-                                      <p:to>
-                                        <p:strVal val="visible"/>
-                                      </p:to>
-                                    </p:set>
-                                  </p:childTnLst>
-                                </p:cTn>
-                              </p:par>
-                            </p:childTnLst>
-                          </p:cTn>
-                        </p:par>
-                      </p:childTnLst>
-                    </p:cTn>
-                  </p:par>
-                </p:childTnLst>
-              </p:cTn>
-              <p:prevCondLst>
-                <p:cond evt="onPrev" delay="0">
-                  <p:tgtEl>
-                    <p:sldTgt/>
-                  </p:tgtEl>
-                </p:cond>
-              </p:prevCondLst>
-              <p:nextCondLst>
-                <p:cond evt="onNext" delay="0">
-                  <p:tgtEl>
-                    <p:sldTgt/>
-                  </p:tgtEl>
-                </p:cond>
-              </p:nextCondLst>
-            </p:seq>
-          </p:childTnLst>
-        </p:cTn>
-      </p:par>
-    </p:tnLst>
-    <p:bldLst>
-      <p:bldP spid="6" grpId="0"/>
-      <p:bldP spid="15" grpId="0"/>
-      <p:bldP spid="17" grpId="0"/>
-      <p:bldP spid="19" grpId="0"/>
-    </p:bldLst>
-  </p:timing>
-</p:sld>
-</file>
-
-<file path=ppt/slides/slide20.xml><?xml version="1.0" encoding="utf-8"?>
+<file path=ppt/slides/slide18.xml><?xml version="1.0" encoding="utf-8"?>
 <p:sld xmlns:a="http://schemas.openxmlformats.org/drawingml/2006/main" xmlns:r="http://schemas.openxmlformats.org/officeDocument/2006/relationships" xmlns:p="http://schemas.openxmlformats.org/presentationml/2006/main">
   <p:cSld>
     <p:spTree>
@@ -21866,7 +19286,7 @@
 </p:sld>
 </file>
 
-<file path=ppt/slides/slide21.xml><?xml version="1.0" encoding="utf-8"?>
+<file path=ppt/slides/slide19.xml><?xml version="1.0" encoding="utf-8"?>
 <p:sld xmlns:a="http://schemas.openxmlformats.org/drawingml/2006/main" xmlns:r="http://schemas.openxmlformats.org/officeDocument/2006/relationships" xmlns:p="http://schemas.openxmlformats.org/presentationml/2006/main">
   <p:cSld>
     <p:spTree>
@@ -22101,6 +19521,932 @@
   <p:clrMapOvr>
     <a:masterClrMapping/>
   </p:clrMapOvr>
+</p:sld>
+</file>
+
+<file path=ppt/slides/slide2.xml><?xml version="1.0" encoding="utf-8"?>
+<p:sld xmlns:a="http://schemas.openxmlformats.org/drawingml/2006/main" xmlns:r="http://schemas.openxmlformats.org/officeDocument/2006/relationships" xmlns:p="http://schemas.openxmlformats.org/presentationml/2006/main">
+  <p:cSld>
+    <p:spTree>
+      <p:nvGrpSpPr>
+        <p:cNvPr id="1" name=""/>
+        <p:cNvGrpSpPr/>
+        <p:nvPr/>
+      </p:nvGrpSpPr>
+      <p:grpSpPr>
+        <a:xfrm>
+          <a:off x="0" y="0"/>
+          <a:ext cx="0" cy="0"/>
+          <a:chOff x="0" y="0"/>
+          <a:chExt cx="0" cy="0"/>
+        </a:xfrm>
+      </p:grpSpPr>
+      <p:pic>
+        <p:nvPicPr>
+          <p:cNvPr id="9" name="Relays"/>
+          <p:cNvPicPr>
+            <a:picLocks noChangeAspect="1"/>
+          </p:cNvPicPr>
+          <p:nvPr/>
+        </p:nvPicPr>
+        <p:blipFill>
+          <a:blip r:embed="rId3" cstate="print">
+            <a:extLst>
+              <a:ext uri="{28A0092B-C50C-407E-A947-70E740481C1C}">
+                <a14:useLocalDpi xmlns:a14="http://schemas.microsoft.com/office/drawing/2010/main" val="0"/>
+              </a:ext>
+            </a:extLst>
+          </a:blip>
+          <a:stretch>
+            <a:fillRect/>
+          </a:stretch>
+        </p:blipFill>
+        <p:spPr>
+          <a:xfrm>
+            <a:off x="9645678" y="3885523"/>
+            <a:ext cx="780290" cy="780290"/>
+          </a:xfrm>
+          <a:prstGeom prst="rect">
+            <a:avLst/>
+          </a:prstGeom>
+        </p:spPr>
+      </p:pic>
+      <p:cxnSp>
+        <p:nvCxnSpPr>
+          <p:cNvPr id="14" name="Relays connector"/>
+          <p:cNvCxnSpPr>
+            <a:stCxn id="4" idx="2"/>
+            <a:endCxn id="9" idx="0"/>
+          </p:cNvCxnSpPr>
+          <p:nvPr/>
+        </p:nvCxnSpPr>
+        <p:spPr>
+          <a:xfrm rot="16200000" flipH="1">
+            <a:off x="7713347" y="1563047"/>
+            <a:ext cx="801084" cy="3843867"/>
+          </a:xfrm>
+          <a:prstGeom prst="bentConnector3">
+            <a:avLst/>
+          </a:prstGeom>
+        </p:spPr>
+        <p:style>
+          <a:lnRef idx="1">
+            <a:schemeClr val="accent1"/>
+          </a:lnRef>
+          <a:fillRef idx="0">
+            <a:schemeClr val="accent1"/>
+          </a:fillRef>
+          <a:effectRef idx="0">
+            <a:schemeClr val="accent1"/>
+          </a:effectRef>
+          <a:fontRef idx="minor">
+            <a:schemeClr val="tx1"/>
+          </a:fontRef>
+        </p:style>
+      </p:cxnSp>
+      <p:pic>
+        <p:nvPicPr>
+          <p:cNvPr id="5" name="EventHubs"/>
+          <p:cNvPicPr>
+            <a:picLocks noChangeAspect="1"/>
+          </p:cNvPicPr>
+          <p:nvPr/>
+        </p:nvPicPr>
+        <p:blipFill>
+          <a:blip r:embed="rId4" cstate="print">
+            <a:extLst>
+              <a:ext uri="{28A0092B-C50C-407E-A947-70E740481C1C}">
+                <a14:useLocalDpi xmlns:a14="http://schemas.microsoft.com/office/drawing/2010/main" val="0"/>
+              </a:ext>
+            </a:extLst>
+          </a:blip>
+          <a:stretch>
+            <a:fillRect/>
+          </a:stretch>
+        </p:blipFill>
+        <p:spPr>
+          <a:xfrm>
+            <a:off x="7173412" y="3885523"/>
+            <a:ext cx="780290" cy="780290"/>
+          </a:xfrm>
+          <a:prstGeom prst="rect">
+            <a:avLst/>
+          </a:prstGeom>
+        </p:spPr>
+      </p:pic>
+      <p:cxnSp>
+        <p:nvCxnSpPr>
+          <p:cNvPr id="18" name="EventHubs connector"/>
+          <p:cNvCxnSpPr>
+            <a:stCxn id="4" idx="2"/>
+            <a:endCxn id="5" idx="0"/>
+          </p:cNvCxnSpPr>
+          <p:nvPr/>
+        </p:nvCxnSpPr>
+        <p:spPr>
+          <a:xfrm rot="16200000" flipH="1">
+            <a:off x="6477214" y="2799180"/>
+            <a:ext cx="801084" cy="1371601"/>
+          </a:xfrm>
+          <a:prstGeom prst="bentConnector3">
+            <a:avLst/>
+          </a:prstGeom>
+        </p:spPr>
+        <p:style>
+          <a:lnRef idx="1">
+            <a:schemeClr val="accent1"/>
+          </a:lnRef>
+          <a:fillRef idx="0">
+            <a:schemeClr val="accent1"/>
+          </a:fillRef>
+          <a:effectRef idx="0">
+            <a:schemeClr val="accent1"/>
+          </a:effectRef>
+          <a:fontRef idx="minor">
+            <a:schemeClr val="tx1"/>
+          </a:fontRef>
+        </p:style>
+      </p:cxnSp>
+      <p:pic>
+        <p:nvPicPr>
+          <p:cNvPr id="8" name="Topics"/>
+          <p:cNvPicPr>
+            <a:picLocks noChangeAspect="1"/>
+          </p:cNvPicPr>
+          <p:nvPr/>
+        </p:nvPicPr>
+        <p:blipFill>
+          <a:blip r:embed="rId5" cstate="print">
+            <a:extLst>
+              <a:ext uri="{28A0092B-C50C-407E-A947-70E740481C1C}">
+                <a14:useLocalDpi xmlns:a14="http://schemas.microsoft.com/office/drawing/2010/main" val="0"/>
+              </a:ext>
+            </a:extLst>
+          </a:blip>
+          <a:stretch>
+            <a:fillRect/>
+          </a:stretch>
+        </p:blipFill>
+        <p:spPr>
+          <a:xfrm>
+            <a:off x="4701145" y="3885523"/>
+            <a:ext cx="780290" cy="780290"/>
+          </a:xfrm>
+          <a:prstGeom prst="rect">
+            <a:avLst/>
+          </a:prstGeom>
+        </p:spPr>
+      </p:pic>
+      <p:cxnSp>
+        <p:nvCxnSpPr>
+          <p:cNvPr id="16" name="Topics connector"/>
+          <p:cNvCxnSpPr>
+            <a:stCxn id="4" idx="2"/>
+            <a:endCxn id="8" idx="0"/>
+          </p:cNvCxnSpPr>
+          <p:nvPr/>
+        </p:nvCxnSpPr>
+        <p:spPr>
+          <a:xfrm rot="5400000">
+            <a:off x="5241081" y="2934648"/>
+            <a:ext cx="801084" cy="1100666"/>
+          </a:xfrm>
+          <a:prstGeom prst="bentConnector3">
+            <a:avLst/>
+          </a:prstGeom>
+        </p:spPr>
+        <p:style>
+          <a:lnRef idx="1">
+            <a:schemeClr val="accent1"/>
+          </a:lnRef>
+          <a:fillRef idx="0">
+            <a:schemeClr val="accent1"/>
+          </a:fillRef>
+          <a:effectRef idx="0">
+            <a:schemeClr val="accent1"/>
+          </a:effectRef>
+          <a:fontRef idx="minor">
+            <a:schemeClr val="tx1"/>
+          </a:fontRef>
+        </p:style>
+      </p:cxnSp>
+      <p:pic>
+        <p:nvPicPr>
+          <p:cNvPr id="7" name="Queues"/>
+          <p:cNvPicPr>
+            <a:picLocks noChangeAspect="1"/>
+          </p:cNvPicPr>
+          <p:nvPr/>
+        </p:nvPicPr>
+        <p:blipFill>
+          <a:blip r:embed="rId6" cstate="print">
+            <a:extLst>
+              <a:ext uri="{28A0092B-C50C-407E-A947-70E740481C1C}">
+                <a14:useLocalDpi xmlns:a14="http://schemas.microsoft.com/office/drawing/2010/main" val="0"/>
+              </a:ext>
+            </a:extLst>
+          </a:blip>
+          <a:stretch>
+            <a:fillRect/>
+          </a:stretch>
+        </p:blipFill>
+        <p:spPr>
+          <a:xfrm>
+            <a:off x="2228878" y="3885523"/>
+            <a:ext cx="780290" cy="780290"/>
+          </a:xfrm>
+          <a:prstGeom prst="rect">
+            <a:avLst/>
+          </a:prstGeom>
+        </p:spPr>
+      </p:pic>
+      <p:cxnSp>
+        <p:nvCxnSpPr>
+          <p:cNvPr id="12" name="Queues connector"/>
+          <p:cNvCxnSpPr>
+            <a:stCxn id="4" idx="2"/>
+            <a:endCxn id="7" idx="0"/>
+          </p:cNvCxnSpPr>
+          <p:nvPr/>
+        </p:nvCxnSpPr>
+        <p:spPr>
+          <a:xfrm rot="5400000">
+            <a:off x="4004948" y="1698515"/>
+            <a:ext cx="801084" cy="3572933"/>
+          </a:xfrm>
+          <a:prstGeom prst="bentConnector3">
+            <a:avLst/>
+          </a:prstGeom>
+        </p:spPr>
+        <p:style>
+          <a:lnRef idx="1">
+            <a:schemeClr val="accent1"/>
+          </a:lnRef>
+          <a:fillRef idx="0">
+            <a:schemeClr val="accent1"/>
+          </a:fillRef>
+          <a:effectRef idx="0">
+            <a:schemeClr val="accent1"/>
+          </a:effectRef>
+          <a:fontRef idx="minor">
+            <a:schemeClr val="tx1"/>
+          </a:fontRef>
+        </p:style>
+      </p:cxnSp>
+      <p:sp>
+        <p:nvSpPr>
+          <p:cNvPr id="2" name="Title 1"/>
+          <p:cNvSpPr>
+            <a:spLocks noGrp="1"/>
+          </p:cNvSpPr>
+          <p:nvPr>
+            <p:ph type="title"/>
+          </p:nvPr>
+        </p:nvSpPr>
+        <p:spPr>
+          <a:xfrm>
+            <a:off x="0" y="0"/>
+            <a:ext cx="12192000" cy="1325563"/>
+          </a:xfrm>
+          <a:solidFill>
+            <a:srgbClr val="0070C0"/>
+          </a:solidFill>
+        </p:spPr>
+        <p:txBody>
+          <a:bodyPr/>
+          <a:lstStyle/>
+          <a:p>
+            <a:r>
+              <a:rPr lang="en-CA" b="1" dirty="0">
+                <a:solidFill>
+                  <a:schemeClr val="bg1"/>
+                </a:solidFill>
+              </a:rPr>
+              <a:t>Service provided by ASB</a:t>
+            </a:r>
+          </a:p>
+        </p:txBody>
+      </p:sp>
+      <p:pic>
+        <p:nvPicPr>
+          <p:cNvPr id="4" name="Picture 3"/>
+          <p:cNvPicPr>
+            <a:picLocks noChangeAspect="1"/>
+          </p:cNvPicPr>
+          <p:nvPr/>
+        </p:nvPicPr>
+        <p:blipFill>
+          <a:blip r:embed="rId7" cstate="print">
+            <a:extLst>
+              <a:ext uri="{28A0092B-C50C-407E-A947-70E740481C1C}">
+                <a14:useLocalDpi xmlns:a14="http://schemas.microsoft.com/office/drawing/2010/main" val="0"/>
+              </a:ext>
+            </a:extLst>
+          </a:blip>
+          <a:stretch>
+            <a:fillRect/>
+          </a:stretch>
+        </p:blipFill>
+        <p:spPr>
+          <a:xfrm>
+            <a:off x="5801811" y="2304149"/>
+            <a:ext cx="780290" cy="780290"/>
+          </a:xfrm>
+          <a:prstGeom prst="rect">
+            <a:avLst/>
+          </a:prstGeom>
+        </p:spPr>
+      </p:pic>
+      <p:sp>
+        <p:nvSpPr>
+          <p:cNvPr id="6" name="TextBox 5"/>
+          <p:cNvSpPr txBox="1"/>
+          <p:nvPr/>
+        </p:nvSpPr>
+        <p:spPr>
+          <a:xfrm>
+            <a:off x="2008598" y="4665813"/>
+            <a:ext cx="1176391" cy="369332"/>
+          </a:xfrm>
+          <a:prstGeom prst="rect">
+            <a:avLst/>
+          </a:prstGeom>
+          <a:noFill/>
+        </p:spPr>
+        <p:txBody>
+          <a:bodyPr wrap="square" rtlCol="0">
+            <a:spAutoFit/>
+          </a:bodyPr>
+          <a:lstStyle/>
+          <a:p>
+            <a:pPr algn="ctr"/>
+            <a:r>
+              <a:rPr lang="en-CA" dirty="0"/>
+              <a:t>Queues</a:t>
+            </a:r>
+          </a:p>
+        </p:txBody>
+      </p:sp>
+      <p:sp>
+        <p:nvSpPr>
+          <p:cNvPr id="15" name="TextBox 14"/>
+          <p:cNvSpPr txBox="1"/>
+          <p:nvPr/>
+        </p:nvSpPr>
+        <p:spPr>
+          <a:xfrm>
+            <a:off x="4305044" y="4665813"/>
+            <a:ext cx="1571774" cy="646331"/>
+          </a:xfrm>
+          <a:prstGeom prst="rect">
+            <a:avLst/>
+          </a:prstGeom>
+          <a:noFill/>
+        </p:spPr>
+        <p:txBody>
+          <a:bodyPr wrap="square" rtlCol="0">
+            <a:spAutoFit/>
+          </a:bodyPr>
+          <a:lstStyle/>
+          <a:p>
+            <a:pPr algn="ctr"/>
+            <a:r>
+              <a:rPr lang="en-CA" dirty="0"/>
+              <a:t>Topics &amp; Subscriptions</a:t>
+            </a:r>
+          </a:p>
+        </p:txBody>
+      </p:sp>
+      <p:sp>
+        <p:nvSpPr>
+          <p:cNvPr id="17" name="TextBox 16"/>
+          <p:cNvSpPr txBox="1"/>
+          <p:nvPr/>
+        </p:nvSpPr>
+        <p:spPr>
+          <a:xfrm>
+            <a:off x="6975361" y="4665813"/>
+            <a:ext cx="1176391" cy="369332"/>
+          </a:xfrm>
+          <a:prstGeom prst="rect">
+            <a:avLst/>
+          </a:prstGeom>
+          <a:noFill/>
+        </p:spPr>
+        <p:txBody>
+          <a:bodyPr wrap="square" rtlCol="0">
+            <a:spAutoFit/>
+          </a:bodyPr>
+          <a:lstStyle/>
+          <a:p>
+            <a:pPr algn="ctr"/>
+            <a:r>
+              <a:rPr lang="en-CA" dirty="0" err="1"/>
+              <a:t>EventHubs</a:t>
+            </a:r>
+            <a:endParaRPr lang="en-CA" dirty="0"/>
+          </a:p>
+        </p:txBody>
+      </p:sp>
+      <p:sp>
+        <p:nvSpPr>
+          <p:cNvPr id="19" name="TextBox 18"/>
+          <p:cNvSpPr txBox="1"/>
+          <p:nvPr/>
+        </p:nvSpPr>
+        <p:spPr>
+          <a:xfrm>
+            <a:off x="9447628" y="4665813"/>
+            <a:ext cx="1176391" cy="369332"/>
+          </a:xfrm>
+          <a:prstGeom prst="rect">
+            <a:avLst/>
+          </a:prstGeom>
+          <a:noFill/>
+        </p:spPr>
+        <p:txBody>
+          <a:bodyPr wrap="square" rtlCol="0">
+            <a:spAutoFit/>
+          </a:bodyPr>
+          <a:lstStyle/>
+          <a:p>
+            <a:pPr algn="ctr"/>
+            <a:r>
+              <a:rPr lang="en-CA" dirty="0"/>
+              <a:t>Relays</a:t>
+            </a:r>
+          </a:p>
+        </p:txBody>
+      </p:sp>
+    </p:spTree>
+    <p:extLst>
+      <p:ext uri="{BB962C8B-B14F-4D97-AF65-F5344CB8AC3E}">
+        <p14:creationId xmlns:p14="http://schemas.microsoft.com/office/powerpoint/2010/main" val="3222334169"/>
+      </p:ext>
+    </p:extLst>
+  </p:cSld>
+  <p:clrMapOvr>
+    <a:masterClrMapping/>
+  </p:clrMapOvr>
+  <p:timing>
+    <p:tnLst>
+      <p:par>
+        <p:cTn id="1" dur="indefinite" restart="never" nodeType="tmRoot">
+          <p:childTnLst>
+            <p:seq concurrent="1" nextAc="seek">
+              <p:cTn id="2" dur="indefinite" nodeType="mainSeq">
+                <p:childTnLst>
+                  <p:par>
+                    <p:cTn id="3" fill="hold">
+                      <p:stCondLst>
+                        <p:cond delay="indefinite"/>
+                      </p:stCondLst>
+                      <p:childTnLst>
+                        <p:par>
+                          <p:cTn id="4" fill="hold">
+                            <p:stCondLst>
+                              <p:cond delay="0"/>
+                            </p:stCondLst>
+                            <p:childTnLst>
+                              <p:par>
+                                <p:cTn id="5" presetID="1" presetClass="entr" presetSubtype="0" fill="hold" nodeType="clickEffect">
+                                  <p:stCondLst>
+                                    <p:cond delay="0"/>
+                                  </p:stCondLst>
+                                  <p:childTnLst>
+                                    <p:set>
+                                      <p:cBhvr>
+                                        <p:cTn id="6" dur="1" fill="hold">
+                                          <p:stCondLst>
+                                            <p:cond delay="0"/>
+                                          </p:stCondLst>
+                                        </p:cTn>
+                                        <p:tgtEl>
+                                          <p:spTgt spid="12"/>
+                                        </p:tgtEl>
+                                        <p:attrNameLst>
+                                          <p:attrName>style.visibility</p:attrName>
+                                        </p:attrNameLst>
+                                      </p:cBhvr>
+                                      <p:to>
+                                        <p:strVal val="visible"/>
+                                      </p:to>
+                                    </p:set>
+                                  </p:childTnLst>
+                                </p:cTn>
+                              </p:par>
+                            </p:childTnLst>
+                          </p:cTn>
+                        </p:par>
+                        <p:par>
+                          <p:cTn id="7" fill="hold">
+                            <p:stCondLst>
+                              <p:cond delay="0"/>
+                            </p:stCondLst>
+                            <p:childTnLst>
+                              <p:par>
+                                <p:cTn id="8" presetID="1" presetClass="entr" presetSubtype="0" fill="hold" nodeType="afterEffect">
+                                  <p:stCondLst>
+                                    <p:cond delay="0"/>
+                                  </p:stCondLst>
+                                  <p:childTnLst>
+                                    <p:set>
+                                      <p:cBhvr>
+                                        <p:cTn id="9" dur="1" fill="hold">
+                                          <p:stCondLst>
+                                            <p:cond delay="0"/>
+                                          </p:stCondLst>
+                                        </p:cTn>
+                                        <p:tgtEl>
+                                          <p:spTgt spid="7"/>
+                                        </p:tgtEl>
+                                        <p:attrNameLst>
+                                          <p:attrName>style.visibility</p:attrName>
+                                        </p:attrNameLst>
+                                      </p:cBhvr>
+                                      <p:to>
+                                        <p:strVal val="visible"/>
+                                      </p:to>
+                                    </p:set>
+                                  </p:childTnLst>
+                                </p:cTn>
+                              </p:par>
+                              <p:par>
+                                <p:cTn id="10" presetID="1" presetClass="entr" presetSubtype="0" fill="hold" grpId="0" nodeType="withEffect">
+                                  <p:stCondLst>
+                                    <p:cond delay="0"/>
+                                  </p:stCondLst>
+                                  <p:childTnLst>
+                                    <p:set>
+                                      <p:cBhvr>
+                                        <p:cTn id="11" dur="1" fill="hold">
+                                          <p:stCondLst>
+                                            <p:cond delay="0"/>
+                                          </p:stCondLst>
+                                        </p:cTn>
+                                        <p:tgtEl>
+                                          <p:spTgt spid="6"/>
+                                        </p:tgtEl>
+                                        <p:attrNameLst>
+                                          <p:attrName>style.visibility</p:attrName>
+                                        </p:attrNameLst>
+                                      </p:cBhvr>
+                                      <p:to>
+                                        <p:strVal val="visible"/>
+                                      </p:to>
+                                    </p:set>
+                                  </p:childTnLst>
+                                </p:cTn>
+                              </p:par>
+                            </p:childTnLst>
+                          </p:cTn>
+                        </p:par>
+                      </p:childTnLst>
+                    </p:cTn>
+                  </p:par>
+                  <p:par>
+                    <p:cTn id="12" fill="hold">
+                      <p:stCondLst>
+                        <p:cond delay="indefinite"/>
+                      </p:stCondLst>
+                      <p:childTnLst>
+                        <p:par>
+                          <p:cTn id="13" fill="hold">
+                            <p:stCondLst>
+                              <p:cond delay="0"/>
+                            </p:stCondLst>
+                            <p:childTnLst>
+                              <p:par>
+                                <p:cTn id="14" presetID="1" presetClass="entr" presetSubtype="0" fill="hold" nodeType="clickEffect">
+                                  <p:stCondLst>
+                                    <p:cond delay="0"/>
+                                  </p:stCondLst>
+                                  <p:childTnLst>
+                                    <p:set>
+                                      <p:cBhvr>
+                                        <p:cTn id="15" dur="1" fill="hold">
+                                          <p:stCondLst>
+                                            <p:cond delay="0"/>
+                                          </p:stCondLst>
+                                        </p:cTn>
+                                        <p:tgtEl>
+                                          <p:spTgt spid="16"/>
+                                        </p:tgtEl>
+                                        <p:attrNameLst>
+                                          <p:attrName>style.visibility</p:attrName>
+                                        </p:attrNameLst>
+                                      </p:cBhvr>
+                                      <p:to>
+                                        <p:strVal val="visible"/>
+                                      </p:to>
+                                    </p:set>
+                                  </p:childTnLst>
+                                </p:cTn>
+                              </p:par>
+                              <p:par>
+                                <p:cTn id="16" presetID="1" presetClass="entr" presetSubtype="0" fill="hold" nodeType="withEffect">
+                                  <p:stCondLst>
+                                    <p:cond delay="0"/>
+                                  </p:stCondLst>
+                                  <p:childTnLst>
+                                    <p:set>
+                                      <p:cBhvr>
+                                        <p:cTn id="17" dur="1" fill="hold">
+                                          <p:stCondLst>
+                                            <p:cond delay="0"/>
+                                          </p:stCondLst>
+                                        </p:cTn>
+                                        <p:tgtEl>
+                                          <p:spTgt spid="8"/>
+                                        </p:tgtEl>
+                                        <p:attrNameLst>
+                                          <p:attrName>style.visibility</p:attrName>
+                                        </p:attrNameLst>
+                                      </p:cBhvr>
+                                      <p:to>
+                                        <p:strVal val="visible"/>
+                                      </p:to>
+                                    </p:set>
+                                  </p:childTnLst>
+                                </p:cTn>
+                              </p:par>
+                              <p:par>
+                                <p:cTn id="18" presetID="1" presetClass="entr" presetSubtype="0" fill="hold" grpId="0" nodeType="withEffect">
+                                  <p:stCondLst>
+                                    <p:cond delay="0"/>
+                                  </p:stCondLst>
+                                  <p:childTnLst>
+                                    <p:set>
+                                      <p:cBhvr>
+                                        <p:cTn id="19" dur="1" fill="hold">
+                                          <p:stCondLst>
+                                            <p:cond delay="0"/>
+                                          </p:stCondLst>
+                                        </p:cTn>
+                                        <p:tgtEl>
+                                          <p:spTgt spid="15"/>
+                                        </p:tgtEl>
+                                        <p:attrNameLst>
+                                          <p:attrName>style.visibility</p:attrName>
+                                        </p:attrNameLst>
+                                      </p:cBhvr>
+                                      <p:to>
+                                        <p:strVal val="visible"/>
+                                      </p:to>
+                                    </p:set>
+                                  </p:childTnLst>
+                                </p:cTn>
+                              </p:par>
+                            </p:childTnLst>
+                          </p:cTn>
+                        </p:par>
+                      </p:childTnLst>
+                    </p:cTn>
+                  </p:par>
+                  <p:par>
+                    <p:cTn id="20" fill="hold">
+                      <p:stCondLst>
+                        <p:cond delay="indefinite"/>
+                      </p:stCondLst>
+                      <p:childTnLst>
+                        <p:par>
+                          <p:cTn id="21" fill="hold">
+                            <p:stCondLst>
+                              <p:cond delay="0"/>
+                            </p:stCondLst>
+                            <p:childTnLst>
+                              <p:par>
+                                <p:cTn id="22" presetID="1" presetClass="entr" presetSubtype="0" fill="hold" nodeType="clickEffect">
+                                  <p:stCondLst>
+                                    <p:cond delay="0"/>
+                                  </p:stCondLst>
+                                  <p:childTnLst>
+                                    <p:set>
+                                      <p:cBhvr>
+                                        <p:cTn id="23" dur="1" fill="hold">
+                                          <p:stCondLst>
+                                            <p:cond delay="0"/>
+                                          </p:stCondLst>
+                                        </p:cTn>
+                                        <p:tgtEl>
+                                          <p:spTgt spid="18"/>
+                                        </p:tgtEl>
+                                        <p:attrNameLst>
+                                          <p:attrName>style.visibility</p:attrName>
+                                        </p:attrNameLst>
+                                      </p:cBhvr>
+                                      <p:to>
+                                        <p:strVal val="visible"/>
+                                      </p:to>
+                                    </p:set>
+                                  </p:childTnLst>
+                                </p:cTn>
+                              </p:par>
+                            </p:childTnLst>
+                          </p:cTn>
+                        </p:par>
+                        <p:par>
+                          <p:cTn id="24" fill="hold">
+                            <p:stCondLst>
+                              <p:cond delay="0"/>
+                            </p:stCondLst>
+                            <p:childTnLst>
+                              <p:par>
+                                <p:cTn id="25" presetID="1" presetClass="entr" presetSubtype="0" fill="hold" nodeType="afterEffect">
+                                  <p:stCondLst>
+                                    <p:cond delay="0"/>
+                                  </p:stCondLst>
+                                  <p:childTnLst>
+                                    <p:set>
+                                      <p:cBhvr>
+                                        <p:cTn id="26" dur="1" fill="hold">
+                                          <p:stCondLst>
+                                            <p:cond delay="0"/>
+                                          </p:stCondLst>
+                                        </p:cTn>
+                                        <p:tgtEl>
+                                          <p:spTgt spid="5"/>
+                                        </p:tgtEl>
+                                        <p:attrNameLst>
+                                          <p:attrName>style.visibility</p:attrName>
+                                        </p:attrNameLst>
+                                      </p:cBhvr>
+                                      <p:to>
+                                        <p:strVal val="visible"/>
+                                      </p:to>
+                                    </p:set>
+                                  </p:childTnLst>
+                                </p:cTn>
+                              </p:par>
+                              <p:par>
+                                <p:cTn id="27" presetID="1" presetClass="entr" presetSubtype="0" fill="hold" grpId="0" nodeType="withEffect">
+                                  <p:stCondLst>
+                                    <p:cond delay="0"/>
+                                  </p:stCondLst>
+                                  <p:childTnLst>
+                                    <p:set>
+                                      <p:cBhvr>
+                                        <p:cTn id="28" dur="1" fill="hold">
+                                          <p:stCondLst>
+                                            <p:cond delay="0"/>
+                                          </p:stCondLst>
+                                        </p:cTn>
+                                        <p:tgtEl>
+                                          <p:spTgt spid="17"/>
+                                        </p:tgtEl>
+                                        <p:attrNameLst>
+                                          <p:attrName>style.visibility</p:attrName>
+                                        </p:attrNameLst>
+                                      </p:cBhvr>
+                                      <p:to>
+                                        <p:strVal val="visible"/>
+                                      </p:to>
+                                    </p:set>
+                                  </p:childTnLst>
+                                </p:cTn>
+                              </p:par>
+                            </p:childTnLst>
+                          </p:cTn>
+                        </p:par>
+                      </p:childTnLst>
+                    </p:cTn>
+                  </p:par>
+                  <p:par>
+                    <p:cTn id="29" fill="hold">
+                      <p:stCondLst>
+                        <p:cond delay="indefinite"/>
+                      </p:stCondLst>
+                      <p:childTnLst>
+                        <p:par>
+                          <p:cTn id="30" fill="hold">
+                            <p:stCondLst>
+                              <p:cond delay="0"/>
+                            </p:stCondLst>
+                            <p:childTnLst>
+                              <p:par>
+                                <p:cTn id="31" presetID="1" presetClass="entr" presetSubtype="0" fill="hold" nodeType="clickEffect">
+                                  <p:stCondLst>
+                                    <p:cond delay="0"/>
+                                  </p:stCondLst>
+                                  <p:childTnLst>
+                                    <p:set>
+                                      <p:cBhvr>
+                                        <p:cTn id="32" dur="1" fill="hold">
+                                          <p:stCondLst>
+                                            <p:cond delay="0"/>
+                                          </p:stCondLst>
+                                        </p:cTn>
+                                        <p:tgtEl>
+                                          <p:spTgt spid="14"/>
+                                        </p:tgtEl>
+                                        <p:attrNameLst>
+                                          <p:attrName>style.visibility</p:attrName>
+                                        </p:attrNameLst>
+                                      </p:cBhvr>
+                                      <p:to>
+                                        <p:strVal val="visible"/>
+                                      </p:to>
+                                    </p:set>
+                                  </p:childTnLst>
+                                </p:cTn>
+                              </p:par>
+                            </p:childTnLst>
+                          </p:cTn>
+                        </p:par>
+                        <p:par>
+                          <p:cTn id="33" fill="hold">
+                            <p:stCondLst>
+                              <p:cond delay="0"/>
+                            </p:stCondLst>
+                            <p:childTnLst>
+                              <p:par>
+                                <p:cTn id="34" presetID="1" presetClass="entr" presetSubtype="0" fill="hold" nodeType="afterEffect">
+                                  <p:stCondLst>
+                                    <p:cond delay="0"/>
+                                  </p:stCondLst>
+                                  <p:childTnLst>
+                                    <p:set>
+                                      <p:cBhvr>
+                                        <p:cTn id="35" dur="1" fill="hold">
+                                          <p:stCondLst>
+                                            <p:cond delay="0"/>
+                                          </p:stCondLst>
+                                        </p:cTn>
+                                        <p:tgtEl>
+                                          <p:spTgt spid="9"/>
+                                        </p:tgtEl>
+                                        <p:attrNameLst>
+                                          <p:attrName>style.visibility</p:attrName>
+                                        </p:attrNameLst>
+                                      </p:cBhvr>
+                                      <p:to>
+                                        <p:strVal val="visible"/>
+                                      </p:to>
+                                    </p:set>
+                                  </p:childTnLst>
+                                </p:cTn>
+                              </p:par>
+                              <p:par>
+                                <p:cTn id="36" presetID="1" presetClass="entr" presetSubtype="0" fill="hold" grpId="0" nodeType="withEffect">
+                                  <p:stCondLst>
+                                    <p:cond delay="0"/>
+                                  </p:stCondLst>
+                                  <p:childTnLst>
+                                    <p:set>
+                                      <p:cBhvr>
+                                        <p:cTn id="37" dur="1" fill="hold">
+                                          <p:stCondLst>
+                                            <p:cond delay="0"/>
+                                          </p:stCondLst>
+                                        </p:cTn>
+                                        <p:tgtEl>
+                                          <p:spTgt spid="19"/>
+                                        </p:tgtEl>
+                                        <p:attrNameLst>
+                                          <p:attrName>style.visibility</p:attrName>
+                                        </p:attrNameLst>
+                                      </p:cBhvr>
+                                      <p:to>
+                                        <p:strVal val="visible"/>
+                                      </p:to>
+                                    </p:set>
+                                  </p:childTnLst>
+                                </p:cTn>
+                              </p:par>
+                            </p:childTnLst>
+                          </p:cTn>
+                        </p:par>
+                      </p:childTnLst>
+                    </p:cTn>
+                  </p:par>
+                </p:childTnLst>
+              </p:cTn>
+              <p:prevCondLst>
+                <p:cond evt="onPrev" delay="0">
+                  <p:tgtEl>
+                    <p:sldTgt/>
+                  </p:tgtEl>
+                </p:cond>
+              </p:prevCondLst>
+              <p:nextCondLst>
+                <p:cond evt="onNext" delay="0">
+                  <p:tgtEl>
+                    <p:sldTgt/>
+                  </p:tgtEl>
+                </p:cond>
+              </p:nextCondLst>
+            </p:seq>
+          </p:childTnLst>
+        </p:cTn>
+      </p:par>
+    </p:tnLst>
+    <p:bldLst>
+      <p:bldP spid="6" grpId="0"/>
+      <p:bldP spid="15" grpId="0"/>
+      <p:bldP spid="17" grpId="0"/>
+      <p:bldP spid="19" grpId="0"/>
+    </p:bldLst>
+  </p:timing>
 </p:sld>
 </file>
 

</xml_diff>

<commit_message>
fixed diagram for topics/subscriptions
</commit_message>
<xml_diff>
--- a/Azure Service Bus Calgary .NET usergroup 2016-03-24.pptx
+++ b/Azure Service Bus Calgary .NET usergroup 2016-03-24.pptx
@@ -12577,7 +12577,7 @@
               <a:pPr algn="ctr"/>
               <a:r>
                 <a:rPr lang="en-CA" sz="2000" b="1" dirty="0">
-                  <a:hlinkClick r:id="rId4" action="ppaction://program"/>
+                  <a:hlinkClick r:id="rId2" action="ppaction://program"/>
                 </a:rPr>
                 <a:t>Demo</a:t>
               </a:r>
@@ -17514,7 +17514,7 @@
         </p:nvSpPr>
         <p:spPr>
           <a:xfrm>
-            <a:off x="1818231" y="1950367"/>
+            <a:off x="1818231" y="1678106"/>
             <a:ext cx="1596236" cy="375274"/>
           </a:xfrm>
           <a:prstGeom prst="rect">
@@ -17559,7 +17559,7 @@
         </p:nvSpPr>
         <p:spPr>
           <a:xfrm>
-            <a:off x="2780200" y="2580458"/>
+            <a:off x="2780200" y="2308197"/>
             <a:ext cx="2214644" cy="369332"/>
           </a:xfrm>
           <a:prstGeom prst="rect">
@@ -17599,7 +17599,7 @@
         </p:nvSpPr>
         <p:spPr>
           <a:xfrm>
-            <a:off x="4122730" y="3204607"/>
+            <a:off x="4122730" y="2932346"/>
             <a:ext cx="872114" cy="369332"/>
           </a:xfrm>
           <a:prstGeom prst="rect">
@@ -17639,7 +17639,7 @@
         </p:nvSpPr>
         <p:spPr>
           <a:xfrm>
-            <a:off x="4994845" y="3865754"/>
+            <a:off x="4994845" y="3593493"/>
             <a:ext cx="1569806" cy="369332"/>
           </a:xfrm>
           <a:prstGeom prst="rect">
@@ -17680,7 +17680,7 @@
         </p:nvSpPr>
         <p:spPr>
           <a:xfrm>
-            <a:off x="4994844" y="4770040"/>
+            <a:off x="4994844" y="5432724"/>
             <a:ext cx="1569807" cy="369332"/>
           </a:xfrm>
           <a:prstGeom prst="rect">
@@ -17717,15 +17717,14 @@
         <p:nvCxnSpPr>
           <p:cNvPr id="12" name="Elbow Connector 11"/>
           <p:cNvCxnSpPr>
-            <a:stCxn id="5" idx="2"/>
-            <a:endCxn id="6" idx="1"/>
+            <a:endCxn id="9" idx="1"/>
           </p:cNvCxnSpPr>
           <p:nvPr/>
         </p:nvCxnSpPr>
         <p:spPr>
           <a:xfrm rot="16200000" flipH="1">
-            <a:off x="2478533" y="2463456"/>
-            <a:ext cx="439483" cy="163851"/>
+            <a:off x="4550468" y="3333781"/>
+            <a:ext cx="476481" cy="412273"/>
           </a:xfrm>
           <a:prstGeom prst="bentConnector2">
             <a:avLst/>
@@ -17762,7 +17761,7 @@
         </p:nvCxnSpPr>
         <p:spPr>
           <a:xfrm rot="10800000">
-            <a:off x="3887522" y="2949791"/>
+            <a:off x="3887522" y="2677530"/>
             <a:ext cx="235208" cy="439483"/>
           </a:xfrm>
           <a:prstGeom prst="bentConnector2">
@@ -17789,97 +17788,6 @@
           </a:fontRef>
         </p:style>
       </p:cxnSp>
-      <p:grpSp>
-        <p:nvGrpSpPr>
-          <p:cNvPr id="22" name="Group 21"/>
-          <p:cNvGrpSpPr/>
-          <p:nvPr/>
-        </p:nvGrpSpPr>
-        <p:grpSpPr>
-          <a:xfrm>
-            <a:off x="4558787" y="3573940"/>
-            <a:ext cx="436058" cy="1380767"/>
-            <a:chOff x="4902350" y="3954502"/>
-            <a:chExt cx="436058" cy="1380767"/>
-          </a:xfrm>
-        </p:grpSpPr>
-        <p:cxnSp>
-          <p:nvCxnSpPr>
-            <p:cNvPr id="16" name="Elbow Connector 15"/>
-            <p:cNvCxnSpPr>
-              <a:stCxn id="10" idx="1"/>
-              <a:endCxn id="8" idx="2"/>
-            </p:cNvCxnSpPr>
-            <p:nvPr/>
-          </p:nvCxnSpPr>
-          <p:spPr>
-            <a:xfrm rot="10800000">
-              <a:off x="4902351" y="3954502"/>
-              <a:ext cx="436057" cy="1380767"/>
-            </a:xfrm>
-            <a:prstGeom prst="bentConnector2">
-              <a:avLst/>
-            </a:prstGeom>
-            <a:ln w="19050">
-              <a:solidFill>
-                <a:schemeClr val="tx1"/>
-              </a:solidFill>
-            </a:ln>
-          </p:spPr>
-          <p:style>
-            <a:lnRef idx="1">
-              <a:schemeClr val="accent1"/>
-            </a:lnRef>
-            <a:fillRef idx="0">
-              <a:schemeClr val="accent1"/>
-            </a:fillRef>
-            <a:effectRef idx="0">
-              <a:schemeClr val="accent1"/>
-            </a:effectRef>
-            <a:fontRef idx="minor">
-              <a:schemeClr val="tx1"/>
-            </a:fontRef>
-          </p:style>
-        </p:cxnSp>
-        <p:cxnSp>
-          <p:nvCxnSpPr>
-            <p:cNvPr id="19" name="Elbow Connector 18"/>
-            <p:cNvCxnSpPr>
-              <a:stCxn id="9" idx="1"/>
-              <a:endCxn id="8" idx="2"/>
-            </p:cNvCxnSpPr>
-            <p:nvPr/>
-          </p:nvCxnSpPr>
-          <p:spPr>
-            <a:xfrm rot="10800000">
-              <a:off x="4902350" y="3954502"/>
-              <a:ext cx="436058" cy="476481"/>
-            </a:xfrm>
-            <a:prstGeom prst="bentConnector2">
-              <a:avLst/>
-            </a:prstGeom>
-            <a:ln w="19050">
-              <a:solidFill>
-                <a:schemeClr val="tx1"/>
-              </a:solidFill>
-            </a:ln>
-          </p:spPr>
-          <p:style>
-            <a:lnRef idx="1">
-              <a:schemeClr val="accent1"/>
-            </a:lnRef>
-            <a:fillRef idx="0">
-              <a:schemeClr val="accent1"/>
-            </a:fillRef>
-            <a:effectRef idx="0">
-              <a:schemeClr val="accent1"/>
-            </a:effectRef>
-            <a:fontRef idx="minor">
-              <a:schemeClr val="tx1"/>
-            </a:fontRef>
-          </p:style>
-        </p:cxnSp>
-      </p:grpSp>
       <p:sp>
         <p:nvSpPr>
           <p:cNvPr id="26" name="TextBox 25"/>
@@ -17888,7 +17796,7 @@
         </p:nvSpPr>
         <p:spPr>
           <a:xfrm>
-            <a:off x="6776071" y="3681088"/>
+            <a:off x="6776071" y="3408827"/>
             <a:ext cx="782262" cy="369332"/>
           </a:xfrm>
           <a:prstGeom prst="rect">
@@ -17928,7 +17836,7 @@
         </p:nvSpPr>
         <p:spPr>
           <a:xfrm>
-            <a:off x="6776071" y="4103995"/>
+            <a:off x="6776071" y="3831734"/>
             <a:ext cx="782262" cy="369332"/>
           </a:xfrm>
           <a:prstGeom prst="rect">
@@ -17968,7 +17876,7 @@
         </p:nvSpPr>
         <p:spPr>
           <a:xfrm>
-            <a:off x="6776071" y="4595488"/>
+            <a:off x="6776071" y="5258172"/>
             <a:ext cx="782262" cy="369332"/>
           </a:xfrm>
           <a:prstGeom prst="rect">
@@ -18008,7 +17916,7 @@
         </p:nvSpPr>
         <p:spPr>
           <a:xfrm>
-            <a:off x="6776071" y="5018395"/>
+            <a:off x="6776071" y="5681079"/>
             <a:ext cx="782262" cy="369332"/>
           </a:xfrm>
           <a:prstGeom prst="rect">
@@ -18048,9 +17956,9 @@
         </p:nvGrpSpPr>
         <p:grpSpPr>
           <a:xfrm>
-            <a:off x="6564651" y="3865754"/>
+            <a:off x="6564651" y="3588356"/>
             <a:ext cx="211420" cy="422908"/>
-            <a:chOff x="6908214" y="4246316"/>
+            <a:chOff x="6908214" y="4241179"/>
             <a:chExt cx="211420" cy="422908"/>
           </a:xfrm>
         </p:grpSpPr>
@@ -18065,7 +17973,7 @@
           </p:nvCxnSpPr>
           <p:spPr>
             <a:xfrm rot="10800000" flipV="1">
-              <a:off x="6908214" y="4246316"/>
+              <a:off x="6908214" y="4241179"/>
               <a:ext cx="211420" cy="184666"/>
             </a:xfrm>
             <a:prstGeom prst="bentConnector3">
@@ -18105,7 +18013,7 @@
           </p:nvCxnSpPr>
           <p:spPr>
             <a:xfrm rot="10800000">
-              <a:off x="6908214" y="4430983"/>
+              <a:off x="6908214" y="4425846"/>
               <a:ext cx="211420" cy="238241"/>
             </a:xfrm>
             <a:prstGeom prst="bentConnector3">
@@ -18143,7 +18051,7 @@
         </p:nvGrpSpPr>
         <p:grpSpPr>
           <a:xfrm>
-            <a:off x="6564650" y="4753366"/>
+            <a:off x="6564650" y="5416050"/>
             <a:ext cx="211421" cy="422908"/>
             <a:chOff x="6908214" y="4246316"/>
             <a:chExt cx="211421" cy="422908"/>
@@ -18232,7 +18140,7 @@
         </p:nvSpPr>
         <p:spPr>
           <a:xfrm>
-            <a:off x="8018176" y="2622743"/>
+            <a:off x="8018176" y="2350482"/>
             <a:ext cx="3192471" cy="951196"/>
           </a:xfrm>
           <a:prstGeom prst="wedgeRoundRectCallout">
@@ -18281,13 +18189,13 @@
         </p:nvSpPr>
         <p:spPr>
           <a:xfrm>
-            <a:off x="8018176" y="4656565"/>
+            <a:off x="8018176" y="4727177"/>
             <a:ext cx="3192471" cy="688873"/>
           </a:xfrm>
           <a:prstGeom prst="wedgeRoundRectCallout">
             <a:avLst>
-              <a:gd name="adj1" fmla="val -63713"/>
-              <a:gd name="adj2" fmla="val -25214"/>
+              <a:gd name="adj1" fmla="val -62587"/>
+              <a:gd name="adj2" fmla="val 57561"/>
               <a:gd name="adj3" fmla="val 16667"/>
             </a:avLst>
           </a:prstGeom>
@@ -18334,7 +18242,7 @@
         </p:nvSpPr>
         <p:spPr>
           <a:xfrm>
-            <a:off x="8018176" y="3938637"/>
+            <a:off x="8018176" y="3666376"/>
             <a:ext cx="3192471" cy="529173"/>
           </a:xfrm>
           <a:prstGeom prst="wedgeRoundRectCallout">
@@ -18379,13 +18287,13 @@
         </p:nvSpPr>
         <p:spPr>
           <a:xfrm>
-            <a:off x="8018176" y="5661724"/>
+            <a:off x="8018176" y="5873052"/>
             <a:ext cx="3192471" cy="529173"/>
           </a:xfrm>
           <a:prstGeom prst="wedgeRoundRectCallout">
             <a:avLst>
-              <a:gd name="adj1" fmla="val -64874"/>
-              <a:gd name="adj2" fmla="val -120973"/>
+              <a:gd name="adj1" fmla="val -62943"/>
+              <a:gd name="adj2" fmla="val -57873"/>
               <a:gd name="adj3" fmla="val 16667"/>
             </a:avLst>
           </a:prstGeom>
@@ -18490,6 +18398,287 @@
           </p:txBody>
         </p:sp>
       </p:grpSp>
+      <p:sp>
+        <p:nvSpPr>
+          <p:cNvPr id="42" name="TextBox 41"/>
+          <p:cNvSpPr txBox="1"/>
+          <p:nvPr/>
+        </p:nvSpPr>
+        <p:spPr>
+          <a:xfrm>
+            <a:off x="2780200" y="4193270"/>
+            <a:ext cx="2214644" cy="369332"/>
+          </a:xfrm>
+          <a:prstGeom prst="rect">
+            <a:avLst/>
+          </a:prstGeom>
+          <a:solidFill>
+            <a:schemeClr val="accent1">
+              <a:lumMod val="20000"/>
+              <a:lumOff val="80000"/>
+            </a:schemeClr>
+          </a:solidFill>
+          <a:ln>
+            <a:solidFill>
+              <a:schemeClr val="tx1"/>
+            </a:solidFill>
+            <a:prstDash val="solid"/>
+          </a:ln>
+        </p:spPr>
+        <p:txBody>
+          <a:bodyPr wrap="square" rtlCol="0">
+            <a:spAutoFit/>
+          </a:bodyPr>
+          <a:lstStyle/>
+          <a:p>
+            <a:r>
+              <a:rPr lang="en-CA" dirty="0"/>
+              <a:t>Subscription: mysub1</a:t>
+            </a:r>
+          </a:p>
+        </p:txBody>
+      </p:sp>
+      <p:sp>
+        <p:nvSpPr>
+          <p:cNvPr id="46" name="TextBox 45"/>
+          <p:cNvSpPr txBox="1"/>
+          <p:nvPr/>
+        </p:nvSpPr>
+        <p:spPr>
+          <a:xfrm>
+            <a:off x="4122730" y="4817419"/>
+            <a:ext cx="872114" cy="369332"/>
+          </a:xfrm>
+          <a:prstGeom prst="rect">
+            <a:avLst/>
+          </a:prstGeom>
+          <a:solidFill>
+            <a:schemeClr val="accent1">
+              <a:lumMod val="20000"/>
+              <a:lumOff val="80000"/>
+            </a:schemeClr>
+          </a:solidFill>
+          <a:ln>
+            <a:solidFill>
+              <a:schemeClr val="tx1"/>
+            </a:solidFill>
+            <a:prstDash val="solid"/>
+          </a:ln>
+        </p:spPr>
+        <p:txBody>
+          <a:bodyPr wrap="square" rtlCol="0">
+            <a:spAutoFit/>
+          </a:bodyPr>
+          <a:lstStyle/>
+          <a:p>
+            <a:r>
+              <a:rPr lang="en-CA" dirty="0"/>
+              <a:t>Rules</a:t>
+            </a:r>
+          </a:p>
+        </p:txBody>
+      </p:sp>
+      <p:cxnSp>
+        <p:nvCxnSpPr>
+          <p:cNvPr id="47" name="Elbow Connector 46"/>
+          <p:cNvCxnSpPr/>
+          <p:nvPr/>
+        </p:nvCxnSpPr>
+        <p:spPr>
+          <a:xfrm rot="16200000" flipH="1">
+            <a:off x="4550468" y="5218854"/>
+            <a:ext cx="476481" cy="412273"/>
+          </a:xfrm>
+          <a:prstGeom prst="bentConnector2">
+            <a:avLst/>
+          </a:prstGeom>
+          <a:ln w="19050">
+            <a:solidFill>
+              <a:schemeClr val="tx1"/>
+            </a:solidFill>
+          </a:ln>
+        </p:spPr>
+        <p:style>
+          <a:lnRef idx="1">
+            <a:schemeClr val="accent1"/>
+          </a:lnRef>
+          <a:fillRef idx="0">
+            <a:schemeClr val="accent1"/>
+          </a:fillRef>
+          <a:effectRef idx="0">
+            <a:schemeClr val="accent1"/>
+          </a:effectRef>
+          <a:fontRef idx="minor">
+            <a:schemeClr val="tx1"/>
+          </a:fontRef>
+        </p:style>
+      </p:cxnSp>
+      <p:cxnSp>
+        <p:nvCxnSpPr>
+          <p:cNvPr id="48" name="Elbow Connector 47"/>
+          <p:cNvCxnSpPr>
+            <a:stCxn id="46" idx="1"/>
+            <a:endCxn id="42" idx="2"/>
+          </p:cNvCxnSpPr>
+          <p:nvPr/>
+        </p:nvCxnSpPr>
+        <p:spPr>
+          <a:xfrm rot="10800000">
+            <a:off x="3887522" y="4562603"/>
+            <a:ext cx="235208" cy="439483"/>
+          </a:xfrm>
+          <a:prstGeom prst="bentConnector2">
+            <a:avLst/>
+          </a:prstGeom>
+          <a:ln w="19050">
+            <a:solidFill>
+              <a:schemeClr val="tx1"/>
+            </a:solidFill>
+          </a:ln>
+        </p:spPr>
+        <p:style>
+          <a:lnRef idx="1">
+            <a:schemeClr val="accent1"/>
+          </a:lnRef>
+          <a:fillRef idx="0">
+            <a:schemeClr val="accent1"/>
+          </a:fillRef>
+          <a:effectRef idx="0">
+            <a:schemeClr val="accent1"/>
+          </a:effectRef>
+          <a:fontRef idx="minor">
+            <a:schemeClr val="tx1"/>
+          </a:fontRef>
+        </p:style>
+      </p:cxnSp>
+      <p:grpSp>
+        <p:nvGrpSpPr>
+          <p:cNvPr id="52" name="Group 51"/>
+          <p:cNvGrpSpPr/>
+          <p:nvPr/>
+        </p:nvGrpSpPr>
+        <p:grpSpPr>
+          <a:xfrm>
+            <a:off x="2234473" y="2052682"/>
+            <a:ext cx="545727" cy="2335529"/>
+            <a:chOff x="2234473" y="2042408"/>
+            <a:chExt cx="545727" cy="2335529"/>
+          </a:xfrm>
+        </p:grpSpPr>
+        <p:cxnSp>
+          <p:nvCxnSpPr>
+            <p:cNvPr id="16" name="Elbow Connector 15"/>
+            <p:cNvCxnSpPr>
+              <a:stCxn id="42" idx="1"/>
+            </p:cNvCxnSpPr>
+            <p:nvPr/>
+          </p:nvCxnSpPr>
+          <p:spPr>
+            <a:xfrm rot="10800000">
+              <a:off x="2234474" y="2350624"/>
+              <a:ext cx="545726" cy="2027312"/>
+            </a:xfrm>
+            <a:prstGeom prst="bentConnector2">
+              <a:avLst/>
+            </a:prstGeom>
+            <a:ln w="19050">
+              <a:solidFill>
+                <a:schemeClr val="tx1"/>
+              </a:solidFill>
+            </a:ln>
+          </p:spPr>
+          <p:style>
+            <a:lnRef idx="1">
+              <a:schemeClr val="accent1"/>
+            </a:lnRef>
+            <a:fillRef idx="0">
+              <a:schemeClr val="accent1"/>
+            </a:fillRef>
+            <a:effectRef idx="0">
+              <a:schemeClr val="accent1"/>
+            </a:effectRef>
+            <a:fontRef idx="minor">
+              <a:schemeClr val="tx1"/>
+            </a:fontRef>
+          </p:style>
+        </p:cxnSp>
+        <p:cxnSp>
+          <p:nvCxnSpPr>
+            <p:cNvPr id="19" name="Elbow Connector 18"/>
+            <p:cNvCxnSpPr>
+              <a:stCxn id="42" idx="1"/>
+            </p:cNvCxnSpPr>
+            <p:nvPr/>
+          </p:nvCxnSpPr>
+          <p:spPr>
+            <a:xfrm rot="10800000">
+              <a:off x="2237112" y="2042408"/>
+              <a:ext cx="543088" cy="2335529"/>
+            </a:xfrm>
+            <a:prstGeom prst="bentConnector2">
+              <a:avLst/>
+            </a:prstGeom>
+            <a:ln w="19050">
+              <a:solidFill>
+                <a:schemeClr val="tx1"/>
+              </a:solidFill>
+            </a:ln>
+          </p:spPr>
+          <p:style>
+            <a:lnRef idx="1">
+              <a:schemeClr val="accent1"/>
+            </a:lnRef>
+            <a:fillRef idx="0">
+              <a:schemeClr val="accent1"/>
+            </a:fillRef>
+            <a:effectRef idx="0">
+              <a:schemeClr val="accent1"/>
+            </a:effectRef>
+            <a:fontRef idx="minor">
+              <a:schemeClr val="tx1"/>
+            </a:fontRef>
+          </p:style>
+        </p:cxnSp>
+        <p:cxnSp>
+          <p:nvCxnSpPr>
+            <p:cNvPr id="53" name="Elbow Connector 52"/>
+            <p:cNvCxnSpPr>
+              <a:endCxn id="6" idx="1"/>
+            </p:cNvCxnSpPr>
+            <p:nvPr/>
+          </p:nvCxnSpPr>
+          <p:spPr>
+            <a:xfrm>
+              <a:off x="2234473" y="2069956"/>
+              <a:ext cx="545727" cy="422907"/>
+            </a:xfrm>
+            <a:prstGeom prst="bentConnector3">
+              <a:avLst>
+                <a:gd name="adj1" fmla="val 110"/>
+              </a:avLst>
+            </a:prstGeom>
+            <a:ln w="19050">
+              <a:solidFill>
+                <a:schemeClr val="tx1"/>
+              </a:solidFill>
+            </a:ln>
+          </p:spPr>
+          <p:style>
+            <a:lnRef idx="1">
+              <a:schemeClr val="accent1"/>
+            </a:lnRef>
+            <a:fillRef idx="0">
+              <a:schemeClr val="accent1"/>
+            </a:fillRef>
+            <a:effectRef idx="0">
+              <a:schemeClr val="accent1"/>
+            </a:effectRef>
+            <a:fontRef idx="minor">
+              <a:schemeClr val="tx1"/>
+            </a:fontRef>
+          </p:style>
+        </p:cxnSp>
+      </p:grpSp>
     </p:spTree>
     <p:extLst>
       <p:ext uri="{BB962C8B-B14F-4D97-AF65-F5344CB8AC3E}">
@@ -18579,7 +18768,7 @@
                                           </p:stCondLst>
                                         </p:cTn>
                                         <p:tgtEl>
-                                          <p:spTgt spid="12"/>
+                                          <p:spTgt spid="52"/>
                                         </p:tgtEl>
                                         <p:attrNameLst>
                                           <p:attrName>style.visibility</p:attrName>
@@ -18595,21 +18784,30 @@
                             </p:childTnLst>
                           </p:cTn>
                         </p:par>
+                      </p:childTnLst>
+                    </p:cTn>
+                  </p:par>
+                  <p:par>
+                    <p:cTn id="11" fill="hold">
+                      <p:stCondLst>
+                        <p:cond delay="indefinite"/>
+                      </p:stCondLst>
+                      <p:childTnLst>
                         <p:par>
-                          <p:cTn id="11" fill="hold">
+                          <p:cTn id="12" fill="hold">
                             <p:stCondLst>
                               <p:cond delay="0"/>
                             </p:stCondLst>
                             <p:childTnLst>
                               <p:par>
-                                <p:cTn id="12" presetID="1" presetClass="entr" presetSubtype="0" fill="hold" grpId="0" nodeType="afterEffect">
+                                <p:cTn id="13" presetID="1" presetClass="entr" presetSubtype="0" fill="hold" grpId="0" nodeType="clickEffect">
                                   <p:stCondLst>
                                     <p:cond delay="0"/>
                                   </p:stCondLst>
                                   <p:childTnLst>
                                     <p:set>
                                       <p:cBhvr>
-                                        <p:cTn id="13" dur="1" fill="hold">
+                                        <p:cTn id="14" dur="1" fill="hold">
                                           <p:stCondLst>
                                             <p:cond delay="0"/>
                                           </p:stCondLst>
@@ -18635,26 +18833,26 @@
                     </p:cTn>
                   </p:par>
                   <p:par>
-                    <p:cTn id="14" fill="hold">
+                    <p:cTn id="15" fill="hold">
                       <p:stCondLst>
                         <p:cond delay="indefinite"/>
                       </p:stCondLst>
                       <p:childTnLst>
                         <p:par>
-                          <p:cTn id="15" fill="hold">
+                          <p:cTn id="16" fill="hold">
                             <p:stCondLst>
                               <p:cond delay="0"/>
                             </p:stCondLst>
                             <p:childTnLst>
                               <p:par>
-                                <p:cTn id="16" presetID="1" presetClass="entr" presetSubtype="0" fill="hold" nodeType="clickEffect">
+                                <p:cTn id="17" presetID="1" presetClass="entr" presetSubtype="0" fill="hold" nodeType="clickEffect">
                                   <p:stCondLst>
                                     <p:cond delay="0"/>
                                   </p:stCondLst>
                                   <p:childTnLst>
                                     <p:set>
                                       <p:cBhvr>
-                                        <p:cTn id="17" dur="1" fill="hold">
+                                        <p:cTn id="18" dur="1" fill="hold">
                                           <p:stCondLst>
                                             <p:cond delay="0"/>
                                           </p:stCondLst>
@@ -18673,15 +18871,33 @@
                                   </p:childTnLst>
                                 </p:cTn>
                               </p:par>
+                            </p:childTnLst>
+                          </p:cTn>
+                        </p:par>
+                      </p:childTnLst>
+                    </p:cTn>
+                  </p:par>
+                  <p:par>
+                    <p:cTn id="19" fill="hold">
+                      <p:stCondLst>
+                        <p:cond delay="indefinite"/>
+                      </p:stCondLst>
+                      <p:childTnLst>
+                        <p:par>
+                          <p:cTn id="20" fill="hold">
+                            <p:stCondLst>
+                              <p:cond delay="0"/>
+                            </p:stCondLst>
+                            <p:childTnLst>
                               <p:par>
-                                <p:cTn id="18" presetID="1" presetClass="entr" presetSubtype="0" fill="hold" grpId="0" nodeType="withEffect">
+                                <p:cTn id="21" presetID="1" presetClass="entr" presetSubtype="0" fill="hold" grpId="0" nodeType="clickEffect">
                                   <p:stCondLst>
                                     <p:cond delay="0"/>
                                   </p:stCondLst>
                                   <p:childTnLst>
                                     <p:set>
                                       <p:cBhvr>
-                                        <p:cTn id="19" dur="1" fill="hold">
+                                        <p:cTn id="22" dur="1" fill="hold">
                                           <p:stCondLst>
                                             <p:cond delay="0"/>
                                           </p:stCondLst>
@@ -18707,86 +18923,32 @@
                     </p:cTn>
                   </p:par>
                   <p:par>
-                    <p:cTn id="20" fill="hold">
+                    <p:cTn id="23" fill="hold">
                       <p:stCondLst>
                         <p:cond delay="indefinite"/>
                       </p:stCondLst>
                       <p:childTnLst>
                         <p:par>
-                          <p:cTn id="21" fill="hold">
+                          <p:cTn id="24" fill="hold">
                             <p:stCondLst>
                               <p:cond delay="0"/>
                             </p:stCondLst>
                             <p:childTnLst>
                               <p:par>
-                                <p:cTn id="22" presetID="1" presetClass="entr" presetSubtype="0" fill="hold" nodeType="clickEffect">
+                                <p:cTn id="25" presetID="1" presetClass="entr" presetSubtype="0" fill="hold" nodeType="clickEffect">
                                   <p:stCondLst>
                                     <p:cond delay="0"/>
                                   </p:stCondLst>
                                   <p:childTnLst>
                                     <p:set>
                                       <p:cBhvr>
-                                        <p:cTn id="23" dur="1" fill="hold">
+                                        <p:cTn id="26" dur="1" fill="hold">
                                           <p:stCondLst>
                                             <p:cond delay="0"/>
                                           </p:stCondLst>
                                         </p:cTn>
                                         <p:tgtEl>
-                                          <p:spTgt spid="22"/>
-                                        </p:tgtEl>
-                                        <p:attrNameLst>
-                                          <p:attrName>style.visibility</p:attrName>
-                                        </p:attrNameLst>
-                                      </p:cBhvr>
-                                      <p:to>
-                                        <p:strVal val="visible"/>
-                                      </p:to>
-                                    </p:set>
-                                  </p:childTnLst>
-                                </p:cTn>
-                              </p:par>
-                              <p:par>
-                                <p:cTn id="24" presetID="1" presetClass="entr" presetSubtype="0" fill="hold" grpId="0" nodeType="withEffect">
-                                  <p:stCondLst>
-                                    <p:cond delay="0"/>
-                                  </p:stCondLst>
-                                  <p:childTnLst>
-                                    <p:set>
-                                      <p:cBhvr>
-                                        <p:cTn id="25" dur="1" fill="hold">
-                                          <p:stCondLst>
-                                            <p:cond delay="0"/>
-                                          </p:stCondLst>
-                                        </p:cTn>
-                                        <p:tgtEl>
-                                          <p:spTgt spid="9"/>
-                                        </p:tgtEl>
-                                        <p:attrNameLst>
-                                          <p:attrName>style.visibility</p:attrName>
-                                        </p:attrNameLst>
-                                      </p:cBhvr>
-                                      <p:to>
-                                        <p:strVal val="visible"/>
-                                      </p:to>
-                                    </p:set>
-                                  </p:childTnLst>
-                                </p:cTn>
-                              </p:par>
-                              <p:par>
-                                <p:cTn id="26" presetID="1" presetClass="entr" presetSubtype="0" fill="hold" grpId="0" nodeType="withEffect">
-                                  <p:stCondLst>
-                                    <p:cond delay="0"/>
-                                  </p:stCondLst>
-                                  <p:childTnLst>
-                                    <p:set>
-                                      <p:cBhvr>
-                                        <p:cTn id="27" dur="1" fill="hold">
-                                          <p:stCondLst>
-                                            <p:cond delay="0"/>
-                                          </p:stCondLst>
-                                        </p:cTn>
-                                        <p:tgtEl>
-                                          <p:spTgt spid="10"/>
+                                          <p:spTgt spid="12"/>
                                         </p:tgtEl>
                                         <p:attrNameLst>
                                           <p:attrName>style.visibility</p:attrName>
@@ -18806,26 +18968,71 @@
                     </p:cTn>
                   </p:par>
                   <p:par>
-                    <p:cTn id="28" fill="hold">
+                    <p:cTn id="27" fill="hold">
                       <p:stCondLst>
                         <p:cond delay="indefinite"/>
                       </p:stCondLst>
                       <p:childTnLst>
                         <p:par>
-                          <p:cTn id="29" fill="hold">
+                          <p:cTn id="28" fill="hold">
                             <p:stCondLst>
                               <p:cond delay="0"/>
                             </p:stCondLst>
                             <p:childTnLst>
                               <p:par>
-                                <p:cTn id="30" presetID="1" presetClass="entr" presetSubtype="0" fill="hold" nodeType="clickEffect">
+                                <p:cTn id="29" presetID="1" presetClass="entr" presetSubtype="0" fill="hold" grpId="0" nodeType="clickEffect">
                                   <p:stCondLst>
                                     <p:cond delay="0"/>
                                   </p:stCondLst>
                                   <p:childTnLst>
                                     <p:set>
                                       <p:cBhvr>
-                                        <p:cTn id="31" dur="1" fill="hold">
+                                        <p:cTn id="30" dur="1" fill="hold">
+                                          <p:stCondLst>
+                                            <p:cond delay="0"/>
+                                          </p:stCondLst>
+                                        </p:cTn>
+                                        <p:tgtEl>
+                                          <p:spTgt spid="9"/>
+                                        </p:tgtEl>
+                                        <p:attrNameLst>
+                                          <p:attrName>style.visibility</p:attrName>
+                                        </p:attrNameLst>
+                                      </p:cBhvr>
+                                      <p:to>
+                                        <p:strVal val="visible"/>
+                                      </p:to>
+                                    </p:set>
+                                  </p:childTnLst>
+                                </p:cTn>
+                              </p:par>
+                            </p:childTnLst>
+                          </p:cTn>
+                        </p:par>
+                      </p:childTnLst>
+                    </p:cTn>
+                  </p:par>
+                  <p:par>
+                    <p:cTn id="31" fill="hold">
+                      <p:stCondLst>
+                        <p:cond delay="indefinite"/>
+                      </p:stCondLst>
+                      <p:childTnLst>
+                        <p:par>
+                          <p:cTn id="32" fill="hold">
+                            <p:stCondLst>
+                              <p:cond delay="0"/>
+                            </p:stCondLst>
+                            <p:childTnLst>
+                              <p:par>
+                                <p:cTn id="33" presetID="1" presetClass="entr" presetSubtype="0" fill="hold" nodeType="clickEffect">
+                                  <p:stCondLst>
+                                    <p:cond delay="0"/>
+                                  </p:stCondLst>
+                                  <p:childTnLst>
+                                    <p:set>
+                                      <p:cBhvr>
+                                        <p:cTn id="34" dur="1" fill="hold">
                                           <p:stCondLst>
                                             <p:cond delay="0"/>
                                           </p:stCondLst>
@@ -18847,21 +19054,30 @@
                             </p:childTnLst>
                           </p:cTn>
                         </p:par>
+                      </p:childTnLst>
+                    </p:cTn>
+                  </p:par>
+                  <p:par>
+                    <p:cTn id="35" fill="hold">
+                      <p:stCondLst>
+                        <p:cond delay="indefinite"/>
+                      </p:stCondLst>
+                      <p:childTnLst>
                         <p:par>
-                          <p:cTn id="32" fill="hold">
+                          <p:cTn id="36" fill="hold">
                             <p:stCondLst>
                               <p:cond delay="0"/>
                             </p:stCondLst>
                             <p:childTnLst>
                               <p:par>
-                                <p:cTn id="33" presetID="1" presetClass="entr" presetSubtype="0" fill="hold" grpId="0" nodeType="afterEffect">
+                                <p:cTn id="37" presetID="1" presetClass="entr" presetSubtype="0" fill="hold" grpId="0" nodeType="clickEffect">
                                   <p:stCondLst>
                                     <p:cond delay="0"/>
                                   </p:stCondLst>
                                   <p:childTnLst>
                                     <p:set>
                                       <p:cBhvr>
-                                        <p:cTn id="34" dur="1" fill="hold">
+                                        <p:cTn id="38" dur="1" fill="hold">
                                           <p:stCondLst>
                                             <p:cond delay="0"/>
                                           </p:stCondLst>
@@ -18883,21 +19099,30 @@
                             </p:childTnLst>
                           </p:cTn>
                         </p:par>
+                      </p:childTnLst>
+                    </p:cTn>
+                  </p:par>
+                  <p:par>
+                    <p:cTn id="39" fill="hold">
+                      <p:stCondLst>
+                        <p:cond delay="indefinite"/>
+                      </p:stCondLst>
+                      <p:childTnLst>
                         <p:par>
-                          <p:cTn id="35" fill="hold">
+                          <p:cTn id="40" fill="hold">
                             <p:stCondLst>
                               <p:cond delay="0"/>
                             </p:stCondLst>
                             <p:childTnLst>
                               <p:par>
-                                <p:cTn id="36" presetID="1" presetClass="entr" presetSubtype="0" fill="hold" grpId="0" nodeType="afterEffect">
+                                <p:cTn id="41" presetID="1" presetClass="entr" presetSubtype="0" fill="hold" grpId="0" nodeType="clickEffect">
                                   <p:stCondLst>
                                     <p:cond delay="0"/>
                                   </p:stCondLst>
                                   <p:childTnLst>
                                     <p:set>
                                       <p:cBhvr>
-                                        <p:cTn id="37" dur="1" fill="hold">
+                                        <p:cTn id="42" dur="1" fill="hold">
                                           <p:stCondLst>
                                             <p:cond delay="0"/>
                                           </p:stCondLst>
@@ -18923,32 +19148,32 @@
                     </p:cTn>
                   </p:par>
                   <p:par>
-                    <p:cTn id="38" fill="hold">
+                    <p:cTn id="43" fill="hold">
                       <p:stCondLst>
                         <p:cond delay="indefinite"/>
                       </p:stCondLst>
                       <p:childTnLst>
                         <p:par>
-                          <p:cTn id="39" fill="hold">
+                          <p:cTn id="44" fill="hold">
                             <p:stCondLst>
                               <p:cond delay="0"/>
                             </p:stCondLst>
                             <p:childTnLst>
                               <p:par>
-                                <p:cTn id="40" presetID="1" presetClass="entr" presetSubtype="0" fill="hold" nodeType="clickEffect">
+                                <p:cTn id="45" presetID="1" presetClass="entr" presetSubtype="0" fill="hold" grpId="0" nodeType="clickEffect">
                                   <p:stCondLst>
                                     <p:cond delay="0"/>
                                   </p:stCondLst>
                                   <p:childTnLst>
                                     <p:set>
                                       <p:cBhvr>
-                                        <p:cTn id="41" dur="1" fill="hold">
+                                        <p:cTn id="46" dur="1" fill="hold">
                                           <p:stCondLst>
                                             <p:cond delay="0"/>
                                           </p:stCondLst>
                                         </p:cTn>
                                         <p:tgtEl>
-                                          <p:spTgt spid="38"/>
+                                          <p:spTgt spid="10"/>
                                         </p:tgtEl>
                                         <p:attrNameLst>
                                           <p:attrName>style.visibility</p:attrName>
@@ -18961,15 +19186,24 @@
                                   </p:childTnLst>
                                 </p:cTn>
                               </p:par>
+                            </p:childTnLst>
+                          </p:cTn>
+                        </p:par>
+                        <p:par>
+                          <p:cTn id="47" fill="hold">
+                            <p:stCondLst>
+                              <p:cond delay="0"/>
+                            </p:stCondLst>
+                            <p:childTnLst>
                               <p:par>
-                                <p:cTn id="42" presetID="1" presetClass="entr" presetSubtype="0" fill="hold" grpId="0" nodeType="withEffect">
+                                <p:cTn id="48" presetID="1" presetClass="entr" presetSubtype="0" fill="hold" grpId="0" nodeType="afterEffect">
                                   <p:stCondLst>
                                     <p:cond delay="0"/>
                                   </p:stCondLst>
                                   <p:childTnLst>
                                     <p:set>
                                       <p:cBhvr>
-                                        <p:cTn id="43" dur="1" fill="hold">
+                                        <p:cTn id="49" dur="1" fill="hold">
                                           <p:stCondLst>
                                             <p:cond delay="0"/>
                                           </p:stCondLst>
@@ -18988,15 +19222,24 @@
                                   </p:childTnLst>
                                 </p:cTn>
                               </p:par>
+                            </p:childTnLst>
+                          </p:cTn>
+                        </p:par>
+                        <p:par>
+                          <p:cTn id="50" fill="hold">
+                            <p:stCondLst>
+                              <p:cond delay="0"/>
+                            </p:stCondLst>
+                            <p:childTnLst>
                               <p:par>
-                                <p:cTn id="44" presetID="1" presetClass="entr" presetSubtype="0" fill="hold" grpId="0" nodeType="withEffect">
+                                <p:cTn id="51" presetID="1" presetClass="entr" presetSubtype="0" fill="hold" grpId="0" nodeType="afterEffect">
                                   <p:stCondLst>
                                     <p:cond delay="0"/>
                                   </p:stCondLst>
                                   <p:childTnLst>
                                     <p:set>
                                       <p:cBhvr>
-                                        <p:cTn id="45" dur="1" fill="hold">
+                                        <p:cTn id="52" dur="1" fill="hold">
                                           <p:stCondLst>
                                             <p:cond delay="0"/>
                                           </p:stCondLst>
@@ -19018,30 +19261,210 @@
                             </p:childTnLst>
                           </p:cTn>
                         </p:par>
-                      </p:childTnLst>
-                    </p:cTn>
-                  </p:par>
-                  <p:par>
-                    <p:cTn id="46" fill="hold">
-                      <p:stCondLst>
-                        <p:cond delay="indefinite"/>
-                      </p:stCondLst>
-                      <p:childTnLst>
                         <p:par>
-                          <p:cTn id="47" fill="hold">
+                          <p:cTn id="53" fill="hold">
                             <p:stCondLst>
                               <p:cond delay="0"/>
                             </p:stCondLst>
                             <p:childTnLst>
                               <p:par>
-                                <p:cTn id="48" presetID="1" presetClass="entr" presetSubtype="0" fill="hold" grpId="0" nodeType="clickEffect">
+                                <p:cTn id="54" presetID="1" presetClass="entr" presetSubtype="0" fill="hold" nodeType="afterEffect">
                                   <p:stCondLst>
                                     <p:cond delay="0"/>
                                   </p:stCondLst>
                                   <p:childTnLst>
                                     <p:set>
                                       <p:cBhvr>
-                                        <p:cTn id="49" dur="1" fill="hold">
+                                        <p:cTn id="55" dur="1" fill="hold">
+                                          <p:stCondLst>
+                                            <p:cond delay="0"/>
+                                          </p:stCondLst>
+                                        </p:cTn>
+                                        <p:tgtEl>
+                                          <p:spTgt spid="38"/>
+                                        </p:tgtEl>
+                                        <p:attrNameLst>
+                                          <p:attrName>style.visibility</p:attrName>
+                                        </p:attrNameLst>
+                                      </p:cBhvr>
+                                      <p:to>
+                                        <p:strVal val="visible"/>
+                                      </p:to>
+                                    </p:set>
+                                  </p:childTnLst>
+                                </p:cTn>
+                              </p:par>
+                            </p:childTnLst>
+                          </p:cTn>
+                        </p:par>
+                        <p:par>
+                          <p:cTn id="56" fill="hold">
+                            <p:stCondLst>
+                              <p:cond delay="0"/>
+                            </p:stCondLst>
+                            <p:childTnLst>
+                              <p:par>
+                                <p:cTn id="57" presetID="1" presetClass="entr" presetSubtype="0" fill="hold" grpId="0" nodeType="afterEffect">
+                                  <p:stCondLst>
+                                    <p:cond delay="0"/>
+                                  </p:stCondLst>
+                                  <p:childTnLst>
+                                    <p:set>
+                                      <p:cBhvr>
+                                        <p:cTn id="58" dur="1" fill="hold">
+                                          <p:stCondLst>
+                                            <p:cond delay="0"/>
+                                          </p:stCondLst>
+                                        </p:cTn>
+                                        <p:tgtEl>
+                                          <p:spTgt spid="42"/>
+                                        </p:tgtEl>
+                                        <p:attrNameLst>
+                                          <p:attrName>style.visibility</p:attrName>
+                                        </p:attrNameLst>
+                                      </p:cBhvr>
+                                      <p:to>
+                                        <p:strVal val="visible"/>
+                                      </p:to>
+                                    </p:set>
+                                  </p:childTnLst>
+                                </p:cTn>
+                              </p:par>
+                            </p:childTnLst>
+                          </p:cTn>
+                        </p:par>
+                        <p:par>
+                          <p:cTn id="59" fill="hold">
+                            <p:stCondLst>
+                              <p:cond delay="0"/>
+                            </p:stCondLst>
+                            <p:childTnLst>
+                              <p:par>
+                                <p:cTn id="60" presetID="1" presetClass="entr" presetSubtype="0" fill="hold" grpId="0" nodeType="afterEffect">
+                                  <p:stCondLst>
+                                    <p:cond delay="0"/>
+                                  </p:stCondLst>
+                                  <p:childTnLst>
+                                    <p:set>
+                                      <p:cBhvr>
+                                        <p:cTn id="61" dur="1" fill="hold">
+                                          <p:stCondLst>
+                                            <p:cond delay="0"/>
+                                          </p:stCondLst>
+                                        </p:cTn>
+                                        <p:tgtEl>
+                                          <p:spTgt spid="46"/>
+                                        </p:tgtEl>
+                                        <p:attrNameLst>
+                                          <p:attrName>style.visibility</p:attrName>
+                                        </p:attrNameLst>
+                                      </p:cBhvr>
+                                      <p:to>
+                                        <p:strVal val="visible"/>
+                                      </p:to>
+                                    </p:set>
+                                  </p:childTnLst>
+                                </p:cTn>
+                              </p:par>
+                            </p:childTnLst>
+                          </p:cTn>
+                        </p:par>
+                        <p:par>
+                          <p:cTn id="62" fill="hold">
+                            <p:stCondLst>
+                              <p:cond delay="0"/>
+                            </p:stCondLst>
+                            <p:childTnLst>
+                              <p:par>
+                                <p:cTn id="63" presetID="1" presetClass="entr" presetSubtype="0" fill="hold" nodeType="afterEffect">
+                                  <p:stCondLst>
+                                    <p:cond delay="0"/>
+                                  </p:stCondLst>
+                                  <p:childTnLst>
+                                    <p:set>
+                                      <p:cBhvr>
+                                        <p:cTn id="64" dur="1" fill="hold">
+                                          <p:stCondLst>
+                                            <p:cond delay="0"/>
+                                          </p:stCondLst>
+                                        </p:cTn>
+                                        <p:tgtEl>
+                                          <p:spTgt spid="47"/>
+                                        </p:tgtEl>
+                                        <p:attrNameLst>
+                                          <p:attrName>style.visibility</p:attrName>
+                                        </p:attrNameLst>
+                                      </p:cBhvr>
+                                      <p:to>
+                                        <p:strVal val="visible"/>
+                                      </p:to>
+                                    </p:set>
+                                  </p:childTnLst>
+                                </p:cTn>
+                              </p:par>
+                            </p:childTnLst>
+                          </p:cTn>
+                        </p:par>
+                        <p:par>
+                          <p:cTn id="65" fill="hold">
+                            <p:stCondLst>
+                              <p:cond delay="0"/>
+                            </p:stCondLst>
+                            <p:childTnLst>
+                              <p:par>
+                                <p:cTn id="66" presetID="1" presetClass="entr" presetSubtype="0" fill="hold" nodeType="afterEffect">
+                                  <p:stCondLst>
+                                    <p:cond delay="0"/>
+                                  </p:stCondLst>
+                                  <p:childTnLst>
+                                    <p:set>
+                                      <p:cBhvr>
+                                        <p:cTn id="67" dur="1" fill="hold">
+                                          <p:stCondLst>
+                                            <p:cond delay="0"/>
+                                          </p:stCondLst>
+                                        </p:cTn>
+                                        <p:tgtEl>
+                                          <p:spTgt spid="48"/>
+                                        </p:tgtEl>
+                                        <p:attrNameLst>
+                                          <p:attrName>style.visibility</p:attrName>
+                                        </p:attrNameLst>
+                                      </p:cBhvr>
+                                      <p:to>
+                                        <p:strVal val="visible"/>
+                                      </p:to>
+                                    </p:set>
+                                  </p:childTnLst>
+                                </p:cTn>
+                              </p:par>
+                            </p:childTnLst>
+                          </p:cTn>
+                        </p:par>
+                      </p:childTnLst>
+                    </p:cTn>
+                  </p:par>
+                  <p:par>
+                    <p:cTn id="68" fill="hold">
+                      <p:stCondLst>
+                        <p:cond delay="indefinite"/>
+                      </p:stCondLst>
+                      <p:childTnLst>
+                        <p:par>
+                          <p:cTn id="69" fill="hold">
+                            <p:stCondLst>
+                              <p:cond delay="0"/>
+                            </p:stCondLst>
+                            <p:childTnLst>
+                              <p:par>
+                                <p:cTn id="70" presetID="1" presetClass="entr" presetSubtype="0" fill="hold" grpId="0" nodeType="clickEffect">
+                                  <p:stCondLst>
+                                    <p:cond delay="0"/>
+                                  </p:stCondLst>
+                                  <p:childTnLst>
+                                    <p:set>
+                                      <p:cBhvr>
+                                        <p:cTn id="71" dur="1" fill="hold">
                                           <p:stCondLst>
                                             <p:cond delay="0"/>
                                           </p:stCondLst>
@@ -19067,26 +19490,26 @@
                     </p:cTn>
                   </p:par>
                   <p:par>
-                    <p:cTn id="50" fill="hold">
+                    <p:cTn id="72" fill="hold">
                       <p:stCondLst>
                         <p:cond delay="indefinite"/>
                       </p:stCondLst>
                       <p:childTnLst>
                         <p:par>
-                          <p:cTn id="51" fill="hold">
+                          <p:cTn id="73" fill="hold">
                             <p:stCondLst>
                               <p:cond delay="0"/>
                             </p:stCondLst>
                             <p:childTnLst>
                               <p:par>
-                                <p:cTn id="52" presetID="1" presetClass="entr" presetSubtype="0" fill="hold" grpId="0" nodeType="clickEffect">
+                                <p:cTn id="74" presetID="1" presetClass="entr" presetSubtype="0" fill="hold" grpId="0" nodeType="clickEffect">
                                   <p:stCondLst>
                                     <p:cond delay="0"/>
                                   </p:stCondLst>
                                   <p:childTnLst>
                                     <p:set>
                                       <p:cBhvr>
-                                        <p:cTn id="53" dur="1" fill="hold">
+                                        <p:cTn id="75" dur="1" fill="hold">
                                           <p:stCondLst>
                                             <p:cond delay="0"/>
                                           </p:stCondLst>
@@ -19112,26 +19535,26 @@
                     </p:cTn>
                   </p:par>
                   <p:par>
-                    <p:cTn id="54" fill="hold">
+                    <p:cTn id="76" fill="hold">
                       <p:stCondLst>
                         <p:cond delay="indefinite"/>
                       </p:stCondLst>
                       <p:childTnLst>
                         <p:par>
-                          <p:cTn id="55" fill="hold">
+                          <p:cTn id="77" fill="hold">
                             <p:stCondLst>
                               <p:cond delay="0"/>
                             </p:stCondLst>
                             <p:childTnLst>
                               <p:par>
-                                <p:cTn id="56" presetID="1" presetClass="entr" presetSubtype="0" fill="hold" grpId="0" nodeType="clickEffect">
+                                <p:cTn id="78" presetID="1" presetClass="entr" presetSubtype="0" fill="hold" grpId="0" nodeType="clickEffect">
                                   <p:stCondLst>
                                     <p:cond delay="0"/>
                                   </p:stCondLst>
                                   <p:childTnLst>
                                     <p:set>
                                       <p:cBhvr>
-                                        <p:cTn id="57" dur="1" fill="hold">
+                                        <p:cTn id="79" dur="1" fill="hold">
                                           <p:stCondLst>
                                             <p:cond delay="0"/>
                                           </p:stCondLst>
@@ -19157,77 +19580,32 @@
                     </p:cTn>
                   </p:par>
                   <p:par>
-                    <p:cTn id="58" fill="hold">
+                    <p:cTn id="80" fill="hold">
                       <p:stCondLst>
                         <p:cond delay="indefinite"/>
                       </p:stCondLst>
                       <p:childTnLst>
                         <p:par>
-                          <p:cTn id="59" fill="hold">
+                          <p:cTn id="81" fill="hold">
                             <p:stCondLst>
                               <p:cond delay="0"/>
                             </p:stCondLst>
                             <p:childTnLst>
                               <p:par>
-                                <p:cTn id="60" presetID="1" presetClass="entr" presetSubtype="0" fill="hold" grpId="0" nodeType="clickEffect">
+                                <p:cTn id="82" presetID="1" presetClass="entr" presetSubtype="0" fill="hold" grpId="0" nodeType="clickEffect">
                                   <p:stCondLst>
                                     <p:cond delay="0"/>
                                   </p:stCondLst>
                                   <p:childTnLst>
                                     <p:set>
                                       <p:cBhvr>
-                                        <p:cTn id="61" dur="1" fill="hold">
+                                        <p:cTn id="83" dur="1" fill="hold">
                                           <p:stCondLst>
                                             <p:cond delay="0"/>
                                           </p:stCondLst>
                                         </p:cTn>
                                         <p:tgtEl>
                                           <p:spTgt spid="45"/>
-                                        </p:tgtEl>
-                                        <p:attrNameLst>
-                                          <p:attrName>style.visibility</p:attrName>
-                                        </p:attrNameLst>
-                                      </p:cBhvr>
-                                      <p:to>
-                                        <p:strVal val="visible"/>
-                                      </p:to>
-                                    </p:set>
-                                  </p:childTnLst>
-                                </p:cTn>
-                              </p:par>
-                            </p:childTnLst>
-                          </p:cTn>
-                        </p:par>
-                      </p:childTnLst>
-                    </p:cTn>
-                  </p:par>
-                  <p:par>
-                    <p:cTn id="62" fill="hold">
-                      <p:stCondLst>
-                        <p:cond delay="indefinite"/>
-                      </p:stCondLst>
-                      <p:childTnLst>
-                        <p:par>
-                          <p:cTn id="63" fill="hold">
-                            <p:stCondLst>
-                              <p:cond delay="0"/>
-                            </p:stCondLst>
-                            <p:childTnLst>
-                              <p:par>
-                                <p:cTn id="64" presetID="1" presetClass="entr" presetSubtype="0" fill="hold" nodeType="clickEffect">
-                                  <p:stCondLst>
-                                    <p:cond delay="0"/>
-                                  </p:stCondLst>
-                                  <p:childTnLst>
-                                    <p:set>
-                                      <p:cBhvr>
-                                        <p:cTn id="65" dur="1" fill="hold">
-                                          <p:stCondLst>
-                                            <p:cond delay="0"/>
-                                          </p:stCondLst>
-                                        </p:cTn>
-                                        <p:tgtEl>
-                                          <p:spTgt spid="76"/>
                                         </p:tgtEl>
                                         <p:attrNameLst>
                                           <p:attrName>style.visibility</p:attrName>
@@ -19281,6 +19659,8 @@
       <p:bldP spid="43" grpId="0" animBg="1"/>
       <p:bldP spid="44" grpId="0" animBg="1"/>
       <p:bldP spid="45" grpId="0" animBg="1"/>
+      <p:bldP spid="42" grpId="0" animBg="1"/>
+      <p:bldP spid="46" grpId="0" animBg="1"/>
     </p:bldLst>
   </p:timing>
 </p:sld>

</xml_diff>